<commit_message>
Spelling corrections on poster
</commit_message>
<xml_diff>
--- a/Files/poster/Poster - Projektgrundlag.pptx
+++ b/Files/poster/Poster - Projektgrundlag.pptx
@@ -159,13 +159,45 @@
 <file path=ppt/revisionInfo.xml><?xml version="1.0" encoding="utf-8"?>
 <p1510:revInfo xmlns:a="http://schemas.openxmlformats.org/drawingml/2006/main" xmlns:r="http://schemas.openxmlformats.org/officeDocument/2006/relationships" xmlns:p1510="http://schemas.microsoft.com/office/powerpoint/2015/10/main">
   <p1510:revLst>
-    <p1510:client id="{83DB669E-0BFA-43AC-A42E-B405F69215A4}" v="72" dt="2019-10-10T10:38:34.152"/>
+    <p1510:client id="{E165F5EC-B84B-4672-9FC0-8C64705214A4}" v="8" dt="2019-11-12T10:40:54.421"/>
   </p1510:revLst>
 </p1510:revInfo>
 </file>
 
 <file path=ppt/changesInfos/changesInfo1.xml><?xml version="1.0" encoding="utf-8"?>
 <pc:chgInfo xmlns:a="http://schemas.openxmlformats.org/drawingml/2006/main" xmlns:r="http://schemas.openxmlformats.org/officeDocument/2006/relationships" xmlns:ac="http://schemas.microsoft.com/office/drawing/2013/main/command" xmlns:pc="http://schemas.microsoft.com/office/powerpoint/2013/main/command">
+  <pc:docChgLst>
+    <pc:chgData name="Anders Wylardt Nielsen" userId="e0ee3fc7cf27fac6" providerId="LiveId" clId="{E165F5EC-B84B-4672-9FC0-8C64705214A4}"/>
+    <pc:docChg chg="custSel modSld">
+      <pc:chgData name="Anders Wylardt Nielsen" userId="e0ee3fc7cf27fac6" providerId="LiveId" clId="{E165F5EC-B84B-4672-9FC0-8C64705214A4}" dt="2019-11-12T10:40:26.441" v="2" actId="313"/>
+      <pc:docMkLst>
+        <pc:docMk/>
+      </pc:docMkLst>
+      <pc:sldChg chg="modSp">
+        <pc:chgData name="Anders Wylardt Nielsen" userId="e0ee3fc7cf27fac6" providerId="LiveId" clId="{E165F5EC-B84B-4672-9FC0-8C64705214A4}" dt="2019-11-12T10:40:26.441" v="2" actId="313"/>
+        <pc:sldMkLst>
+          <pc:docMk/>
+          <pc:sldMk cId="1759635540" sldId="259"/>
+        </pc:sldMkLst>
+        <pc:spChg chg="mod">
+          <ac:chgData name="Anders Wylardt Nielsen" userId="e0ee3fc7cf27fac6" providerId="LiveId" clId="{E165F5EC-B84B-4672-9FC0-8C64705214A4}" dt="2019-11-12T10:40:26.441" v="2" actId="313"/>
+          <ac:spMkLst>
+            <pc:docMk/>
+            <pc:sldMk cId="1759635540" sldId="259"/>
+            <ac:spMk id="30" creationId="{E2B7DE94-FABB-454B-887C-DE796276B67C}"/>
+          </ac:spMkLst>
+        </pc:spChg>
+        <pc:spChg chg="mod">
+          <ac:chgData name="Anders Wylardt Nielsen" userId="e0ee3fc7cf27fac6" providerId="LiveId" clId="{E165F5EC-B84B-4672-9FC0-8C64705214A4}" dt="2019-11-12T10:38:06.520" v="1" actId="20577"/>
+          <ac:spMkLst>
+            <pc:docMk/>
+            <pc:sldMk cId="1759635540" sldId="259"/>
+            <ac:spMk id="32" creationId="{CD6FFC6C-AF2A-4DE1-9C0E-BE7B79DC5C93}"/>
+          </ac:spMkLst>
+        </pc:spChg>
+      </pc:sldChg>
+    </pc:docChg>
+  </pc:docChgLst>
   <pc:docChgLst>
     <pc:chgData name="Anders Wylardt Nielsen" userId="e0ee3fc7cf27fac6" providerId="LiveId" clId="{E8901BAB-3C73-442E-B259-1D5BA63EBE25}"/>
     <pc:docChg chg="undo custSel modSld">
@@ -627,7 +659,7 @@
           <a:p>
             <a:fld id="{F1C0B079-A316-4C9B-B165-DF9EA8325D2C}" type="datetimeFigureOut">
               <a:rPr lang="da-DK" smtClean="0"/>
-              <a:t>10-10-2019</a:t>
+              <a:t>12-11-2019</a:t>
             </a:fld>
             <a:endParaRPr lang="da-DK"/>
           </a:p>
@@ -791,7 +823,7 @@
           </a:lstStyle>
           <a:p>
             <a:fld id="{38F28AB8-57D1-494F-9851-055AD867E790}" type="datetimeFigureOut">
-              <a:t>10-10-2019</a:t>
+              <a:t>12-11-2019</a:t>
             </a:fld>
             <a:endParaRPr lang="da-DK"/>
           </a:p>
@@ -12761,7 +12793,7 @@
             <a:fld id="{ECAA57DF-1C19-4726-AB84-014692BAD8F5}" type="datetimeFigureOut">
               <a:rPr lang="da-DK" noProof="0" smtClean="0"/>
               <a:pPr/>
-              <a:t>10-10-2019</a:t>
+              <a:t>12-11-2019</a:t>
             </a:fld>
             <a:endParaRPr lang="da-DK" noProof="0" dirty="0"/>
           </a:p>
@@ -13483,7 +13515,7 @@
             <a:fld id="{ECAA57DF-1C19-4726-AB84-014692BAD8F5}" type="datetimeFigureOut">
               <a:rPr lang="da-DK" noProof="0" smtClean="0"/>
               <a:pPr/>
-              <a:t>10-10-2019</a:t>
+              <a:t>12-11-2019</a:t>
             </a:fld>
             <a:endParaRPr lang="da-DK" noProof="0" dirty="0"/>
           </a:p>
@@ -14205,7 +14237,7 @@
             <a:fld id="{ECAA57DF-1C19-4726-AB84-014692BAD8F5}" type="datetimeFigureOut">
               <a:rPr lang="da-DK" noProof="0" smtClean="0"/>
               <a:pPr/>
-              <a:t>10-10-2019</a:t>
+              <a:t>12-11-2019</a:t>
             </a:fld>
             <a:endParaRPr lang="da-DK" noProof="0" dirty="0"/>
           </a:p>
@@ -14927,7 +14959,7 @@
             <a:fld id="{ECAA57DF-1C19-4726-AB84-014692BAD8F5}" type="datetimeFigureOut">
               <a:rPr lang="da-DK" noProof="0" smtClean="0"/>
               <a:pPr/>
-              <a:t>10-10-2019</a:t>
+              <a:t>12-11-2019</a:t>
             </a:fld>
             <a:endParaRPr lang="da-DK" noProof="0" dirty="0"/>
           </a:p>
@@ -15714,11 +15746,7 @@
             </a:r>
             <a:r>
               <a:rPr lang="da-DK" sz="2400" i="1" dirty="0"/>
-              <a:t>World of </a:t>
-            </a:r>
-            <a:r>
-              <a:rPr lang="da-DK" sz="2400" i="1" dirty="0" err="1"/>
-              <a:t>Zuul</a:t>
+              <a:t>World of Zuul</a:t>
             </a:r>
             <a:r>
               <a:rPr lang="da-DK" sz="2400" dirty="0"/>
@@ -15849,15 +15877,7 @@
           <a:p>
             <a:r>
               <a:rPr lang="da-DK" sz="2400" dirty="0"/>
-              <a:t>I kodnings- eller implementeringsfasen, vil gruppen programmere spillet del for del. Som problemer og opgaver opstår bliver opslag tilføjet på et </a:t>
-            </a:r>
-            <a:r>
-              <a:rPr lang="da-DK" sz="2400" dirty="0" err="1"/>
-              <a:t>Kanban</a:t>
-            </a:r>
-            <a:r>
-              <a:rPr lang="da-DK" sz="2400" dirty="0"/>
-              <a:t> board. Boardet bruges til at visualisere gruppens ”workflow”, så gruppens medlemmer har overblik over de individuelle fremskridt i implementeringen. Slutteligt vil delene blive sammenlagt for at skabe et færdigt funktionelt program.</a:t>
+              <a:t>I kodnings- eller implementeringsfasen, vil gruppen programmere spillet del for del. Som problemer og opgaver opstår bliver opslag tilføjet på et Kanban board. Boardet bruges til at visualisere gruppens ”workflow”, så gruppens medlemmer har overblik over de individuelle fremskridt i implementeringen. Slutteligt vil delene blive sammenlagt for at skabe et færdigt funktionelt program.</a:t>
             </a:r>
           </a:p>
           <a:p>
@@ -15920,15 +15940,7 @@
           <a:p>
             <a:r>
               <a:rPr lang="da-DK" sz="2000" dirty="0"/>
-              <a:t>FN. (2019). Mål 3: Sundhed og Trivsel. [online]. </a:t>
-            </a:r>
-            <a:r>
-              <a:rPr lang="da-DK" sz="2000" dirty="0" err="1"/>
-              <a:t>Available</a:t>
-            </a:r>
-            <a:r>
-              <a:rPr lang="da-DK" sz="2000" dirty="0"/>
-              <a:t> at: </a:t>
+              <a:t>FN. (2019). Mål 3: Sundhed og Trivsel. [online]. Available at: </a:t>
             </a:r>
             <a:r>
               <a:rPr lang="da-DK" sz="2000" dirty="0">
@@ -15938,15 +15950,7 @@
             </a:r>
             <a:r>
               <a:rPr lang="da-DK" sz="2000" dirty="0"/>
-              <a:t>[</a:t>
-            </a:r>
-            <a:r>
-              <a:rPr lang="da-DK" sz="2000" dirty="0" err="1"/>
-              <a:t>Accessed</a:t>
-            </a:r>
-            <a:r>
-              <a:rPr lang="da-DK" sz="2000" dirty="0"/>
-              <a:t> 08/10-2019]</a:t>
+              <a:t>[Accessed 08/10-2019]</a:t>
             </a:r>
           </a:p>
         </p:txBody>
@@ -15979,15 +15983,7 @@
           <a:p>
             <a:r>
               <a:rPr lang="da-DK" sz="2400" dirty="0"/>
-              <a:t>Problem: Hvert år dør over 4 millioner mennesker af </a:t>
-            </a:r>
-            <a:r>
-              <a:rPr lang="da-DK" sz="2400" dirty="0" err="1"/>
-              <a:t>undgåelige</a:t>
-            </a:r>
-            <a:r>
-              <a:rPr lang="da-DK" sz="2400" dirty="0"/>
-              <a:t> sygdomme.</a:t>
+              <a:t>Problem: Hvert år dør over 4 millioner mennesker af undgåelige sygdomme.</a:t>
             </a:r>
           </a:p>
           <a:p>
@@ -16120,20 +16116,8 @@
           <a:lstStyle/>
           <a:p>
             <a:r>
-              <a:rPr lang="da-DK" dirty="0" err="1"/>
-              <a:t>Kill</a:t>
-            </a:r>
-            <a:r>
               <a:rPr lang="da-DK" dirty="0"/>
-              <a:t> The </a:t>
-            </a:r>
-            <a:r>
-              <a:rPr lang="da-DK" dirty="0" err="1"/>
-              <a:t>Killers</a:t>
-            </a:r>
-            <a:r>
-              <a:rPr lang="da-DK" dirty="0"/>
-              <a:t> </a:t>
+              <a:t>Kill The Killers </a:t>
             </a:r>
             <a:br>
               <a:rPr lang="da-DK" dirty="0"/>
@@ -16372,10 +16356,9 @@
           </a:lstStyle>
           <a:p>
             <a:r>
-              <a:rPr lang="da-DK" dirty="0" err="1"/>
-              <a:t>AFgrænsning</a:t>
-            </a:r>
-            <a:endParaRPr lang="da-DK" dirty="0"/>
+              <a:rPr lang="da-DK" dirty="0"/>
+              <a:t>Afgrænsning</a:t>
+            </a:r>
           </a:p>
         </p:txBody>
       </p:sp>
@@ -16879,23 +16862,7 @@
             </a:pPr>
             <a:r>
               <a:rPr lang="da-DK" sz="2400" dirty="0"/>
-              <a:t>Hvad bliver der </a:t>
-            </a:r>
-            <a:r>
-              <a:rPr lang="da-DK" sz="2400" dirty="0" err="1"/>
-              <a:t>idag</a:t>
-            </a:r>
-            <a:r>
-              <a:rPr lang="da-DK" sz="2400" dirty="0"/>
-              <a:t> gjort for at </a:t>
-            </a:r>
-            <a:r>
-              <a:rPr lang="da-DK" sz="2400" dirty="0" err="1"/>
-              <a:t>forebyggge</a:t>
-            </a:r>
-            <a:r>
-              <a:rPr lang="da-DK" sz="2400" dirty="0"/>
-              <a:t> imod og helbrede de omtalte sygdomme?</a:t>
+              <a:t>Hvad bliver der i dag gjort for at forebygge imod og helbrede de omtalte sygdomme?</a:t>
             </a:r>
           </a:p>
           <a:p>
@@ -17017,15 +16984,7 @@
           <a:p>
             <a:r>
               <a:rPr lang="da-DK" sz="2000" dirty="0"/>
-              <a:t>World Health Organization. (2019). Malaria. [online]. </a:t>
-            </a:r>
-            <a:r>
-              <a:rPr lang="da-DK" sz="2000" dirty="0" err="1"/>
-              <a:t>Available</a:t>
-            </a:r>
-            <a:r>
-              <a:rPr lang="da-DK" sz="2000" dirty="0"/>
-              <a:t> at: </a:t>
+              <a:t>World Health Organization. (2019). Malaria. [online]. Available at: </a:t>
             </a:r>
             <a:r>
               <a:rPr lang="da-DK" sz="2000" u="sng" dirty="0">
@@ -17035,15 +16994,7 @@
             </a:r>
             <a:r>
               <a:rPr lang="da-DK" sz="2000" dirty="0"/>
-              <a:t> [</a:t>
-            </a:r>
-            <a:r>
-              <a:rPr lang="da-DK" sz="2000" dirty="0" err="1"/>
-              <a:t>Accessed</a:t>
-            </a:r>
-            <a:r>
-              <a:rPr lang="da-DK" sz="2000" dirty="0"/>
-              <a:t> 08/10-2019]</a:t>
+              <a:t> [Accessed 08/10-2019]</a:t>
             </a:r>
           </a:p>
         </p:txBody>
@@ -17106,15 +17057,7 @@
           <a:p>
             <a:r>
               <a:rPr lang="da-DK" sz="2000" dirty="0"/>
-              <a:t>World Health Organization. (2017). Global Hepatitis Report. [online]. </a:t>
-            </a:r>
-            <a:r>
-              <a:rPr lang="da-DK" sz="2000" dirty="0" err="1"/>
-              <a:t>Available</a:t>
-            </a:r>
-            <a:r>
-              <a:rPr lang="da-DK" sz="2000" dirty="0"/>
-              <a:t> at: </a:t>
+              <a:t>World Health Organization. (2017). Global Hepatitis Report. [online]. Available at: </a:t>
             </a:r>
             <a:r>
               <a:rPr lang="en-US" sz="2000" u="sng" dirty="0">
@@ -17127,15 +17070,7 @@
           <a:p>
             <a:r>
               <a:rPr lang="da-DK" sz="2000" dirty="0"/>
-              <a:t>[</a:t>
-            </a:r>
-            <a:r>
-              <a:rPr lang="da-DK" sz="2000" dirty="0" err="1"/>
-              <a:t>Accessed</a:t>
-            </a:r>
-            <a:r>
-              <a:rPr lang="da-DK" sz="2000" dirty="0"/>
-              <a:t> 08/10-2019]</a:t>
+              <a:t>[Accessed 08/10-2019]</a:t>
             </a:r>
           </a:p>
           <a:p>
@@ -17454,21 +17389,7 @@
                 <a:latin typeface="Arial" panose="020B0604020202020204" pitchFamily="34" charset="0"/>
                 <a:cs typeface="Arial" panose="020B0604020202020204" pitchFamily="34" charset="0"/>
               </a:rPr>
-              <a:t>Nogle årsager til at disse sygdomme stadig er at finde i særligt udsatte lande, er </a:t>
-            </a:r>
-            <a:r>
-              <a:rPr lang="da-DK" sz="2400" dirty="0" err="1">
-                <a:latin typeface="Arial" panose="020B0604020202020204" pitchFamily="34" charset="0"/>
-                <a:cs typeface="Arial" panose="020B0604020202020204" pitchFamily="34" charset="0"/>
-              </a:rPr>
-              <a:t>bla</a:t>
-            </a:r>
-            <a:r>
-              <a:rPr lang="da-DK" sz="2400" dirty="0">
-                <a:latin typeface="Arial" panose="020B0604020202020204" pitchFamily="34" charset="0"/>
-                <a:cs typeface="Arial" panose="020B0604020202020204" pitchFamily="34" charset="0"/>
-              </a:rPr>
-              <a:t>. dårligere sundhedssektor, og ringe mulighed for god sanitet. Derfor er der ikke adgang til forebyggende midler til at modarbejde en epidemi. Alle disse årsager underligger et måske større problem, netop fattigdom.</a:t>
+              <a:t>Nogle årsager til at disse sygdomme stadig er at finde i særligt udsatte lande, er bla. dårligere sundhedssektor, og ringe mulighed for god sanitet. Derfor er der ikke adgang til forebyggende midler til at modarbejde en epidemi. Alle disse årsager underligger et måske større problem, netop fattigdom.</a:t>
             </a:r>
           </a:p>
           <a:p>
@@ -19391,6 +19312,21 @@
 </file>
 
 <file path=customXml/item1.xml><?xml version="1.0" encoding="utf-8"?>
+<p:properties xmlns:p="http://schemas.microsoft.com/office/2006/metadata/properties" xmlns:xsi="http://www.w3.org/2001/XMLSchema-instance" xmlns:pc="http://schemas.microsoft.com/office/infopath/2007/PartnerControls">
+  <documentManagement/>
+</p:properties>
+</file>
+
+<file path=customXml/item2.xml><?xml version="1.0" encoding="utf-8"?>
+<?mso-contentType ?>
+<FormTemplates xmlns="http://schemas.microsoft.com/sharepoint/v3/contenttype/forms">
+  <Display>DocumentLibraryForm</Display>
+  <Edit>DocumentLibraryForm</Edit>
+  <New>DocumentLibraryForm</New>
+</FormTemplates>
+</file>
+
+<file path=customXml/item3.xml><?xml version="1.0" encoding="utf-8"?>
 <ct:contentTypeSchema xmlns:ct="http://schemas.microsoft.com/office/2006/metadata/contentType" xmlns:ma="http://schemas.microsoft.com/office/2006/metadata/properties/metaAttributes" ct:_="" ma:_="" ma:contentTypeName="Dokument" ma:contentTypeID="0x010100705BEAF5D872DA499823F797437E7341" ma:contentTypeVersion="11" ma:contentTypeDescription="Opret et nyt dokument." ma:contentTypeScope="" ma:versionID="5b73fa5b6c98d35d5010583208db5e3d">
   <xsd:schema xmlns:xsd="http://www.w3.org/2001/XMLSchema" xmlns:xs="http://www.w3.org/2001/XMLSchema" xmlns:p="http://schemas.microsoft.com/office/2006/metadata/properties" xmlns:ns3="c6bc709f-863b-49b4-8d11-9df04d7d8c8d" xmlns:ns4="c6cdbaf4-18b0-44f6-b873-cf97097531c9" targetNamespace="http://schemas.microsoft.com/office/2006/metadata/properties" ma:root="true" ma:fieldsID="0f876c6c951b769f902df5666974d9fc" ns3:_="" ns4:_="">
     <xsd:import namespace="c6bc709f-863b-49b4-8d11-9df04d7d8c8d"/>
@@ -19599,22 +19535,24 @@
 </ct:contentTypeSchema>
 </file>
 
-<file path=customXml/item2.xml><?xml version="1.0" encoding="utf-8"?>
-<?mso-contentType ?>
-<FormTemplates xmlns="http://schemas.microsoft.com/sharepoint/v3/contenttype/forms">
-  <Display>DocumentLibraryForm</Display>
-  <Edit>DocumentLibraryForm</Edit>
-  <New>DocumentLibraryForm</New>
-</FormTemplates>
+<file path=customXml/itemProps1.xml><?xml version="1.0" encoding="utf-8"?>
+<ds:datastoreItem xmlns:ds="http://schemas.openxmlformats.org/officeDocument/2006/customXml" ds:itemID="{1E4AACF7-51B1-41A0-AAF9-D883E2E86D45}">
+  <ds:schemaRefs>
+    <ds:schemaRef ds:uri="http://schemas.microsoft.com/office/2006/metadata/properties"/>
+    <ds:schemaRef ds:uri="http://schemas.microsoft.com/office/infopath/2007/PartnerControls"/>
+  </ds:schemaRefs>
+</ds:datastoreItem>
 </file>
 
-<file path=customXml/item3.xml><?xml version="1.0" encoding="utf-8"?>
-<p:properties xmlns:p="http://schemas.microsoft.com/office/2006/metadata/properties" xmlns:xsi="http://www.w3.org/2001/XMLSchema-instance" xmlns:pc="http://schemas.microsoft.com/office/infopath/2007/PartnerControls">
-  <documentManagement/>
-</p:properties>
+<file path=customXml/itemProps2.xml><?xml version="1.0" encoding="utf-8"?>
+<ds:datastoreItem xmlns:ds="http://schemas.openxmlformats.org/officeDocument/2006/customXml" ds:itemID="{CDCE3ED8-2D07-4BA2-9005-4F3ED3D7E6E9}">
+  <ds:schemaRefs>
+    <ds:schemaRef ds:uri="http://schemas.microsoft.com/sharepoint/v3/contenttype/forms"/>
+  </ds:schemaRefs>
+</ds:datastoreItem>
 </file>
 
-<file path=customXml/itemProps1.xml><?xml version="1.0" encoding="utf-8"?>
+<file path=customXml/itemProps3.xml><?xml version="1.0" encoding="utf-8"?>
 <ds:datastoreItem xmlns:ds="http://schemas.openxmlformats.org/officeDocument/2006/customXml" ds:itemID="{561C6F91-99F1-44F1-B641-38E1B491A886}">
   <ds:schemaRefs>
     <ds:schemaRef ds:uri="http://schemas.microsoft.com/office/2006/metadata/contentType"/>
@@ -19631,21 +19569,4 @@
     <ds:schemaRef ds:uri="http://schemas.microsoft.com/internal/obd"/>
   </ds:schemaRefs>
 </ds:datastoreItem>
-</file>
-
-<file path=customXml/itemProps2.xml><?xml version="1.0" encoding="utf-8"?>
-<ds:datastoreItem xmlns:ds="http://schemas.openxmlformats.org/officeDocument/2006/customXml" ds:itemID="{CDCE3ED8-2D07-4BA2-9005-4F3ED3D7E6E9}">
-  <ds:schemaRefs>
-    <ds:schemaRef ds:uri="http://schemas.microsoft.com/sharepoint/v3/contenttype/forms"/>
-  </ds:schemaRefs>
-</ds:datastoreItem>
-</file>
-
-<file path=customXml/itemProps3.xml><?xml version="1.0" encoding="utf-8"?>
-<ds:datastoreItem xmlns:ds="http://schemas.openxmlformats.org/officeDocument/2006/customXml" ds:itemID="{1E4AACF7-51B1-41A0-AAF9-D883E2E86D45}">
-  <ds:schemaRefs>
-    <ds:schemaRef ds:uri="http://schemas.microsoft.com/office/2006/metadata/properties"/>
-    <ds:schemaRef ds:uri="http://schemas.microsoft.com/office/infopath/2007/PartnerControls"/>
-  </ds:schemaRefs>
-</ds:datastoreItem>
 </file>
</xml_diff>

<commit_message>
Further slides on pptx
</commit_message>
<xml_diff>
--- a/Files/poster/Poster - Projektgrundlag.pptx
+++ b/Files/poster/Poster - Projektgrundlag.pptx
@@ -8,13 +8,16 @@
     <p:sldMasterId id="2147483690" r:id="rId7"/>
   </p:sldMasterIdLst>
   <p:notesMasterIdLst>
-    <p:notesMasterId r:id="rId9"/>
+    <p:notesMasterId r:id="rId12"/>
   </p:notesMasterIdLst>
   <p:handoutMasterIdLst>
-    <p:handoutMasterId r:id="rId10"/>
+    <p:handoutMasterId r:id="rId13"/>
   </p:handoutMasterIdLst>
   <p:sldIdLst>
     <p:sldId id="259" r:id="rId8"/>
+    <p:sldId id="261" r:id="rId9"/>
+    <p:sldId id="263" r:id="rId10"/>
+    <p:sldId id="262" r:id="rId11"/>
   </p:sldIdLst>
   <p:sldSz cx="42811700" cy="30275213"/>
   <p:notesSz cx="6858000" cy="9144000"/>
@@ -159,13 +162,672 @@
 <file path=ppt/revisionInfo.xml><?xml version="1.0" encoding="utf-8"?>
 <p1510:revInfo xmlns:a="http://schemas.openxmlformats.org/drawingml/2006/main" xmlns:r="http://schemas.openxmlformats.org/officeDocument/2006/relationships" xmlns:p1510="http://schemas.microsoft.com/office/powerpoint/2015/10/main">
   <p1510:revLst>
-    <p1510:client id="{83DB669E-0BFA-43AC-A42E-B405F69215A4}" v="72" dt="2019-10-10T10:38:34.152"/>
+    <p1510:client id="{E165F5EC-B84B-4672-9FC0-8C64705214A4}" v="17" dt="2019-11-12T12:33:30.013"/>
   </p1510:revLst>
 </p1510:revInfo>
 </file>
 
 <file path=ppt/changesInfos/changesInfo1.xml><?xml version="1.0" encoding="utf-8"?>
 <pc:chgInfo xmlns:a="http://schemas.openxmlformats.org/drawingml/2006/main" xmlns:r="http://schemas.openxmlformats.org/officeDocument/2006/relationships" xmlns:ac="http://schemas.microsoft.com/office/drawing/2013/main/command" xmlns:pc="http://schemas.microsoft.com/office/powerpoint/2013/main/command">
+  <pc:docChgLst>
+    <pc:chgData name="Anders Wylardt Nielsen" userId="e0ee3fc7cf27fac6" providerId="LiveId" clId="{E165F5EC-B84B-4672-9FC0-8C64705214A4}"/>
+    <pc:docChg chg="undo custSel addSld delSld modSld sldOrd">
+      <pc:chgData name="Anders Wylardt Nielsen" userId="e0ee3fc7cf27fac6" providerId="LiveId" clId="{E165F5EC-B84B-4672-9FC0-8C64705214A4}" dt="2019-11-12T12:36:43.642" v="172" actId="20577"/>
+      <pc:docMkLst>
+        <pc:docMk/>
+      </pc:docMkLst>
+      <pc:sldChg chg="ord">
+        <pc:chgData name="Anders Wylardt Nielsen" userId="e0ee3fc7cf27fac6" providerId="LiveId" clId="{E165F5EC-B84B-4672-9FC0-8C64705214A4}" dt="2019-11-12T12:12:29.429" v="0"/>
+        <pc:sldMkLst>
+          <pc:docMk/>
+          <pc:sldMk cId="1759635540" sldId="259"/>
+        </pc:sldMkLst>
+      </pc:sldChg>
+      <pc:sldChg chg="add del ord">
+        <pc:chgData name="Anders Wylardt Nielsen" userId="e0ee3fc7cf27fac6" providerId="LiveId" clId="{E165F5EC-B84B-4672-9FC0-8C64705214A4}" dt="2019-11-12T12:24:18.498" v="48" actId="47"/>
+        <pc:sldMkLst>
+          <pc:docMk/>
+          <pc:sldMk cId="3931671374" sldId="260"/>
+        </pc:sldMkLst>
+      </pc:sldChg>
+      <pc:sldChg chg="addSp delSp modSp add">
+        <pc:chgData name="Anders Wylardt Nielsen" userId="e0ee3fc7cf27fac6" providerId="LiveId" clId="{E165F5EC-B84B-4672-9FC0-8C64705214A4}" dt="2019-11-12T12:25:53.166" v="98" actId="1076"/>
+        <pc:sldMkLst>
+          <pc:docMk/>
+          <pc:sldMk cId="3260245620" sldId="261"/>
+        </pc:sldMkLst>
+        <pc:spChg chg="del mod">
+          <ac:chgData name="Anders Wylardt Nielsen" userId="e0ee3fc7cf27fac6" providerId="LiveId" clId="{E165F5EC-B84B-4672-9FC0-8C64705214A4}" dt="2019-11-12T12:22:23.619" v="5" actId="478"/>
+          <ac:spMkLst>
+            <pc:docMk/>
+            <pc:sldMk cId="3260245620" sldId="261"/>
+            <ac:spMk id="3" creationId="{00000000-0000-0000-0000-000000000000}"/>
+          </ac:spMkLst>
+        </pc:spChg>
+        <pc:spChg chg="del">
+          <ac:chgData name="Anders Wylardt Nielsen" userId="e0ee3fc7cf27fac6" providerId="LiveId" clId="{E165F5EC-B84B-4672-9FC0-8C64705214A4}" dt="2019-11-12T12:22:25.444" v="6" actId="478"/>
+          <ac:spMkLst>
+            <pc:docMk/>
+            <pc:sldMk cId="3260245620" sldId="261"/>
+            <ac:spMk id="4" creationId="{00000000-0000-0000-0000-000000000000}"/>
+          </ac:spMkLst>
+        </pc:spChg>
+        <pc:spChg chg="del">
+          <ac:chgData name="Anders Wylardt Nielsen" userId="e0ee3fc7cf27fac6" providerId="LiveId" clId="{E165F5EC-B84B-4672-9FC0-8C64705214A4}" dt="2019-11-12T12:22:27.622" v="8" actId="478"/>
+          <ac:spMkLst>
+            <pc:docMk/>
+            <pc:sldMk cId="3260245620" sldId="261"/>
+            <ac:spMk id="6" creationId="{00000000-0000-0000-0000-000000000000}"/>
+          </ac:spMkLst>
+        </pc:spChg>
+        <pc:spChg chg="del">
+          <ac:chgData name="Anders Wylardt Nielsen" userId="e0ee3fc7cf27fac6" providerId="LiveId" clId="{E165F5EC-B84B-4672-9FC0-8C64705214A4}" dt="2019-11-12T12:23:00.685" v="24" actId="478"/>
+          <ac:spMkLst>
+            <pc:docMk/>
+            <pc:sldMk cId="3260245620" sldId="261"/>
+            <ac:spMk id="7" creationId="{00000000-0000-0000-0000-000000000000}"/>
+          </ac:spMkLst>
+        </pc:spChg>
+        <pc:spChg chg="del">
+          <ac:chgData name="Anders Wylardt Nielsen" userId="e0ee3fc7cf27fac6" providerId="LiveId" clId="{E165F5EC-B84B-4672-9FC0-8C64705214A4}" dt="2019-11-12T12:22:53.505" v="22" actId="478"/>
+          <ac:spMkLst>
+            <pc:docMk/>
+            <pc:sldMk cId="3260245620" sldId="261"/>
+            <ac:spMk id="8" creationId="{00000000-0000-0000-0000-000000000000}"/>
+          </ac:spMkLst>
+        </pc:spChg>
+        <pc:spChg chg="del">
+          <ac:chgData name="Anders Wylardt Nielsen" userId="e0ee3fc7cf27fac6" providerId="LiveId" clId="{E165F5EC-B84B-4672-9FC0-8C64705214A4}" dt="2019-11-12T12:23:13.610" v="33" actId="478"/>
+          <ac:spMkLst>
+            <pc:docMk/>
+            <pc:sldMk cId="3260245620" sldId="261"/>
+            <ac:spMk id="9" creationId="{00000000-0000-0000-0000-000000000000}"/>
+          </ac:spMkLst>
+        </pc:spChg>
+        <pc:spChg chg="del">
+          <ac:chgData name="Anders Wylardt Nielsen" userId="e0ee3fc7cf27fac6" providerId="LiveId" clId="{E165F5EC-B84B-4672-9FC0-8C64705214A4}" dt="2019-11-12T12:23:25.780" v="38" actId="478"/>
+          <ac:spMkLst>
+            <pc:docMk/>
+            <pc:sldMk cId="3260245620" sldId="261"/>
+            <ac:spMk id="10" creationId="{00000000-0000-0000-0000-000000000000}"/>
+          </ac:spMkLst>
+        </pc:spChg>
+        <pc:spChg chg="del mod">
+          <ac:chgData name="Anders Wylardt Nielsen" userId="e0ee3fc7cf27fac6" providerId="LiveId" clId="{E165F5EC-B84B-4672-9FC0-8C64705214A4}" dt="2019-11-12T12:22:29.669" v="10" actId="478"/>
+          <ac:spMkLst>
+            <pc:docMk/>
+            <pc:sldMk cId="3260245620" sldId="261"/>
+            <ac:spMk id="11" creationId="{00000000-0000-0000-0000-000000000000}"/>
+          </ac:spMkLst>
+        </pc:spChg>
+        <pc:spChg chg="add del mod">
+          <ac:chgData name="Anders Wylardt Nielsen" userId="e0ee3fc7cf27fac6" providerId="LiveId" clId="{E165F5EC-B84B-4672-9FC0-8C64705214A4}" dt="2019-11-12T12:22:26.549" v="7" actId="478"/>
+          <ac:spMkLst>
+            <pc:docMk/>
+            <pc:sldMk cId="3260245620" sldId="261"/>
+            <ac:spMk id="12" creationId="{AE8284A9-4BFF-46CA-B819-6B1DE94EA874}"/>
+          </ac:spMkLst>
+        </pc:spChg>
+        <pc:spChg chg="del">
+          <ac:chgData name="Anders Wylardt Nielsen" userId="e0ee3fc7cf27fac6" providerId="LiveId" clId="{E165F5EC-B84B-4672-9FC0-8C64705214A4}" dt="2019-11-12T12:22:43.266" v="15" actId="478"/>
+          <ac:spMkLst>
+            <pc:docMk/>
+            <pc:sldMk cId="3260245620" sldId="261"/>
+            <ac:spMk id="13" creationId="{00000000-0000-0000-0000-000000000000}"/>
+          </ac:spMkLst>
+        </pc:spChg>
+        <pc:spChg chg="del">
+          <ac:chgData name="Anders Wylardt Nielsen" userId="e0ee3fc7cf27fac6" providerId="LiveId" clId="{E165F5EC-B84B-4672-9FC0-8C64705214A4}" dt="2019-11-12T12:22:33.340" v="12" actId="478"/>
+          <ac:spMkLst>
+            <pc:docMk/>
+            <pc:sldMk cId="3260245620" sldId="261"/>
+            <ac:spMk id="14" creationId="{00000000-0000-0000-0000-000000000000}"/>
+          </ac:spMkLst>
+        </pc:spChg>
+        <pc:spChg chg="del mod">
+          <ac:chgData name="Anders Wylardt Nielsen" userId="e0ee3fc7cf27fac6" providerId="LiveId" clId="{E165F5EC-B84B-4672-9FC0-8C64705214A4}" dt="2019-11-12T12:23:19.922" v="36" actId="478"/>
+          <ac:spMkLst>
+            <pc:docMk/>
+            <pc:sldMk cId="3260245620" sldId="261"/>
+            <ac:spMk id="15" creationId="{00000000-0000-0000-0000-000000000000}"/>
+          </ac:spMkLst>
+        </pc:spChg>
+        <pc:spChg chg="add del mod">
+          <ac:chgData name="Anders Wylardt Nielsen" userId="e0ee3fc7cf27fac6" providerId="LiveId" clId="{E165F5EC-B84B-4672-9FC0-8C64705214A4}" dt="2019-11-12T12:22:30.872" v="11" actId="478"/>
+          <ac:spMkLst>
+            <pc:docMk/>
+            <pc:sldMk cId="3260245620" sldId="261"/>
+            <ac:spMk id="17" creationId="{D3E3FD7E-A7D6-46BD-8F09-FBB8FB4EFADF}"/>
+          </ac:spMkLst>
+        </pc:spChg>
+        <pc:spChg chg="del mod">
+          <ac:chgData name="Anders Wylardt Nielsen" userId="e0ee3fc7cf27fac6" providerId="LiveId" clId="{E165F5EC-B84B-4672-9FC0-8C64705214A4}" dt="2019-11-12T12:23:27.624" v="41" actId="478"/>
+          <ac:spMkLst>
+            <pc:docMk/>
+            <pc:sldMk cId="3260245620" sldId="261"/>
+            <ac:spMk id="21" creationId="{00000000-0000-0000-0000-000000000000}"/>
+          </ac:spMkLst>
+        </pc:spChg>
+        <pc:spChg chg="add del mod">
+          <ac:chgData name="Anders Wylardt Nielsen" userId="e0ee3fc7cf27fac6" providerId="LiveId" clId="{E165F5EC-B84B-4672-9FC0-8C64705214A4}" dt="2019-11-12T12:22:40.260" v="13" actId="478"/>
+          <ac:spMkLst>
+            <pc:docMk/>
+            <pc:sldMk cId="3260245620" sldId="261"/>
+            <ac:spMk id="22" creationId="{47C33F6A-F65C-42DD-9172-A1C979988FB4}"/>
+          </ac:spMkLst>
+        </pc:spChg>
+        <pc:spChg chg="del">
+          <ac:chgData name="Anders Wylardt Nielsen" userId="e0ee3fc7cf27fac6" providerId="LiveId" clId="{E165F5EC-B84B-4672-9FC0-8C64705214A4}" dt="2019-11-12T12:23:02.529" v="26" actId="478"/>
+          <ac:spMkLst>
+            <pc:docMk/>
+            <pc:sldMk cId="3260245620" sldId="261"/>
+            <ac:spMk id="23" creationId="{00000000-0000-0000-0000-000000000000}"/>
+          </ac:spMkLst>
+        </pc:spChg>
+        <pc:spChg chg="add del mod">
+          <ac:chgData name="Anders Wylardt Nielsen" userId="e0ee3fc7cf27fac6" providerId="LiveId" clId="{E165F5EC-B84B-4672-9FC0-8C64705214A4}" dt="2019-11-12T12:23:04.110" v="27" actId="478"/>
+          <ac:spMkLst>
+            <pc:docMk/>
+            <pc:sldMk cId="3260245620" sldId="261"/>
+            <ac:spMk id="26" creationId="{F9437302-F9B6-4DC2-BD61-08FE221954B7}"/>
+          </ac:spMkLst>
+        </pc:spChg>
+        <pc:spChg chg="del">
+          <ac:chgData name="Anders Wylardt Nielsen" userId="e0ee3fc7cf27fac6" providerId="LiveId" clId="{E165F5EC-B84B-4672-9FC0-8C64705214A4}" dt="2019-11-12T12:22:49.698" v="20" actId="478"/>
+          <ac:spMkLst>
+            <pc:docMk/>
+            <pc:sldMk cId="3260245620" sldId="261"/>
+            <ac:spMk id="27" creationId="{4E6B3EF5-F7EA-40A7-B69C-D5C4C61593C9}"/>
+          </ac:spMkLst>
+        </pc:spChg>
+        <pc:spChg chg="del mod">
+          <ac:chgData name="Anders Wylardt Nielsen" userId="e0ee3fc7cf27fac6" providerId="LiveId" clId="{E165F5EC-B84B-4672-9FC0-8C64705214A4}" dt="2019-11-12T12:22:46.699" v="17" actId="478"/>
+          <ac:spMkLst>
+            <pc:docMk/>
+            <pc:sldMk cId="3260245620" sldId="261"/>
+            <ac:spMk id="28" creationId="{B214E0A7-7F9D-4998-94E9-395A8B4BF39F}"/>
+          </ac:spMkLst>
+        </pc:spChg>
+        <pc:spChg chg="del">
+          <ac:chgData name="Anders Wylardt Nielsen" userId="e0ee3fc7cf27fac6" providerId="LiveId" clId="{E165F5EC-B84B-4672-9FC0-8C64705214A4}" dt="2019-11-12T12:23:31.697" v="43" actId="478"/>
+          <ac:spMkLst>
+            <pc:docMk/>
+            <pc:sldMk cId="3260245620" sldId="261"/>
+            <ac:spMk id="30" creationId="{E2B7DE94-FABB-454B-887C-DE796276B67C}"/>
+          </ac:spMkLst>
+        </pc:spChg>
+        <pc:spChg chg="del">
+          <ac:chgData name="Anders Wylardt Nielsen" userId="e0ee3fc7cf27fac6" providerId="LiveId" clId="{E165F5EC-B84B-4672-9FC0-8C64705214A4}" dt="2019-11-12T12:22:51.746" v="21" actId="478"/>
+          <ac:spMkLst>
+            <pc:docMk/>
+            <pc:sldMk cId="3260245620" sldId="261"/>
+            <ac:spMk id="32" creationId="{CD6FFC6C-AF2A-4DE1-9C0E-BE7B79DC5C93}"/>
+          </ac:spMkLst>
+        </pc:spChg>
+        <pc:spChg chg="del">
+          <ac:chgData name="Anders Wylardt Nielsen" userId="e0ee3fc7cf27fac6" providerId="LiveId" clId="{E165F5EC-B84B-4672-9FC0-8C64705214A4}" dt="2019-11-12T12:23:05.163" v="28" actId="478"/>
+          <ac:spMkLst>
+            <pc:docMk/>
+            <pc:sldMk cId="3260245620" sldId="261"/>
+            <ac:spMk id="33" creationId="{E8731A41-88C1-4330-8B18-F8A882F4E1F5}"/>
+          </ac:spMkLst>
+        </pc:spChg>
+        <pc:spChg chg="del">
+          <ac:chgData name="Anders Wylardt Nielsen" userId="e0ee3fc7cf27fac6" providerId="LiveId" clId="{E165F5EC-B84B-4672-9FC0-8C64705214A4}" dt="2019-11-12T12:23:08.163" v="30" actId="478"/>
+          <ac:spMkLst>
+            <pc:docMk/>
+            <pc:sldMk cId="3260245620" sldId="261"/>
+            <ac:spMk id="34" creationId="{FC10DE74-F53F-479E-8AFF-1C635C3C9975}"/>
+          </ac:spMkLst>
+        </pc:spChg>
+        <pc:spChg chg="add del mod">
+          <ac:chgData name="Anders Wylardt Nielsen" userId="e0ee3fc7cf27fac6" providerId="LiveId" clId="{E165F5EC-B84B-4672-9FC0-8C64705214A4}" dt="2019-11-12T12:22:47.670" v="18" actId="478"/>
+          <ac:spMkLst>
+            <pc:docMk/>
+            <pc:sldMk cId="3260245620" sldId="261"/>
+            <ac:spMk id="37" creationId="{56BCE6DC-F0C1-4523-B97F-D2893EC04285}"/>
+          </ac:spMkLst>
+        </pc:spChg>
+        <pc:spChg chg="add del mod">
+          <ac:chgData name="Anders Wylardt Nielsen" userId="e0ee3fc7cf27fac6" providerId="LiveId" clId="{E165F5EC-B84B-4672-9FC0-8C64705214A4}" dt="2019-11-12T12:22:48.627" v="19" actId="478"/>
+          <ac:spMkLst>
+            <pc:docMk/>
+            <pc:sldMk cId="3260245620" sldId="261"/>
+            <ac:spMk id="40" creationId="{2C565070-0AD9-4117-AE9D-7D3375CE245F}"/>
+          </ac:spMkLst>
+        </pc:spChg>
+        <pc:spChg chg="add del mod">
+          <ac:chgData name="Anders Wylardt Nielsen" userId="e0ee3fc7cf27fac6" providerId="LiveId" clId="{E165F5EC-B84B-4672-9FC0-8C64705214A4}" dt="2019-11-12T12:22:57.348" v="23" actId="478"/>
+          <ac:spMkLst>
+            <pc:docMk/>
+            <pc:sldMk cId="3260245620" sldId="261"/>
+            <ac:spMk id="43" creationId="{0FBC01A8-CBEF-416F-8E5B-D91E280C25C4}"/>
+          </ac:spMkLst>
+        </pc:spChg>
+        <pc:spChg chg="add del mod">
+          <ac:chgData name="Anders Wylardt Nielsen" userId="e0ee3fc7cf27fac6" providerId="LiveId" clId="{E165F5EC-B84B-4672-9FC0-8C64705214A4}" dt="2019-11-12T12:23:07.789" v="29" actId="478"/>
+          <ac:spMkLst>
+            <pc:docMk/>
+            <pc:sldMk cId="3260245620" sldId="261"/>
+            <ac:spMk id="45" creationId="{2C00A801-6727-4204-9DF3-B28A160B767F}"/>
+          </ac:spMkLst>
+        </pc:spChg>
+        <pc:spChg chg="add del mod">
+          <ac:chgData name="Anders Wylardt Nielsen" userId="e0ee3fc7cf27fac6" providerId="LiveId" clId="{E165F5EC-B84B-4672-9FC0-8C64705214A4}" dt="2019-11-12T12:23:09.723" v="31" actId="478"/>
+          <ac:spMkLst>
+            <pc:docMk/>
+            <pc:sldMk cId="3260245620" sldId="261"/>
+            <ac:spMk id="47" creationId="{BF658C59-FFBE-46CD-8497-0267251FB908}"/>
+          </ac:spMkLst>
+        </pc:spChg>
+        <pc:spChg chg="add del mod">
+          <ac:chgData name="Anders Wylardt Nielsen" userId="e0ee3fc7cf27fac6" providerId="LiveId" clId="{E165F5EC-B84B-4672-9FC0-8C64705214A4}" dt="2019-11-12T12:23:15.758" v="34" actId="478"/>
+          <ac:spMkLst>
+            <pc:docMk/>
+            <pc:sldMk cId="3260245620" sldId="261"/>
+            <ac:spMk id="49" creationId="{3E5C89DB-1F11-496F-9E72-DEE45A9850C7}"/>
+          </ac:spMkLst>
+        </pc:spChg>
+        <pc:spChg chg="add del mod">
+          <ac:chgData name="Anders Wylardt Nielsen" userId="e0ee3fc7cf27fac6" providerId="LiveId" clId="{E165F5EC-B84B-4672-9FC0-8C64705214A4}" dt="2019-11-12T12:23:24.041" v="37" actId="478"/>
+          <ac:spMkLst>
+            <pc:docMk/>
+            <pc:sldMk cId="3260245620" sldId="261"/>
+            <ac:spMk id="51" creationId="{4749166F-DC22-49A3-84E1-AFEF0E539A1B}"/>
+          </ac:spMkLst>
+        </pc:spChg>
+        <pc:spChg chg="add del mod">
+          <ac:chgData name="Anders Wylardt Nielsen" userId="e0ee3fc7cf27fac6" providerId="LiveId" clId="{E165F5EC-B84B-4672-9FC0-8C64705214A4}" dt="2019-11-12T12:23:29.698" v="42" actId="478"/>
+          <ac:spMkLst>
+            <pc:docMk/>
+            <pc:sldMk cId="3260245620" sldId="261"/>
+            <ac:spMk id="53" creationId="{DD298D7D-907A-4E44-913D-F7AEA75FA955}"/>
+          </ac:spMkLst>
+        </pc:spChg>
+        <pc:spChg chg="add del mod">
+          <ac:chgData name="Anders Wylardt Nielsen" userId="e0ee3fc7cf27fac6" providerId="LiveId" clId="{E165F5EC-B84B-4672-9FC0-8C64705214A4}" dt="2019-11-12T12:23:33.812" v="44" actId="478"/>
+          <ac:spMkLst>
+            <pc:docMk/>
+            <pc:sldMk cId="3260245620" sldId="261"/>
+            <ac:spMk id="55" creationId="{09C963CB-3728-43E7-B1F4-013057E877FA}"/>
+          </ac:spMkLst>
+        </pc:spChg>
+        <pc:picChg chg="del">
+          <ac:chgData name="Anders Wylardt Nielsen" userId="e0ee3fc7cf27fac6" providerId="LiveId" clId="{E165F5EC-B84B-4672-9FC0-8C64705214A4}" dt="2019-11-12T12:23:01.661" v="25" actId="478"/>
+          <ac:picMkLst>
+            <pc:docMk/>
+            <pc:sldMk cId="3260245620" sldId="261"/>
+            <ac:picMk id="36" creationId="{00000000-0000-0000-0000-000000000000}"/>
+          </ac:picMkLst>
+        </pc:picChg>
+        <pc:picChg chg="del">
+          <ac:chgData name="Anders Wylardt Nielsen" userId="e0ee3fc7cf27fac6" providerId="LiveId" clId="{E165F5EC-B84B-4672-9FC0-8C64705214A4}" dt="2019-11-12T12:23:10.426" v="32" actId="478"/>
+          <ac:picMkLst>
+            <pc:docMk/>
+            <pc:sldMk cId="3260245620" sldId="261"/>
+            <ac:picMk id="38" creationId="{0CE76C7F-7DAA-4615-93E2-154F5F2A3263}"/>
+          </ac:picMkLst>
+        </pc:picChg>
+        <pc:picChg chg="add mod">
+          <ac:chgData name="Anders Wylardt Nielsen" userId="e0ee3fc7cf27fac6" providerId="LiveId" clId="{E165F5EC-B84B-4672-9FC0-8C64705214A4}" dt="2019-11-12T12:25:53.166" v="98" actId="1076"/>
+          <ac:picMkLst>
+            <pc:docMk/>
+            <pc:sldMk cId="3260245620" sldId="261"/>
+            <ac:picMk id="58" creationId="{EAB34BC8-3C5D-4CAD-8574-792900AA53C8}"/>
+          </ac:picMkLst>
+        </pc:picChg>
+        <pc:picChg chg="del">
+          <ac:chgData name="Anders Wylardt Nielsen" userId="e0ee3fc7cf27fac6" providerId="LiveId" clId="{E165F5EC-B84B-4672-9FC0-8C64705214A4}" dt="2019-11-12T12:22:42.241" v="14" actId="478"/>
+          <ac:picMkLst>
+            <pc:docMk/>
+            <pc:sldMk cId="3260245620" sldId="261"/>
+            <ac:picMk id="2058" creationId="{17D210C4-D997-4A2C-A54C-FBA7B8A55D38}"/>
+          </ac:picMkLst>
+        </pc:picChg>
+      </pc:sldChg>
+      <pc:sldChg chg="add del">
+        <pc:chgData name="Anders Wylardt Nielsen" userId="e0ee3fc7cf27fac6" providerId="LiveId" clId="{E165F5EC-B84B-4672-9FC0-8C64705214A4}" dt="2019-11-12T12:24:10.673" v="46"/>
+        <pc:sldMkLst>
+          <pc:docMk/>
+          <pc:sldMk cId="289016676" sldId="262"/>
+        </pc:sldMkLst>
+      </pc:sldChg>
+      <pc:sldChg chg="addSp delSp modSp add">
+        <pc:chgData name="Anders Wylardt Nielsen" userId="e0ee3fc7cf27fac6" providerId="LiveId" clId="{E165F5EC-B84B-4672-9FC0-8C64705214A4}" dt="2019-11-12T12:31:28.423" v="108"/>
+        <pc:sldMkLst>
+          <pc:docMk/>
+          <pc:sldMk cId="1738105663" sldId="262"/>
+        </pc:sldMkLst>
+        <pc:spChg chg="del">
+          <ac:chgData name="Anders Wylardt Nielsen" userId="e0ee3fc7cf27fac6" providerId="LiveId" clId="{E165F5EC-B84B-4672-9FC0-8C64705214A4}" dt="2019-11-12T12:24:23.799" v="51" actId="478"/>
+          <ac:spMkLst>
+            <pc:docMk/>
+            <pc:sldMk cId="1738105663" sldId="262"/>
+            <ac:spMk id="3" creationId="{00000000-0000-0000-0000-000000000000}"/>
+          </ac:spMkLst>
+        </pc:spChg>
+        <pc:spChg chg="del mod">
+          <ac:chgData name="Anders Wylardt Nielsen" userId="e0ee3fc7cf27fac6" providerId="LiveId" clId="{E165F5EC-B84B-4672-9FC0-8C64705214A4}" dt="2019-11-12T12:24:24.837" v="54" actId="478"/>
+          <ac:spMkLst>
+            <pc:docMk/>
+            <pc:sldMk cId="1738105663" sldId="262"/>
+            <ac:spMk id="4" creationId="{00000000-0000-0000-0000-000000000000}"/>
+          </ac:spMkLst>
+        </pc:spChg>
+        <pc:spChg chg="del">
+          <ac:chgData name="Anders Wylardt Nielsen" userId="e0ee3fc7cf27fac6" providerId="LiveId" clId="{E165F5EC-B84B-4672-9FC0-8C64705214A4}" dt="2019-11-12T12:24:26.958" v="56" actId="478"/>
+          <ac:spMkLst>
+            <pc:docMk/>
+            <pc:sldMk cId="1738105663" sldId="262"/>
+            <ac:spMk id="6" creationId="{00000000-0000-0000-0000-000000000000}"/>
+          </ac:spMkLst>
+        </pc:spChg>
+        <pc:spChg chg="del">
+          <ac:chgData name="Anders Wylardt Nielsen" userId="e0ee3fc7cf27fac6" providerId="LiveId" clId="{E165F5EC-B84B-4672-9FC0-8C64705214A4}" dt="2019-11-12T12:24:54.414" v="76" actId="478"/>
+          <ac:spMkLst>
+            <pc:docMk/>
+            <pc:sldMk cId="1738105663" sldId="262"/>
+            <ac:spMk id="7" creationId="{00000000-0000-0000-0000-000000000000}"/>
+          </ac:spMkLst>
+        </pc:spChg>
+        <pc:spChg chg="del">
+          <ac:chgData name="Anders Wylardt Nielsen" userId="e0ee3fc7cf27fac6" providerId="LiveId" clId="{E165F5EC-B84B-4672-9FC0-8C64705214A4}" dt="2019-11-12T12:24:49.636" v="73" actId="478"/>
+          <ac:spMkLst>
+            <pc:docMk/>
+            <pc:sldMk cId="1738105663" sldId="262"/>
+            <ac:spMk id="8" creationId="{00000000-0000-0000-0000-000000000000}"/>
+          </ac:spMkLst>
+        </pc:spChg>
+        <pc:spChg chg="del">
+          <ac:chgData name="Anders Wylardt Nielsen" userId="e0ee3fc7cf27fac6" providerId="LiveId" clId="{E165F5EC-B84B-4672-9FC0-8C64705214A4}" dt="2019-11-12T12:25:05.847" v="86" actId="478"/>
+          <ac:spMkLst>
+            <pc:docMk/>
+            <pc:sldMk cId="1738105663" sldId="262"/>
+            <ac:spMk id="9" creationId="{00000000-0000-0000-0000-000000000000}"/>
+          </ac:spMkLst>
+        </pc:spChg>
+        <pc:spChg chg="del">
+          <ac:chgData name="Anders Wylardt Nielsen" userId="e0ee3fc7cf27fac6" providerId="LiveId" clId="{E165F5EC-B84B-4672-9FC0-8C64705214A4}" dt="2019-11-12T12:25:12.900" v="91" actId="478"/>
+          <ac:spMkLst>
+            <pc:docMk/>
+            <pc:sldMk cId="1738105663" sldId="262"/>
+            <ac:spMk id="10" creationId="{00000000-0000-0000-0000-000000000000}"/>
+          </ac:spMkLst>
+        </pc:spChg>
+        <pc:spChg chg="del mod">
+          <ac:chgData name="Anders Wylardt Nielsen" userId="e0ee3fc7cf27fac6" providerId="LiveId" clId="{E165F5EC-B84B-4672-9FC0-8C64705214A4}" dt="2019-11-12T12:24:30.120" v="60" actId="478"/>
+          <ac:spMkLst>
+            <pc:docMk/>
+            <pc:sldMk cId="1738105663" sldId="262"/>
+            <ac:spMk id="11" creationId="{00000000-0000-0000-0000-000000000000}"/>
+          </ac:spMkLst>
+        </pc:spChg>
+        <pc:spChg chg="add del mod">
+          <ac:chgData name="Anders Wylardt Nielsen" userId="e0ee3fc7cf27fac6" providerId="LiveId" clId="{E165F5EC-B84B-4672-9FC0-8C64705214A4}" dt="2019-11-12T12:24:24.186" v="52" actId="478"/>
+          <ac:spMkLst>
+            <pc:docMk/>
+            <pc:sldMk cId="1738105663" sldId="262"/>
+            <ac:spMk id="12" creationId="{AC277EE1-77CF-43CD-A316-735834D8C737}"/>
+          </ac:spMkLst>
+        </pc:spChg>
+        <pc:spChg chg="del">
+          <ac:chgData name="Anders Wylardt Nielsen" userId="e0ee3fc7cf27fac6" providerId="LiveId" clId="{E165F5EC-B84B-4672-9FC0-8C64705214A4}" dt="2019-11-12T12:24:35.461" v="64" actId="478"/>
+          <ac:spMkLst>
+            <pc:docMk/>
+            <pc:sldMk cId="1738105663" sldId="262"/>
+            <ac:spMk id="13" creationId="{00000000-0000-0000-0000-000000000000}"/>
+          </ac:spMkLst>
+        </pc:spChg>
+        <pc:spChg chg="del">
+          <ac:chgData name="Anders Wylardt Nielsen" userId="e0ee3fc7cf27fac6" providerId="LiveId" clId="{E165F5EC-B84B-4672-9FC0-8C64705214A4}" dt="2019-11-12T12:24:52.718" v="75" actId="478"/>
+          <ac:spMkLst>
+            <pc:docMk/>
+            <pc:sldMk cId="1738105663" sldId="262"/>
+            <ac:spMk id="14" creationId="{00000000-0000-0000-0000-000000000000}"/>
+          </ac:spMkLst>
+        </pc:spChg>
+        <pc:spChg chg="del">
+          <ac:chgData name="Anders Wylardt Nielsen" userId="e0ee3fc7cf27fac6" providerId="LiveId" clId="{E165F5EC-B84B-4672-9FC0-8C64705214A4}" dt="2019-11-12T12:25:09.295" v="88" actId="478"/>
+          <ac:spMkLst>
+            <pc:docMk/>
+            <pc:sldMk cId="1738105663" sldId="262"/>
+            <ac:spMk id="15" creationId="{00000000-0000-0000-0000-000000000000}"/>
+          </ac:spMkLst>
+        </pc:spChg>
+        <pc:spChg chg="add del mod">
+          <ac:chgData name="Anders Wylardt Nielsen" userId="e0ee3fc7cf27fac6" providerId="LiveId" clId="{E165F5EC-B84B-4672-9FC0-8C64705214A4}" dt="2019-11-12T12:24:25.651" v="55" actId="478"/>
+          <ac:spMkLst>
+            <pc:docMk/>
+            <pc:sldMk cId="1738105663" sldId="262"/>
+            <ac:spMk id="17" creationId="{DF838748-30B5-480F-BB68-12D4F73DB064}"/>
+          </ac:spMkLst>
+        </pc:spChg>
+        <pc:spChg chg="del">
+          <ac:chgData name="Anders Wylardt Nielsen" userId="e0ee3fc7cf27fac6" providerId="LiveId" clId="{E165F5EC-B84B-4672-9FC0-8C64705214A4}" dt="2019-11-12T12:25:11.901" v="90" actId="478"/>
+          <ac:spMkLst>
+            <pc:docMk/>
+            <pc:sldMk cId="1738105663" sldId="262"/>
+            <ac:spMk id="21" creationId="{00000000-0000-0000-0000-000000000000}"/>
+          </ac:spMkLst>
+        </pc:spChg>
+        <pc:spChg chg="add del mod">
+          <ac:chgData name="Anders Wylardt Nielsen" userId="e0ee3fc7cf27fac6" providerId="LiveId" clId="{E165F5EC-B84B-4672-9FC0-8C64705214A4}" dt="2019-11-12T12:24:32.182" v="61" actId="478"/>
+          <ac:spMkLst>
+            <pc:docMk/>
+            <pc:sldMk cId="1738105663" sldId="262"/>
+            <ac:spMk id="22" creationId="{51A14399-1880-4AA8-98B8-286D93A9DCCE}"/>
+          </ac:spMkLst>
+        </pc:spChg>
+        <pc:spChg chg="del">
+          <ac:chgData name="Anders Wylardt Nielsen" userId="e0ee3fc7cf27fac6" providerId="LiveId" clId="{E165F5EC-B84B-4672-9FC0-8C64705214A4}" dt="2019-11-12T12:24:56.229" v="78" actId="478"/>
+          <ac:spMkLst>
+            <pc:docMk/>
+            <pc:sldMk cId="1738105663" sldId="262"/>
+            <ac:spMk id="23" creationId="{00000000-0000-0000-0000-000000000000}"/>
+          </ac:spMkLst>
+        </pc:spChg>
+        <pc:spChg chg="add del mod">
+          <ac:chgData name="Anders Wylardt Nielsen" userId="e0ee3fc7cf27fac6" providerId="LiveId" clId="{E165F5EC-B84B-4672-9FC0-8C64705214A4}" dt="2019-11-12T12:24:33.334" v="62" actId="478"/>
+          <ac:spMkLst>
+            <pc:docMk/>
+            <pc:sldMk cId="1738105663" sldId="262"/>
+            <ac:spMk id="26" creationId="{7F0486C6-318A-44F7-8C92-6C6549FC795F}"/>
+          </ac:spMkLst>
+        </pc:spChg>
+        <pc:spChg chg="del mod">
+          <ac:chgData name="Anders Wylardt Nielsen" userId="e0ee3fc7cf27fac6" providerId="LiveId" clId="{E165F5EC-B84B-4672-9FC0-8C64705214A4}" dt="2019-11-12T12:24:44.539" v="71" actId="478"/>
+          <ac:spMkLst>
+            <pc:docMk/>
+            <pc:sldMk cId="1738105663" sldId="262"/>
+            <ac:spMk id="27" creationId="{4E6B3EF5-F7EA-40A7-B69C-D5C4C61593C9}"/>
+          </ac:spMkLst>
+        </pc:spChg>
+        <pc:spChg chg="del mod">
+          <ac:chgData name="Anders Wylardt Nielsen" userId="e0ee3fc7cf27fac6" providerId="LiveId" clId="{E165F5EC-B84B-4672-9FC0-8C64705214A4}" dt="2019-11-12T12:24:40.620" v="67" actId="478"/>
+          <ac:spMkLst>
+            <pc:docMk/>
+            <pc:sldMk cId="1738105663" sldId="262"/>
+            <ac:spMk id="28" creationId="{B214E0A7-7F9D-4998-94E9-395A8B4BF39F}"/>
+          </ac:spMkLst>
+        </pc:spChg>
+        <pc:spChg chg="del">
+          <ac:chgData name="Anders Wylardt Nielsen" userId="e0ee3fc7cf27fac6" providerId="LiveId" clId="{E165F5EC-B84B-4672-9FC0-8C64705214A4}" dt="2019-11-12T12:25:16.250" v="93" actId="478"/>
+          <ac:spMkLst>
+            <pc:docMk/>
+            <pc:sldMk cId="1738105663" sldId="262"/>
+            <ac:spMk id="30" creationId="{E2B7DE94-FABB-454B-887C-DE796276B67C}"/>
+          </ac:spMkLst>
+        </pc:spChg>
+        <pc:spChg chg="del">
+          <ac:chgData name="Anders Wylardt Nielsen" userId="e0ee3fc7cf27fac6" providerId="LiveId" clId="{E165F5EC-B84B-4672-9FC0-8C64705214A4}" dt="2019-11-12T12:24:47.283" v="72" actId="478"/>
+          <ac:spMkLst>
+            <pc:docMk/>
+            <pc:sldMk cId="1738105663" sldId="262"/>
+            <ac:spMk id="32" creationId="{CD6FFC6C-AF2A-4DE1-9C0E-BE7B79DC5C93}"/>
+          </ac:spMkLst>
+        </pc:spChg>
+        <pc:spChg chg="del">
+          <ac:chgData name="Anders Wylardt Nielsen" userId="e0ee3fc7cf27fac6" providerId="LiveId" clId="{E165F5EC-B84B-4672-9FC0-8C64705214A4}" dt="2019-11-12T12:24:58.378" v="80" actId="478"/>
+          <ac:spMkLst>
+            <pc:docMk/>
+            <pc:sldMk cId="1738105663" sldId="262"/>
+            <ac:spMk id="33" creationId="{E8731A41-88C1-4330-8B18-F8A882F4E1F5}"/>
+          </ac:spMkLst>
+        </pc:spChg>
+        <pc:spChg chg="del mod">
+          <ac:chgData name="Anders Wylardt Nielsen" userId="e0ee3fc7cf27fac6" providerId="LiveId" clId="{E165F5EC-B84B-4672-9FC0-8C64705214A4}" dt="2019-11-12T12:25:00.881" v="82" actId="478"/>
+          <ac:spMkLst>
+            <pc:docMk/>
+            <pc:sldMk cId="1738105663" sldId="262"/>
+            <ac:spMk id="34" creationId="{FC10DE74-F53F-479E-8AFF-1C635C3C9975}"/>
+          </ac:spMkLst>
+        </pc:spChg>
+        <pc:spChg chg="add del mod">
+          <ac:chgData name="Anders Wylardt Nielsen" userId="e0ee3fc7cf27fac6" providerId="LiveId" clId="{E165F5EC-B84B-4672-9FC0-8C64705214A4}" dt="2019-11-12T12:24:42.037" v="68" actId="478"/>
+          <ac:spMkLst>
+            <pc:docMk/>
+            <pc:sldMk cId="1738105663" sldId="262"/>
+            <ac:spMk id="37" creationId="{22EC7491-6A32-4F56-8747-73BA35AC3EED}"/>
+          </ac:spMkLst>
+        </pc:spChg>
+        <pc:spChg chg="add del mod">
+          <ac:chgData name="Anders Wylardt Nielsen" userId="e0ee3fc7cf27fac6" providerId="LiveId" clId="{E165F5EC-B84B-4672-9FC0-8C64705214A4}" dt="2019-11-12T12:24:42.527" v="69" actId="478"/>
+          <ac:spMkLst>
+            <pc:docMk/>
+            <pc:sldMk cId="1738105663" sldId="262"/>
+            <ac:spMk id="40" creationId="{D53ABF2F-D5EF-4536-85C8-AF9D79EA72CF}"/>
+          </ac:spMkLst>
+        </pc:spChg>
+        <pc:spChg chg="add del mod">
+          <ac:chgData name="Anders Wylardt Nielsen" userId="e0ee3fc7cf27fac6" providerId="LiveId" clId="{E165F5EC-B84B-4672-9FC0-8C64705214A4}" dt="2019-11-12T12:24:51.190" v="74" actId="478"/>
+          <ac:spMkLst>
+            <pc:docMk/>
+            <pc:sldMk cId="1738105663" sldId="262"/>
+            <ac:spMk id="43" creationId="{DEFEC3AF-5E12-4B1E-92D3-B641EE8CA3F6}"/>
+          </ac:spMkLst>
+        </pc:spChg>
+        <pc:spChg chg="add del mod">
+          <ac:chgData name="Anders Wylardt Nielsen" userId="e0ee3fc7cf27fac6" providerId="LiveId" clId="{E165F5EC-B84B-4672-9FC0-8C64705214A4}" dt="2019-11-12T12:24:57.291" v="79" actId="478"/>
+          <ac:spMkLst>
+            <pc:docMk/>
+            <pc:sldMk cId="1738105663" sldId="262"/>
+            <ac:spMk id="45" creationId="{A3064903-4D18-4258-82C0-74C22696C65C}"/>
+          </ac:spMkLst>
+        </pc:spChg>
+        <pc:spChg chg="add del mod">
+          <ac:chgData name="Anders Wylardt Nielsen" userId="e0ee3fc7cf27fac6" providerId="LiveId" clId="{E165F5EC-B84B-4672-9FC0-8C64705214A4}" dt="2019-11-12T12:25:01.836" v="83" actId="478"/>
+          <ac:spMkLst>
+            <pc:docMk/>
+            <pc:sldMk cId="1738105663" sldId="262"/>
+            <ac:spMk id="47" creationId="{5DD6A2AA-A595-42C9-A5FE-48C6DE6C49AE}"/>
+          </ac:spMkLst>
+        </pc:spChg>
+        <pc:spChg chg="add del mod">
+          <ac:chgData name="Anders Wylardt Nielsen" userId="e0ee3fc7cf27fac6" providerId="LiveId" clId="{E165F5EC-B84B-4672-9FC0-8C64705214A4}" dt="2019-11-12T12:25:04.144" v="84" actId="478"/>
+          <ac:spMkLst>
+            <pc:docMk/>
+            <pc:sldMk cId="1738105663" sldId="262"/>
+            <ac:spMk id="49" creationId="{3648B7F1-F0EC-4D30-9043-3D648CA24039}"/>
+          </ac:spMkLst>
+        </pc:spChg>
+        <pc:spChg chg="add del mod">
+          <ac:chgData name="Anders Wylardt Nielsen" userId="e0ee3fc7cf27fac6" providerId="LiveId" clId="{E165F5EC-B84B-4672-9FC0-8C64705214A4}" dt="2019-11-12T12:25:07.190" v="87" actId="478"/>
+          <ac:spMkLst>
+            <pc:docMk/>
+            <pc:sldMk cId="1738105663" sldId="262"/>
+            <ac:spMk id="51" creationId="{73A05EC7-28AF-43D9-8953-4EEFDD4F6C29}"/>
+          </ac:spMkLst>
+        </pc:spChg>
+        <pc:spChg chg="add del mod">
+          <ac:chgData name="Anders Wylardt Nielsen" userId="e0ee3fc7cf27fac6" providerId="LiveId" clId="{E165F5EC-B84B-4672-9FC0-8C64705214A4}" dt="2019-11-12T12:25:10.665" v="89" actId="478"/>
+          <ac:spMkLst>
+            <pc:docMk/>
+            <pc:sldMk cId="1738105663" sldId="262"/>
+            <ac:spMk id="53" creationId="{2DA3C264-EBDA-455B-BAE4-27BF6A8BE543}"/>
+          </ac:spMkLst>
+        </pc:spChg>
+        <pc:spChg chg="add del mod">
+          <ac:chgData name="Anders Wylardt Nielsen" userId="e0ee3fc7cf27fac6" providerId="LiveId" clId="{E165F5EC-B84B-4672-9FC0-8C64705214A4}" dt="2019-11-12T12:25:17.869" v="94" actId="478"/>
+          <ac:spMkLst>
+            <pc:docMk/>
+            <pc:sldMk cId="1738105663" sldId="262"/>
+            <ac:spMk id="55" creationId="{35470982-B8B6-4F98-83B2-ACC94D29905E}"/>
+          </ac:spMkLst>
+        </pc:spChg>
+        <pc:spChg chg="add del mod">
+          <ac:chgData name="Anders Wylardt Nielsen" userId="e0ee3fc7cf27fac6" providerId="LiveId" clId="{E165F5EC-B84B-4672-9FC0-8C64705214A4}" dt="2019-11-12T12:25:14.164" v="92" actId="478"/>
+          <ac:spMkLst>
+            <pc:docMk/>
+            <pc:sldMk cId="1738105663" sldId="262"/>
+            <ac:spMk id="57" creationId="{BBCCEAA6-C695-46FA-BECA-4ED8825F5404}"/>
+          </ac:spMkLst>
+        </pc:spChg>
+        <pc:picChg chg="del">
+          <ac:chgData name="Anders Wylardt Nielsen" userId="e0ee3fc7cf27fac6" providerId="LiveId" clId="{E165F5EC-B84B-4672-9FC0-8C64705214A4}" dt="2019-11-12T12:24:55.362" v="77" actId="478"/>
+          <ac:picMkLst>
+            <pc:docMk/>
+            <pc:sldMk cId="1738105663" sldId="262"/>
+            <ac:picMk id="36" creationId="{00000000-0000-0000-0000-000000000000}"/>
+          </ac:picMkLst>
+        </pc:picChg>
+        <pc:picChg chg="del">
+          <ac:chgData name="Anders Wylardt Nielsen" userId="e0ee3fc7cf27fac6" providerId="LiveId" clId="{E165F5EC-B84B-4672-9FC0-8C64705214A4}" dt="2019-11-12T12:25:05.165" v="85" actId="478"/>
+          <ac:picMkLst>
+            <pc:docMk/>
+            <pc:sldMk cId="1738105663" sldId="262"/>
+            <ac:picMk id="38" creationId="{0CE76C7F-7DAA-4615-93E2-154F5F2A3263}"/>
+          </ac:picMkLst>
+        </pc:picChg>
+        <pc:picChg chg="add mod">
+          <ac:chgData name="Anders Wylardt Nielsen" userId="e0ee3fc7cf27fac6" providerId="LiveId" clId="{E165F5EC-B84B-4672-9FC0-8C64705214A4}" dt="2019-11-12T12:26:54.257" v="106" actId="1076"/>
+          <ac:picMkLst>
+            <pc:docMk/>
+            <pc:sldMk cId="1738105663" sldId="262"/>
+            <ac:picMk id="59" creationId="{706BC0B8-6D93-498F-BA3C-A8F09F58617E}"/>
+          </ac:picMkLst>
+        </pc:picChg>
+        <pc:picChg chg="add del mod">
+          <ac:chgData name="Anders Wylardt Nielsen" userId="e0ee3fc7cf27fac6" providerId="LiveId" clId="{E165F5EC-B84B-4672-9FC0-8C64705214A4}" dt="2019-11-12T12:31:28.423" v="108"/>
+          <ac:picMkLst>
+            <pc:docMk/>
+            <pc:sldMk cId="1738105663" sldId="262"/>
+            <ac:picMk id="61" creationId="{9443E9BF-064A-47A9-8E99-5C094854D828}"/>
+          </ac:picMkLst>
+        </pc:picChg>
+        <pc:picChg chg="del">
+          <ac:chgData name="Anders Wylardt Nielsen" userId="e0ee3fc7cf27fac6" providerId="LiveId" clId="{E165F5EC-B84B-4672-9FC0-8C64705214A4}" dt="2019-11-12T12:24:34.313" v="63" actId="478"/>
+          <ac:picMkLst>
+            <pc:docMk/>
+            <pc:sldMk cId="1738105663" sldId="262"/>
+            <ac:picMk id="2058" creationId="{17D210C4-D997-4A2C-A54C-FBA7B8A55D38}"/>
+          </ac:picMkLst>
+        </pc:picChg>
+      </pc:sldChg>
+      <pc:sldChg chg="addSp delSp modSp add ord">
+        <pc:chgData name="Anders Wylardt Nielsen" userId="e0ee3fc7cf27fac6" providerId="LiveId" clId="{E165F5EC-B84B-4672-9FC0-8C64705214A4}" dt="2019-11-12T12:36:43.642" v="172" actId="20577"/>
+        <pc:sldMkLst>
+          <pc:docMk/>
+          <pc:sldMk cId="2927459263" sldId="263"/>
+        </pc:sldMkLst>
+        <pc:spChg chg="add mod">
+          <ac:chgData name="Anders Wylardt Nielsen" userId="e0ee3fc7cf27fac6" providerId="LiveId" clId="{E165F5EC-B84B-4672-9FC0-8C64705214A4}" dt="2019-11-12T12:36:43.642" v="172" actId="20577"/>
+          <ac:spMkLst>
+            <pc:docMk/>
+            <pc:sldMk cId="2927459263" sldId="263"/>
+            <ac:spMk id="3" creationId="{40F3FF29-4D23-4AAF-A6B0-1B6072595132}"/>
+          </ac:spMkLst>
+        </pc:spChg>
+        <pc:picChg chg="del">
+          <ac:chgData name="Anders Wylardt Nielsen" userId="e0ee3fc7cf27fac6" providerId="LiveId" clId="{E165F5EC-B84B-4672-9FC0-8C64705214A4}" dt="2019-11-12T12:31:35.839" v="110" actId="478"/>
+          <ac:picMkLst>
+            <pc:docMk/>
+            <pc:sldMk cId="2927459263" sldId="263"/>
+            <ac:picMk id="58" creationId="{EAB34BC8-3C5D-4CAD-8574-792900AA53C8}"/>
+          </ac:picMkLst>
+        </pc:picChg>
+      </pc:sldChg>
+    </pc:docChg>
+  </pc:docChgLst>
   <pc:docChgLst>
     <pc:chgData name="Anders Wylardt Nielsen" userId="e0ee3fc7cf27fac6" providerId="LiveId" clId="{E8901BAB-3C73-442E-B259-1D5BA63EBE25}"/>
     <pc:docChg chg="undo custSel modSld">
@@ -627,7 +1289,7 @@
           <a:p>
             <a:fld id="{F1C0B079-A316-4C9B-B165-DF9EA8325D2C}" type="datetimeFigureOut">
               <a:rPr lang="da-DK" smtClean="0"/>
-              <a:t>10-10-2019</a:t>
+              <a:t>12-11-2019</a:t>
             </a:fld>
             <a:endParaRPr lang="da-DK"/>
           </a:p>
@@ -791,7 +1453,7 @@
           </a:lstStyle>
           <a:p>
             <a:fld id="{38F28AB8-57D1-494F-9851-055AD867E790}" type="datetimeFigureOut">
-              <a:t>10-10-2019</a:t>
+              <a:t>12-11-2019</a:t>
             </a:fld>
             <a:endParaRPr lang="da-DK"/>
           </a:p>
@@ -12761,7 +13423,7 @@
             <a:fld id="{ECAA57DF-1C19-4726-AB84-014692BAD8F5}" type="datetimeFigureOut">
               <a:rPr lang="da-DK" noProof="0" smtClean="0"/>
               <a:pPr/>
-              <a:t>10-10-2019</a:t>
+              <a:t>12-11-2019</a:t>
             </a:fld>
             <a:endParaRPr lang="da-DK" noProof="0" dirty="0"/>
           </a:p>
@@ -13483,7 +14145,7 @@
             <a:fld id="{ECAA57DF-1C19-4726-AB84-014692BAD8F5}" type="datetimeFigureOut">
               <a:rPr lang="da-DK" noProof="0" smtClean="0"/>
               <a:pPr/>
-              <a:t>10-10-2019</a:t>
+              <a:t>12-11-2019</a:t>
             </a:fld>
             <a:endParaRPr lang="da-DK" noProof="0" dirty="0"/>
           </a:p>
@@ -14205,7 +14867,7 @@
             <a:fld id="{ECAA57DF-1C19-4726-AB84-014692BAD8F5}" type="datetimeFigureOut">
               <a:rPr lang="da-DK" noProof="0" smtClean="0"/>
               <a:pPr/>
-              <a:t>10-10-2019</a:t>
+              <a:t>12-11-2019</a:t>
             </a:fld>
             <a:endParaRPr lang="da-DK" noProof="0" dirty="0"/>
           </a:p>
@@ -14927,7 +15589,7 @@
             <a:fld id="{ECAA57DF-1C19-4726-AB84-014692BAD8F5}" type="datetimeFigureOut">
               <a:rPr lang="da-DK" noProof="0" smtClean="0"/>
               <a:pPr/>
-              <a:t>10-10-2019</a:t>
+              <a:t>12-11-2019</a:t>
             </a:fld>
             <a:endParaRPr lang="da-DK" noProof="0" dirty="0"/>
           </a:p>
@@ -17531,6 +18193,2187 @@
     <p:extLst>
       <p:ext uri="{BB962C8B-B14F-4D97-AF65-F5344CB8AC3E}">
         <p14:creationId xmlns:p14="http://schemas.microsoft.com/office/powerpoint/2010/main" val="1759635540"/>
+      </p:ext>
+    </p:extLst>
+  </p:cSld>
+  <p:clrMapOvr>
+    <a:masterClrMapping/>
+  </p:clrMapOvr>
+</p:sld>
+</file>
+
+<file path=ppt/slides/slide2.xml><?xml version="1.0" encoding="utf-8"?>
+<p:sld xmlns:a="http://schemas.openxmlformats.org/drawingml/2006/main" xmlns:r="http://schemas.openxmlformats.org/officeDocument/2006/relationships" xmlns:p="http://schemas.openxmlformats.org/presentationml/2006/main">
+  <p:cSld>
+    <p:spTree>
+      <p:nvGrpSpPr>
+        <p:cNvPr id="1" name=""/>
+        <p:cNvGrpSpPr/>
+        <p:nvPr/>
+      </p:nvGrpSpPr>
+      <p:grpSpPr>
+        <a:xfrm>
+          <a:off x="0" y="0"/>
+          <a:ext cx="0" cy="0"/>
+          <a:chOff x="0" y="0"/>
+          <a:chExt cx="0" cy="0"/>
+        </a:xfrm>
+      </p:grpSpPr>
+      <p:sp>
+        <p:nvSpPr>
+          <p:cNvPr id="2" name="Pladsholder til tekst 1"/>
+          <p:cNvSpPr>
+            <a:spLocks noGrp="1"/>
+          </p:cNvSpPr>
+          <p:nvPr>
+            <p:ph type="body" sz="quarter" idx="36"/>
+          </p:nvPr>
+        </p:nvSpPr>
+        <p:spPr/>
+        <p:txBody>
+          <a:bodyPr/>
+          <a:lstStyle/>
+          <a:p>
+            <a:r>
+              <a:rPr lang="da-DK" dirty="0"/>
+              <a:t>Semesterprojekt, 1. Semester: Projektgrundlag</a:t>
+            </a:r>
+          </a:p>
+          <a:p>
+            <a:r>
+              <a:rPr lang="da-DK" dirty="0"/>
+              <a:t>Gruppe 7; Christopher, Markus, Nichlas, Anders, Sarah og Teis</a:t>
+            </a:r>
+          </a:p>
+        </p:txBody>
+      </p:sp>
+      <p:sp>
+        <p:nvSpPr>
+          <p:cNvPr id="19" name="Pladsholder til tekst 18"/>
+          <p:cNvSpPr>
+            <a:spLocks noGrp="1"/>
+          </p:cNvSpPr>
+          <p:nvPr>
+            <p:ph type="body" sz="quarter" idx="56"/>
+          </p:nvPr>
+        </p:nvSpPr>
+        <p:spPr/>
+        <p:txBody>
+          <a:bodyPr/>
+          <a:lstStyle/>
+          <a:p>
+            <a:r>
+              <a:rPr lang="da-DK" dirty="0"/>
+              <a:t>Software Engineering/Technology, Det tekniske fakultet, Syddansk Universitet</a:t>
+            </a:r>
+          </a:p>
+        </p:txBody>
+      </p:sp>
+      <p:sp>
+        <p:nvSpPr>
+          <p:cNvPr id="20" name="Pladsholder til tekst 19"/>
+          <p:cNvSpPr>
+            <a:spLocks noGrp="1"/>
+          </p:cNvSpPr>
+          <p:nvPr>
+            <p:ph type="body" sz="quarter" idx="57"/>
+          </p:nvPr>
+        </p:nvSpPr>
+        <p:spPr/>
+        <p:txBody>
+          <a:bodyPr/>
+          <a:lstStyle/>
+          <a:p>
+            <a:r>
+              <a:rPr lang="da-DK" dirty="0"/>
+              <a:t>SDU.DK</a:t>
+            </a:r>
+          </a:p>
+        </p:txBody>
+      </p:sp>
+      <p:sp>
+        <p:nvSpPr>
+          <p:cNvPr id="24" name="Titel 23"/>
+          <p:cNvSpPr>
+            <a:spLocks noGrp="1"/>
+          </p:cNvSpPr>
+          <p:nvPr>
+            <p:ph type="title"/>
+          </p:nvPr>
+        </p:nvSpPr>
+        <p:spPr>
+          <a:xfrm>
+            <a:off x="1160218" y="1551540"/>
+            <a:ext cx="30324954" cy="2445308"/>
+          </a:xfrm>
+        </p:spPr>
+        <p:txBody>
+          <a:bodyPr>
+            <a:normAutofit fontScale="90000"/>
+          </a:bodyPr>
+          <a:lstStyle/>
+          <a:p>
+            <a:r>
+              <a:rPr lang="da-DK" dirty="0" err="1"/>
+              <a:t>Kill</a:t>
+            </a:r>
+            <a:r>
+              <a:rPr lang="da-DK" dirty="0"/>
+              <a:t> The </a:t>
+            </a:r>
+            <a:r>
+              <a:rPr lang="da-DK" dirty="0" err="1"/>
+              <a:t>Killers</a:t>
+            </a:r>
+            <a:r>
+              <a:rPr lang="da-DK" dirty="0"/>
+              <a:t> </a:t>
+            </a:r>
+            <a:br>
+              <a:rPr lang="da-DK" dirty="0"/>
+            </a:br>
+            <a:r>
+              <a:rPr lang="da-DK" b="0" dirty="0"/>
+              <a:t>🦟 💉 🍆 🧤</a:t>
+            </a:r>
+            <a:br>
+              <a:rPr lang="da-DK" dirty="0"/>
+            </a:br>
+            <a:endParaRPr lang="da-DK" dirty="0"/>
+          </a:p>
+        </p:txBody>
+      </p:sp>
+      <p:sp>
+        <p:nvSpPr>
+          <p:cNvPr id="31" name="Pladsholder til indhold 16">
+            <a:extLst>
+              <a:ext uri="{FF2B5EF4-FFF2-40B4-BE49-F238E27FC236}">
+                <a16:creationId xmlns:a16="http://schemas.microsoft.com/office/drawing/2014/main" id="{1607F8FD-3912-4D44-856E-3884BE6A0398}"/>
+              </a:ext>
+            </a:extLst>
+          </p:cNvPr>
+          <p:cNvSpPr txBox="1">
+            <a:spLocks/>
+          </p:cNvSpPr>
+          <p:nvPr/>
+        </p:nvSpPr>
+        <p:spPr>
+          <a:xfrm>
+            <a:off x="14323455" y="25282528"/>
+            <a:ext cx="12486746" cy="4286052"/>
+          </a:xfrm>
+          <a:prstGeom prst="rect">
+            <a:avLst/>
+          </a:prstGeom>
+        </p:spPr>
+        <p:txBody>
+          <a:bodyPr vert="horz" lIns="0" tIns="174010" rIns="87005" bIns="43503" numCol="2" spcCol="360000" rtlCol="0">
+            <a:noAutofit/>
+          </a:bodyPr>
+          <a:lstStyle>
+            <a:lvl1pPr marL="0" marR="0" indent="0" algn="l" defTabSz="4176248" rtl="0" eaLnBrk="1" fontAlgn="auto" latinLnBrk="0" hangingPunct="1">
+              <a:lnSpc>
+                <a:spcPct val="100000"/>
+              </a:lnSpc>
+              <a:spcBef>
+                <a:spcPts val="600"/>
+              </a:spcBef>
+              <a:spcAft>
+                <a:spcPts val="0"/>
+              </a:spcAft>
+              <a:buClr>
+                <a:schemeClr val="accent2"/>
+              </a:buClr>
+              <a:buSzTx/>
+              <a:buFont typeface="Arial" panose="020B0604020202020204" pitchFamily="34" charset="0"/>
+              <a:buNone/>
+              <a:tabLst/>
+              <a:defRPr lang="da-DK" sz="2700" b="0" i="0" kern="1200" baseline="0">
+                <a:solidFill>
+                  <a:schemeClr val="tx1"/>
+                </a:solidFill>
+                <a:latin typeface="Arial"/>
+                <a:ea typeface="Segoe UI" panose="020B0502040204020203" pitchFamily="34" charset="0"/>
+                <a:cs typeface="Arial"/>
+              </a:defRPr>
+            </a:lvl1pPr>
+            <a:lvl2pPr marL="609036" indent="0" algn="l" defTabSz="4176248" rtl="0" eaLnBrk="1" latinLnBrk="0" hangingPunct="1">
+              <a:lnSpc>
+                <a:spcPct val="100000"/>
+              </a:lnSpc>
+              <a:spcBef>
+                <a:spcPts val="1142"/>
+              </a:spcBef>
+              <a:buClr>
+                <a:schemeClr val="accent2"/>
+              </a:buClr>
+              <a:buFont typeface="Arial" panose="020B0604020202020204" pitchFamily="34" charset="0"/>
+              <a:buNone/>
+              <a:defRPr lang="da-DK" sz="2300" b="0" i="0" kern="1200">
+                <a:solidFill>
+                  <a:schemeClr val="tx1"/>
+                </a:solidFill>
+                <a:latin typeface="Arial"/>
+                <a:ea typeface="Segoe UI" panose="020B0502040204020203" pitchFamily="34" charset="0"/>
+                <a:cs typeface="Arial"/>
+              </a:defRPr>
+            </a:lvl2pPr>
+            <a:lvl3pPr marL="609036" indent="0" algn="l" defTabSz="4176248" rtl="0" eaLnBrk="1" latinLnBrk="0" hangingPunct="1">
+              <a:lnSpc>
+                <a:spcPct val="100000"/>
+              </a:lnSpc>
+              <a:spcBef>
+                <a:spcPts val="1142"/>
+              </a:spcBef>
+              <a:buClr>
+                <a:schemeClr val="accent2"/>
+              </a:buClr>
+              <a:buFont typeface="Arial" panose="020B0604020202020204" pitchFamily="34" charset="0"/>
+              <a:buNone/>
+              <a:defRPr lang="da-DK" sz="2300" b="0" i="0" kern="1200">
+                <a:solidFill>
+                  <a:schemeClr val="tx1"/>
+                </a:solidFill>
+                <a:latin typeface="Arial"/>
+                <a:ea typeface="Segoe UI" panose="020B0502040204020203" pitchFamily="34" charset="0"/>
+                <a:cs typeface="Arial"/>
+              </a:defRPr>
+            </a:lvl3pPr>
+            <a:lvl4pPr marL="609036" indent="0" algn="l" defTabSz="4176248" rtl="0" eaLnBrk="1" latinLnBrk="0" hangingPunct="1">
+              <a:lnSpc>
+                <a:spcPct val="100000"/>
+              </a:lnSpc>
+              <a:spcBef>
+                <a:spcPts val="1142"/>
+              </a:spcBef>
+              <a:buClr>
+                <a:schemeClr val="accent2"/>
+              </a:buClr>
+              <a:buFont typeface="Arial" panose="020B0604020202020204" pitchFamily="34" charset="0"/>
+              <a:buNone/>
+              <a:defRPr lang="da-DK" sz="2300" b="0" i="0" kern="1200">
+                <a:solidFill>
+                  <a:schemeClr val="tx1"/>
+                </a:solidFill>
+                <a:latin typeface="Arial"/>
+                <a:ea typeface="Segoe UI" panose="020B0502040204020203" pitchFamily="34" charset="0"/>
+                <a:cs typeface="Arial"/>
+              </a:defRPr>
+            </a:lvl4pPr>
+            <a:lvl5pPr marL="609036" indent="0" algn="l" defTabSz="4176248" rtl="0" eaLnBrk="1" latinLnBrk="0" hangingPunct="1">
+              <a:lnSpc>
+                <a:spcPct val="100000"/>
+              </a:lnSpc>
+              <a:spcBef>
+                <a:spcPts val="1142"/>
+              </a:spcBef>
+              <a:buClr>
+                <a:schemeClr val="accent2"/>
+              </a:buClr>
+              <a:buFont typeface="Arial" panose="020B0604020202020204" pitchFamily="34" charset="0"/>
+              <a:buNone/>
+              <a:defRPr lang="da-DK" sz="2300" b="0" i="0" kern="1200">
+                <a:solidFill>
+                  <a:schemeClr val="tx1"/>
+                </a:solidFill>
+                <a:latin typeface="Arial"/>
+                <a:ea typeface="Segoe UI" panose="020B0502040204020203" pitchFamily="34" charset="0"/>
+                <a:cs typeface="Arial"/>
+              </a:defRPr>
+            </a:lvl5pPr>
+            <a:lvl6pPr marL="609036" indent="0" algn="l" defTabSz="4176248" rtl="0" eaLnBrk="1" latinLnBrk="0" hangingPunct="1">
+              <a:lnSpc>
+                <a:spcPct val="100000"/>
+              </a:lnSpc>
+              <a:spcBef>
+                <a:spcPts val="1142"/>
+              </a:spcBef>
+              <a:buClr>
+                <a:schemeClr val="accent2"/>
+              </a:buClr>
+              <a:buFont typeface="Arial" panose="020B0604020202020204" pitchFamily="34" charset="0"/>
+              <a:buNone/>
+              <a:defRPr lang="da-DK" sz="2300" b="0" i="0" kern="1200">
+                <a:solidFill>
+                  <a:schemeClr val="tx1"/>
+                </a:solidFill>
+                <a:latin typeface="Arial"/>
+                <a:ea typeface="Segoe UI" panose="020B0502040204020203" pitchFamily="34" charset="0"/>
+                <a:cs typeface="Arial"/>
+              </a:defRPr>
+            </a:lvl6pPr>
+            <a:lvl7pPr marL="609036" indent="0" algn="l" defTabSz="4176248" rtl="0" eaLnBrk="1" latinLnBrk="0" hangingPunct="1">
+              <a:lnSpc>
+                <a:spcPct val="100000"/>
+              </a:lnSpc>
+              <a:spcBef>
+                <a:spcPts val="1142"/>
+              </a:spcBef>
+              <a:buClr>
+                <a:schemeClr val="accent2"/>
+              </a:buClr>
+              <a:buFont typeface="Arial" panose="020B0604020202020204" pitchFamily="34" charset="0"/>
+              <a:buNone/>
+              <a:defRPr lang="da-DK" sz="2300" b="0" i="0" kern="1200">
+                <a:solidFill>
+                  <a:schemeClr val="tx1"/>
+                </a:solidFill>
+                <a:latin typeface="Arial"/>
+                <a:ea typeface="Segoe UI" panose="020B0502040204020203" pitchFamily="34" charset="0"/>
+                <a:cs typeface="Arial"/>
+              </a:defRPr>
+            </a:lvl7pPr>
+            <a:lvl8pPr marL="609036" indent="0" algn="l" defTabSz="4176248" rtl="0" eaLnBrk="1" latinLnBrk="0" hangingPunct="1">
+              <a:lnSpc>
+                <a:spcPct val="100000"/>
+              </a:lnSpc>
+              <a:spcBef>
+                <a:spcPts val="1142"/>
+              </a:spcBef>
+              <a:buClr>
+                <a:schemeClr val="accent2"/>
+              </a:buClr>
+              <a:buFont typeface="Arial" panose="020B0604020202020204" pitchFamily="34" charset="0"/>
+              <a:buNone/>
+              <a:defRPr lang="da-DK" sz="2300" b="0" i="0" kern="1200">
+                <a:solidFill>
+                  <a:schemeClr val="tx1"/>
+                </a:solidFill>
+                <a:latin typeface="Arial"/>
+                <a:ea typeface="Segoe UI" panose="020B0502040204020203" pitchFamily="34" charset="0"/>
+                <a:cs typeface="Arial"/>
+              </a:defRPr>
+            </a:lvl8pPr>
+            <a:lvl9pPr marL="609036" indent="0" algn="l" defTabSz="4176248" rtl="0" eaLnBrk="1" latinLnBrk="0" hangingPunct="1">
+              <a:lnSpc>
+                <a:spcPct val="100000"/>
+              </a:lnSpc>
+              <a:spcBef>
+                <a:spcPts val="1142"/>
+              </a:spcBef>
+              <a:buClr>
+                <a:schemeClr val="accent2"/>
+              </a:buClr>
+              <a:buFont typeface="Arial" panose="020B0604020202020204" pitchFamily="34" charset="0"/>
+              <a:buNone/>
+              <a:defRPr lang="da-DK" sz="2300" b="0" i="0" kern="1200">
+                <a:solidFill>
+                  <a:schemeClr val="tx1"/>
+                </a:solidFill>
+                <a:latin typeface="Arial"/>
+                <a:ea typeface="Segoe UI" panose="020B0502040204020203" pitchFamily="34" charset="0"/>
+                <a:cs typeface="Arial"/>
+              </a:defRPr>
+            </a:lvl9pPr>
+          </a:lstStyle>
+          <a:p>
+            <a:endParaRPr lang="da-DK" dirty="0"/>
+          </a:p>
+        </p:txBody>
+      </p:sp>
+      <p:pic>
+        <p:nvPicPr>
+          <p:cNvPr id="1028" name="Picture 4" descr="https://scontent-arn2-1.xx.fbcdn.net/v/t1.15752-9/72390896_431101910871949_4285249782168944640_n.jpg?_nc_cat=105&amp;_nc_oc=AQk_-pvvz20L_oWzc94kk2T6rnPmGPabDL0-grNR2DzTbJ5Ckt3eDZ8jf76HLaOOIOU&amp;_nc_ht=scontent-arn2-1.xx&amp;oh=e087845499a036c5332b8cab8241fa61&amp;oe=5DF32336"/>
+          <p:cNvPicPr>
+            <a:picLocks noChangeAspect="1" noChangeArrowheads="1"/>
+          </p:cNvPicPr>
+          <p:nvPr/>
+        </p:nvPicPr>
+        <p:blipFill rotWithShape="1">
+          <a:blip r:embed="rId2">
+            <a:extLst>
+              <a:ext uri="{28A0092B-C50C-407E-A947-70E740481C1C}">
+                <a14:useLocalDpi xmlns:a14="http://schemas.microsoft.com/office/drawing/2010/main" val="0"/>
+              </a:ext>
+            </a:extLst>
+          </a:blip>
+          <a:srcRect l="3843" t="33634" r="5134" b="6240"/>
+          <a:stretch/>
+        </p:blipFill>
+        <p:spPr bwMode="auto">
+          <a:xfrm>
+            <a:off x="15842428" y="805809"/>
+            <a:ext cx="4724400" cy="3120753"/>
+          </a:xfrm>
+          <a:prstGeom prst="rect">
+            <a:avLst/>
+          </a:prstGeom>
+          <a:noFill/>
+          <a:extLst>
+            <a:ext uri="{909E8E84-426E-40DD-AFC4-6F175D3DCCD1}">
+              <a14:hiddenFill xmlns:a14="http://schemas.microsoft.com/office/drawing/2010/main">
+                <a:solidFill>
+                  <a:srgbClr val="FFFFFF"/>
+                </a:solidFill>
+              </a14:hiddenFill>
+            </a:ext>
+          </a:extLst>
+        </p:spPr>
+      </p:pic>
+      <p:sp>
+        <p:nvSpPr>
+          <p:cNvPr id="41" name="Pladsholder til indhold 17">
+            <a:extLst>
+              <a:ext uri="{FF2B5EF4-FFF2-40B4-BE49-F238E27FC236}">
+                <a16:creationId xmlns:a16="http://schemas.microsoft.com/office/drawing/2014/main" id="{AAF47011-23B6-4F36-B93C-F878464C7491}"/>
+              </a:ext>
+            </a:extLst>
+          </p:cNvPr>
+          <p:cNvSpPr txBox="1">
+            <a:spLocks/>
+          </p:cNvSpPr>
+          <p:nvPr/>
+        </p:nvSpPr>
+        <p:spPr>
+          <a:xfrm>
+            <a:off x="14999946" y="4363353"/>
+            <a:ext cx="12486746" cy="6538269"/>
+          </a:xfrm>
+          <a:prstGeom prst="rect">
+            <a:avLst/>
+          </a:prstGeom>
+        </p:spPr>
+        <p:txBody>
+          <a:bodyPr vert="horz" lIns="0" tIns="174010" rIns="87005" bIns="43503" numCol="2" spcCol="360000" rtlCol="0">
+            <a:noAutofit/>
+          </a:bodyPr>
+          <a:lstStyle>
+            <a:lvl1pPr marL="0" marR="0" indent="0" algn="l" defTabSz="4176248" rtl="0" eaLnBrk="1" fontAlgn="auto" latinLnBrk="0" hangingPunct="1">
+              <a:lnSpc>
+                <a:spcPct val="100000"/>
+              </a:lnSpc>
+              <a:spcBef>
+                <a:spcPts val="600"/>
+              </a:spcBef>
+              <a:spcAft>
+                <a:spcPts val="0"/>
+              </a:spcAft>
+              <a:buClr>
+                <a:schemeClr val="accent2"/>
+              </a:buClr>
+              <a:buSzTx/>
+              <a:buFont typeface="Arial" panose="020B0604020202020204" pitchFamily="34" charset="0"/>
+              <a:buNone/>
+              <a:tabLst/>
+              <a:defRPr lang="da-DK" sz="2700" b="0" i="0" kern="1200" baseline="0">
+                <a:solidFill>
+                  <a:schemeClr val="tx1"/>
+                </a:solidFill>
+                <a:latin typeface="Arial"/>
+                <a:ea typeface="Segoe UI" panose="020B0502040204020203" pitchFamily="34" charset="0"/>
+                <a:cs typeface="Arial"/>
+              </a:defRPr>
+            </a:lvl1pPr>
+            <a:lvl2pPr marL="609036" indent="0" algn="l" defTabSz="4176248" rtl="0" eaLnBrk="1" latinLnBrk="0" hangingPunct="1">
+              <a:lnSpc>
+                <a:spcPct val="100000"/>
+              </a:lnSpc>
+              <a:spcBef>
+                <a:spcPts val="1142"/>
+              </a:spcBef>
+              <a:buClr>
+                <a:schemeClr val="accent2"/>
+              </a:buClr>
+              <a:buFont typeface="Arial" panose="020B0604020202020204" pitchFamily="34" charset="0"/>
+              <a:buNone/>
+              <a:defRPr lang="da-DK" sz="2300" b="0" i="0" kern="1200">
+                <a:solidFill>
+                  <a:schemeClr val="tx1"/>
+                </a:solidFill>
+                <a:latin typeface="Arial"/>
+                <a:ea typeface="Segoe UI" panose="020B0502040204020203" pitchFamily="34" charset="0"/>
+                <a:cs typeface="Arial"/>
+              </a:defRPr>
+            </a:lvl2pPr>
+            <a:lvl3pPr marL="609036" indent="0" algn="l" defTabSz="4176248" rtl="0" eaLnBrk="1" latinLnBrk="0" hangingPunct="1">
+              <a:lnSpc>
+                <a:spcPct val="100000"/>
+              </a:lnSpc>
+              <a:spcBef>
+                <a:spcPts val="1142"/>
+              </a:spcBef>
+              <a:buClr>
+                <a:schemeClr val="accent2"/>
+              </a:buClr>
+              <a:buFont typeface="Arial" panose="020B0604020202020204" pitchFamily="34" charset="0"/>
+              <a:buNone/>
+              <a:defRPr lang="da-DK" sz="2300" b="0" i="0" kern="1200">
+                <a:solidFill>
+                  <a:schemeClr val="tx1"/>
+                </a:solidFill>
+                <a:latin typeface="Arial"/>
+                <a:ea typeface="Segoe UI" panose="020B0502040204020203" pitchFamily="34" charset="0"/>
+                <a:cs typeface="Arial"/>
+              </a:defRPr>
+            </a:lvl3pPr>
+            <a:lvl4pPr marL="609036" indent="0" algn="l" defTabSz="4176248" rtl="0" eaLnBrk="1" latinLnBrk="0" hangingPunct="1">
+              <a:lnSpc>
+                <a:spcPct val="100000"/>
+              </a:lnSpc>
+              <a:spcBef>
+                <a:spcPts val="1142"/>
+              </a:spcBef>
+              <a:buClr>
+                <a:schemeClr val="accent2"/>
+              </a:buClr>
+              <a:buFont typeface="Arial" panose="020B0604020202020204" pitchFamily="34" charset="0"/>
+              <a:buNone/>
+              <a:defRPr lang="da-DK" sz="2300" b="0" i="0" kern="1200">
+                <a:solidFill>
+                  <a:schemeClr val="tx1"/>
+                </a:solidFill>
+                <a:latin typeface="Arial"/>
+                <a:ea typeface="Segoe UI" panose="020B0502040204020203" pitchFamily="34" charset="0"/>
+                <a:cs typeface="Arial"/>
+              </a:defRPr>
+            </a:lvl4pPr>
+            <a:lvl5pPr marL="609036" indent="0" algn="l" defTabSz="4176248" rtl="0" eaLnBrk="1" latinLnBrk="0" hangingPunct="1">
+              <a:lnSpc>
+                <a:spcPct val="100000"/>
+              </a:lnSpc>
+              <a:spcBef>
+                <a:spcPts val="1142"/>
+              </a:spcBef>
+              <a:buClr>
+                <a:schemeClr val="accent2"/>
+              </a:buClr>
+              <a:buFont typeface="Arial" panose="020B0604020202020204" pitchFamily="34" charset="0"/>
+              <a:buNone/>
+              <a:defRPr lang="da-DK" sz="2300" b="0" i="0" kern="1200">
+                <a:solidFill>
+                  <a:schemeClr val="tx1"/>
+                </a:solidFill>
+                <a:latin typeface="Arial"/>
+                <a:ea typeface="Segoe UI" panose="020B0502040204020203" pitchFamily="34" charset="0"/>
+                <a:cs typeface="Arial"/>
+              </a:defRPr>
+            </a:lvl5pPr>
+            <a:lvl6pPr marL="609036" indent="0" algn="l" defTabSz="4176248" rtl="0" eaLnBrk="1" latinLnBrk="0" hangingPunct="1">
+              <a:lnSpc>
+                <a:spcPct val="100000"/>
+              </a:lnSpc>
+              <a:spcBef>
+                <a:spcPts val="1142"/>
+              </a:spcBef>
+              <a:buClr>
+                <a:schemeClr val="accent2"/>
+              </a:buClr>
+              <a:buFont typeface="Arial" panose="020B0604020202020204" pitchFamily="34" charset="0"/>
+              <a:buNone/>
+              <a:defRPr lang="da-DK" sz="2300" b="0" i="0" kern="1200">
+                <a:solidFill>
+                  <a:schemeClr val="tx1"/>
+                </a:solidFill>
+                <a:latin typeface="Arial"/>
+                <a:ea typeface="Segoe UI" panose="020B0502040204020203" pitchFamily="34" charset="0"/>
+                <a:cs typeface="Arial"/>
+              </a:defRPr>
+            </a:lvl6pPr>
+            <a:lvl7pPr marL="609036" indent="0" algn="l" defTabSz="4176248" rtl="0" eaLnBrk="1" latinLnBrk="0" hangingPunct="1">
+              <a:lnSpc>
+                <a:spcPct val="100000"/>
+              </a:lnSpc>
+              <a:spcBef>
+                <a:spcPts val="1142"/>
+              </a:spcBef>
+              <a:buClr>
+                <a:schemeClr val="accent2"/>
+              </a:buClr>
+              <a:buFont typeface="Arial" panose="020B0604020202020204" pitchFamily="34" charset="0"/>
+              <a:buNone/>
+              <a:defRPr lang="da-DK" sz="2300" b="0" i="0" kern="1200">
+                <a:solidFill>
+                  <a:schemeClr val="tx1"/>
+                </a:solidFill>
+                <a:latin typeface="Arial"/>
+                <a:ea typeface="Segoe UI" panose="020B0502040204020203" pitchFamily="34" charset="0"/>
+                <a:cs typeface="Arial"/>
+              </a:defRPr>
+            </a:lvl7pPr>
+            <a:lvl8pPr marL="609036" indent="0" algn="l" defTabSz="4176248" rtl="0" eaLnBrk="1" latinLnBrk="0" hangingPunct="1">
+              <a:lnSpc>
+                <a:spcPct val="100000"/>
+              </a:lnSpc>
+              <a:spcBef>
+                <a:spcPts val="1142"/>
+              </a:spcBef>
+              <a:buClr>
+                <a:schemeClr val="accent2"/>
+              </a:buClr>
+              <a:buFont typeface="Arial" panose="020B0604020202020204" pitchFamily="34" charset="0"/>
+              <a:buNone/>
+              <a:defRPr lang="da-DK" sz="2300" b="0" i="0" kern="1200">
+                <a:solidFill>
+                  <a:schemeClr val="tx1"/>
+                </a:solidFill>
+                <a:latin typeface="Arial"/>
+                <a:ea typeface="Segoe UI" panose="020B0502040204020203" pitchFamily="34" charset="0"/>
+                <a:cs typeface="Arial"/>
+              </a:defRPr>
+            </a:lvl8pPr>
+            <a:lvl9pPr marL="609036" indent="0" algn="l" defTabSz="4176248" rtl="0" eaLnBrk="1" latinLnBrk="0" hangingPunct="1">
+              <a:lnSpc>
+                <a:spcPct val="100000"/>
+              </a:lnSpc>
+              <a:spcBef>
+                <a:spcPts val="1142"/>
+              </a:spcBef>
+              <a:buClr>
+                <a:schemeClr val="accent2"/>
+              </a:buClr>
+              <a:buFont typeface="Arial" panose="020B0604020202020204" pitchFamily="34" charset="0"/>
+              <a:buNone/>
+              <a:defRPr lang="da-DK" sz="2300" b="0" i="0" kern="1200">
+                <a:solidFill>
+                  <a:schemeClr val="tx1"/>
+                </a:solidFill>
+                <a:latin typeface="Arial"/>
+                <a:ea typeface="Segoe UI" panose="020B0502040204020203" pitchFamily="34" charset="0"/>
+                <a:cs typeface="Arial"/>
+              </a:defRPr>
+            </a:lvl9pPr>
+          </a:lstStyle>
+          <a:p>
+            <a:endParaRPr lang="da-DK" sz="2400" dirty="0"/>
+          </a:p>
+        </p:txBody>
+      </p:sp>
+      <p:pic>
+        <p:nvPicPr>
+          <p:cNvPr id="35" name="Picture 4" descr="https://scontent-arn2-1.xx.fbcdn.net/v/t1.15752-9/72390896_431101910871949_4285249782168944640_n.jpg?_nc_cat=105&amp;_nc_oc=AQk_-pvvz20L_oWzc94kk2T6rnPmGPabDL0-grNR2DzTbJ5Ckt3eDZ8jf76HLaOOIOU&amp;_nc_ht=scontent-arn2-1.xx&amp;oh=e087845499a036c5332b8cab8241fa61&amp;oe=5DF32336">
+            <a:extLst>
+              <a:ext uri="{FF2B5EF4-FFF2-40B4-BE49-F238E27FC236}">
+                <a16:creationId xmlns:a16="http://schemas.microsoft.com/office/drawing/2014/main" id="{7CB1BEB6-7D41-440A-B269-43C5F746A634}"/>
+              </a:ext>
+            </a:extLst>
+          </p:cNvPr>
+          <p:cNvPicPr>
+            <a:picLocks noChangeAspect="1" noChangeArrowheads="1"/>
+          </p:cNvPicPr>
+          <p:nvPr/>
+        </p:nvPicPr>
+        <p:blipFill rotWithShape="1">
+          <a:blip r:embed="rId2">
+            <a:extLst>
+              <a:ext uri="{28A0092B-C50C-407E-A947-70E740481C1C}">
+                <a14:useLocalDpi xmlns:a14="http://schemas.microsoft.com/office/drawing/2010/main" val="0"/>
+              </a:ext>
+            </a:extLst>
+          </a:blip>
+          <a:srcRect l="3843" t="5475" r="5134" b="63865"/>
+          <a:stretch/>
+        </p:blipFill>
+        <p:spPr bwMode="auto">
+          <a:xfrm>
+            <a:off x="20566828" y="1764323"/>
+            <a:ext cx="4724400" cy="1591366"/>
+          </a:xfrm>
+          <a:prstGeom prst="rect">
+            <a:avLst/>
+          </a:prstGeom>
+          <a:noFill/>
+          <a:extLst>
+            <a:ext uri="{909E8E84-426E-40DD-AFC4-6F175D3DCCD1}">
+              <a14:hiddenFill xmlns:a14="http://schemas.microsoft.com/office/drawing/2010/main">
+                <a:solidFill>
+                  <a:srgbClr val="FFFFFF"/>
+                </a:solidFill>
+              </a14:hiddenFill>
+            </a:ext>
+          </a:extLst>
+        </p:spPr>
+      </p:pic>
+      <p:pic>
+        <p:nvPicPr>
+          <p:cNvPr id="58" name="Image1">
+            <a:extLst>
+              <a:ext uri="{FF2B5EF4-FFF2-40B4-BE49-F238E27FC236}">
+                <a16:creationId xmlns:a16="http://schemas.microsoft.com/office/drawing/2014/main" id="{EAB34BC8-3C5D-4CAD-8574-792900AA53C8}"/>
+              </a:ext>
+            </a:extLst>
+          </p:cNvPr>
+          <p:cNvPicPr/>
+          <p:nvPr/>
+        </p:nvPicPr>
+        <p:blipFill>
+          <a:blip r:embed="rId3"/>
+          <a:stretch>
+            <a:fillRect/>
+          </a:stretch>
+        </p:blipFill>
+        <p:spPr bwMode="auto">
+          <a:xfrm>
+            <a:off x="1920421" y="6662965"/>
+            <a:ext cx="38970857" cy="19746642"/>
+          </a:xfrm>
+          <a:prstGeom prst="rect">
+            <a:avLst/>
+          </a:prstGeom>
+        </p:spPr>
+      </p:pic>
+    </p:spTree>
+    <p:extLst>
+      <p:ext uri="{BB962C8B-B14F-4D97-AF65-F5344CB8AC3E}">
+        <p14:creationId xmlns:p14="http://schemas.microsoft.com/office/powerpoint/2010/main" val="3260245620"/>
+      </p:ext>
+    </p:extLst>
+  </p:cSld>
+  <p:clrMapOvr>
+    <a:masterClrMapping/>
+  </p:clrMapOvr>
+</p:sld>
+</file>
+
+<file path=ppt/slides/slide3.xml><?xml version="1.0" encoding="utf-8"?>
+<p:sld xmlns:a="http://schemas.openxmlformats.org/drawingml/2006/main" xmlns:r="http://schemas.openxmlformats.org/officeDocument/2006/relationships" xmlns:p="http://schemas.openxmlformats.org/presentationml/2006/main">
+  <p:cSld>
+    <p:spTree>
+      <p:nvGrpSpPr>
+        <p:cNvPr id="1" name=""/>
+        <p:cNvGrpSpPr/>
+        <p:nvPr/>
+      </p:nvGrpSpPr>
+      <p:grpSpPr>
+        <a:xfrm>
+          <a:off x="0" y="0"/>
+          <a:ext cx="0" cy="0"/>
+          <a:chOff x="0" y="0"/>
+          <a:chExt cx="0" cy="0"/>
+        </a:xfrm>
+      </p:grpSpPr>
+      <p:sp>
+        <p:nvSpPr>
+          <p:cNvPr id="2" name="Pladsholder til tekst 1"/>
+          <p:cNvSpPr>
+            <a:spLocks noGrp="1"/>
+          </p:cNvSpPr>
+          <p:nvPr>
+            <p:ph type="body" sz="quarter" idx="36"/>
+          </p:nvPr>
+        </p:nvSpPr>
+        <p:spPr/>
+        <p:txBody>
+          <a:bodyPr/>
+          <a:lstStyle/>
+          <a:p>
+            <a:r>
+              <a:rPr lang="da-DK" dirty="0"/>
+              <a:t>Semesterprojekt, 1. Semester: Projektgrundlag</a:t>
+            </a:r>
+          </a:p>
+          <a:p>
+            <a:r>
+              <a:rPr lang="da-DK" dirty="0"/>
+              <a:t>Gruppe 7; Christopher, Markus, Nichlas, Anders, Sarah og Teis</a:t>
+            </a:r>
+          </a:p>
+        </p:txBody>
+      </p:sp>
+      <p:sp>
+        <p:nvSpPr>
+          <p:cNvPr id="19" name="Pladsholder til tekst 18"/>
+          <p:cNvSpPr>
+            <a:spLocks noGrp="1"/>
+          </p:cNvSpPr>
+          <p:nvPr>
+            <p:ph type="body" sz="quarter" idx="56"/>
+          </p:nvPr>
+        </p:nvSpPr>
+        <p:spPr/>
+        <p:txBody>
+          <a:bodyPr/>
+          <a:lstStyle/>
+          <a:p>
+            <a:r>
+              <a:rPr lang="da-DK" dirty="0"/>
+              <a:t>Software Engineering/Technology, Det tekniske fakultet, Syddansk Universitet</a:t>
+            </a:r>
+          </a:p>
+        </p:txBody>
+      </p:sp>
+      <p:sp>
+        <p:nvSpPr>
+          <p:cNvPr id="20" name="Pladsholder til tekst 19"/>
+          <p:cNvSpPr>
+            <a:spLocks noGrp="1"/>
+          </p:cNvSpPr>
+          <p:nvPr>
+            <p:ph type="body" sz="quarter" idx="57"/>
+          </p:nvPr>
+        </p:nvSpPr>
+        <p:spPr/>
+        <p:txBody>
+          <a:bodyPr/>
+          <a:lstStyle/>
+          <a:p>
+            <a:r>
+              <a:rPr lang="da-DK" dirty="0"/>
+              <a:t>SDU.DK</a:t>
+            </a:r>
+          </a:p>
+        </p:txBody>
+      </p:sp>
+      <p:sp>
+        <p:nvSpPr>
+          <p:cNvPr id="24" name="Titel 23"/>
+          <p:cNvSpPr>
+            <a:spLocks noGrp="1"/>
+          </p:cNvSpPr>
+          <p:nvPr>
+            <p:ph type="title"/>
+          </p:nvPr>
+        </p:nvSpPr>
+        <p:spPr>
+          <a:xfrm>
+            <a:off x="1160218" y="1551540"/>
+            <a:ext cx="30324954" cy="2445308"/>
+          </a:xfrm>
+        </p:spPr>
+        <p:txBody>
+          <a:bodyPr>
+            <a:normAutofit fontScale="90000"/>
+          </a:bodyPr>
+          <a:lstStyle/>
+          <a:p>
+            <a:r>
+              <a:rPr lang="da-DK" dirty="0" err="1"/>
+              <a:t>Kill</a:t>
+            </a:r>
+            <a:r>
+              <a:rPr lang="da-DK" dirty="0"/>
+              <a:t> The </a:t>
+            </a:r>
+            <a:r>
+              <a:rPr lang="da-DK" dirty="0" err="1"/>
+              <a:t>Killers</a:t>
+            </a:r>
+            <a:r>
+              <a:rPr lang="da-DK" dirty="0"/>
+              <a:t> </a:t>
+            </a:r>
+            <a:br>
+              <a:rPr lang="da-DK" dirty="0"/>
+            </a:br>
+            <a:r>
+              <a:rPr lang="da-DK" b="0" dirty="0"/>
+              <a:t>🦟 💉 🍆 🧤</a:t>
+            </a:r>
+            <a:br>
+              <a:rPr lang="da-DK" dirty="0"/>
+            </a:br>
+            <a:endParaRPr lang="da-DK" dirty="0"/>
+          </a:p>
+        </p:txBody>
+      </p:sp>
+      <p:sp>
+        <p:nvSpPr>
+          <p:cNvPr id="31" name="Pladsholder til indhold 16">
+            <a:extLst>
+              <a:ext uri="{FF2B5EF4-FFF2-40B4-BE49-F238E27FC236}">
+                <a16:creationId xmlns:a16="http://schemas.microsoft.com/office/drawing/2014/main" id="{1607F8FD-3912-4D44-856E-3884BE6A0398}"/>
+              </a:ext>
+            </a:extLst>
+          </p:cNvPr>
+          <p:cNvSpPr txBox="1">
+            <a:spLocks/>
+          </p:cNvSpPr>
+          <p:nvPr/>
+        </p:nvSpPr>
+        <p:spPr>
+          <a:xfrm>
+            <a:off x="14323455" y="25282528"/>
+            <a:ext cx="12486746" cy="4286052"/>
+          </a:xfrm>
+          <a:prstGeom prst="rect">
+            <a:avLst/>
+          </a:prstGeom>
+        </p:spPr>
+        <p:txBody>
+          <a:bodyPr vert="horz" lIns="0" tIns="174010" rIns="87005" bIns="43503" numCol="2" spcCol="360000" rtlCol="0">
+            <a:noAutofit/>
+          </a:bodyPr>
+          <a:lstStyle>
+            <a:lvl1pPr marL="0" marR="0" indent="0" algn="l" defTabSz="4176248" rtl="0" eaLnBrk="1" fontAlgn="auto" latinLnBrk="0" hangingPunct="1">
+              <a:lnSpc>
+                <a:spcPct val="100000"/>
+              </a:lnSpc>
+              <a:spcBef>
+                <a:spcPts val="600"/>
+              </a:spcBef>
+              <a:spcAft>
+                <a:spcPts val="0"/>
+              </a:spcAft>
+              <a:buClr>
+                <a:schemeClr val="accent2"/>
+              </a:buClr>
+              <a:buSzTx/>
+              <a:buFont typeface="Arial" panose="020B0604020202020204" pitchFamily="34" charset="0"/>
+              <a:buNone/>
+              <a:tabLst/>
+              <a:defRPr lang="da-DK" sz="2700" b="0" i="0" kern="1200" baseline="0">
+                <a:solidFill>
+                  <a:schemeClr val="tx1"/>
+                </a:solidFill>
+                <a:latin typeface="Arial"/>
+                <a:ea typeface="Segoe UI" panose="020B0502040204020203" pitchFamily="34" charset="0"/>
+                <a:cs typeface="Arial"/>
+              </a:defRPr>
+            </a:lvl1pPr>
+            <a:lvl2pPr marL="609036" indent="0" algn="l" defTabSz="4176248" rtl="0" eaLnBrk="1" latinLnBrk="0" hangingPunct="1">
+              <a:lnSpc>
+                <a:spcPct val="100000"/>
+              </a:lnSpc>
+              <a:spcBef>
+                <a:spcPts val="1142"/>
+              </a:spcBef>
+              <a:buClr>
+                <a:schemeClr val="accent2"/>
+              </a:buClr>
+              <a:buFont typeface="Arial" panose="020B0604020202020204" pitchFamily="34" charset="0"/>
+              <a:buNone/>
+              <a:defRPr lang="da-DK" sz="2300" b="0" i="0" kern="1200">
+                <a:solidFill>
+                  <a:schemeClr val="tx1"/>
+                </a:solidFill>
+                <a:latin typeface="Arial"/>
+                <a:ea typeface="Segoe UI" panose="020B0502040204020203" pitchFamily="34" charset="0"/>
+                <a:cs typeface="Arial"/>
+              </a:defRPr>
+            </a:lvl2pPr>
+            <a:lvl3pPr marL="609036" indent="0" algn="l" defTabSz="4176248" rtl="0" eaLnBrk="1" latinLnBrk="0" hangingPunct="1">
+              <a:lnSpc>
+                <a:spcPct val="100000"/>
+              </a:lnSpc>
+              <a:spcBef>
+                <a:spcPts val="1142"/>
+              </a:spcBef>
+              <a:buClr>
+                <a:schemeClr val="accent2"/>
+              </a:buClr>
+              <a:buFont typeface="Arial" panose="020B0604020202020204" pitchFamily="34" charset="0"/>
+              <a:buNone/>
+              <a:defRPr lang="da-DK" sz="2300" b="0" i="0" kern="1200">
+                <a:solidFill>
+                  <a:schemeClr val="tx1"/>
+                </a:solidFill>
+                <a:latin typeface="Arial"/>
+                <a:ea typeface="Segoe UI" panose="020B0502040204020203" pitchFamily="34" charset="0"/>
+                <a:cs typeface="Arial"/>
+              </a:defRPr>
+            </a:lvl3pPr>
+            <a:lvl4pPr marL="609036" indent="0" algn="l" defTabSz="4176248" rtl="0" eaLnBrk="1" latinLnBrk="0" hangingPunct="1">
+              <a:lnSpc>
+                <a:spcPct val="100000"/>
+              </a:lnSpc>
+              <a:spcBef>
+                <a:spcPts val="1142"/>
+              </a:spcBef>
+              <a:buClr>
+                <a:schemeClr val="accent2"/>
+              </a:buClr>
+              <a:buFont typeface="Arial" panose="020B0604020202020204" pitchFamily="34" charset="0"/>
+              <a:buNone/>
+              <a:defRPr lang="da-DK" sz="2300" b="0" i="0" kern="1200">
+                <a:solidFill>
+                  <a:schemeClr val="tx1"/>
+                </a:solidFill>
+                <a:latin typeface="Arial"/>
+                <a:ea typeface="Segoe UI" panose="020B0502040204020203" pitchFamily="34" charset="0"/>
+                <a:cs typeface="Arial"/>
+              </a:defRPr>
+            </a:lvl4pPr>
+            <a:lvl5pPr marL="609036" indent="0" algn="l" defTabSz="4176248" rtl="0" eaLnBrk="1" latinLnBrk="0" hangingPunct="1">
+              <a:lnSpc>
+                <a:spcPct val="100000"/>
+              </a:lnSpc>
+              <a:spcBef>
+                <a:spcPts val="1142"/>
+              </a:spcBef>
+              <a:buClr>
+                <a:schemeClr val="accent2"/>
+              </a:buClr>
+              <a:buFont typeface="Arial" panose="020B0604020202020204" pitchFamily="34" charset="0"/>
+              <a:buNone/>
+              <a:defRPr lang="da-DK" sz="2300" b="0" i="0" kern="1200">
+                <a:solidFill>
+                  <a:schemeClr val="tx1"/>
+                </a:solidFill>
+                <a:latin typeface="Arial"/>
+                <a:ea typeface="Segoe UI" panose="020B0502040204020203" pitchFamily="34" charset="0"/>
+                <a:cs typeface="Arial"/>
+              </a:defRPr>
+            </a:lvl5pPr>
+            <a:lvl6pPr marL="609036" indent="0" algn="l" defTabSz="4176248" rtl="0" eaLnBrk="1" latinLnBrk="0" hangingPunct="1">
+              <a:lnSpc>
+                <a:spcPct val="100000"/>
+              </a:lnSpc>
+              <a:spcBef>
+                <a:spcPts val="1142"/>
+              </a:spcBef>
+              <a:buClr>
+                <a:schemeClr val="accent2"/>
+              </a:buClr>
+              <a:buFont typeface="Arial" panose="020B0604020202020204" pitchFamily="34" charset="0"/>
+              <a:buNone/>
+              <a:defRPr lang="da-DK" sz="2300" b="0" i="0" kern="1200">
+                <a:solidFill>
+                  <a:schemeClr val="tx1"/>
+                </a:solidFill>
+                <a:latin typeface="Arial"/>
+                <a:ea typeface="Segoe UI" panose="020B0502040204020203" pitchFamily="34" charset="0"/>
+                <a:cs typeface="Arial"/>
+              </a:defRPr>
+            </a:lvl6pPr>
+            <a:lvl7pPr marL="609036" indent="0" algn="l" defTabSz="4176248" rtl="0" eaLnBrk="1" latinLnBrk="0" hangingPunct="1">
+              <a:lnSpc>
+                <a:spcPct val="100000"/>
+              </a:lnSpc>
+              <a:spcBef>
+                <a:spcPts val="1142"/>
+              </a:spcBef>
+              <a:buClr>
+                <a:schemeClr val="accent2"/>
+              </a:buClr>
+              <a:buFont typeface="Arial" panose="020B0604020202020204" pitchFamily="34" charset="0"/>
+              <a:buNone/>
+              <a:defRPr lang="da-DK" sz="2300" b="0" i="0" kern="1200">
+                <a:solidFill>
+                  <a:schemeClr val="tx1"/>
+                </a:solidFill>
+                <a:latin typeface="Arial"/>
+                <a:ea typeface="Segoe UI" panose="020B0502040204020203" pitchFamily="34" charset="0"/>
+                <a:cs typeface="Arial"/>
+              </a:defRPr>
+            </a:lvl7pPr>
+            <a:lvl8pPr marL="609036" indent="0" algn="l" defTabSz="4176248" rtl="0" eaLnBrk="1" latinLnBrk="0" hangingPunct="1">
+              <a:lnSpc>
+                <a:spcPct val="100000"/>
+              </a:lnSpc>
+              <a:spcBef>
+                <a:spcPts val="1142"/>
+              </a:spcBef>
+              <a:buClr>
+                <a:schemeClr val="accent2"/>
+              </a:buClr>
+              <a:buFont typeface="Arial" panose="020B0604020202020204" pitchFamily="34" charset="0"/>
+              <a:buNone/>
+              <a:defRPr lang="da-DK" sz="2300" b="0" i="0" kern="1200">
+                <a:solidFill>
+                  <a:schemeClr val="tx1"/>
+                </a:solidFill>
+                <a:latin typeface="Arial"/>
+                <a:ea typeface="Segoe UI" panose="020B0502040204020203" pitchFamily="34" charset="0"/>
+                <a:cs typeface="Arial"/>
+              </a:defRPr>
+            </a:lvl8pPr>
+            <a:lvl9pPr marL="609036" indent="0" algn="l" defTabSz="4176248" rtl="0" eaLnBrk="1" latinLnBrk="0" hangingPunct="1">
+              <a:lnSpc>
+                <a:spcPct val="100000"/>
+              </a:lnSpc>
+              <a:spcBef>
+                <a:spcPts val="1142"/>
+              </a:spcBef>
+              <a:buClr>
+                <a:schemeClr val="accent2"/>
+              </a:buClr>
+              <a:buFont typeface="Arial" panose="020B0604020202020204" pitchFamily="34" charset="0"/>
+              <a:buNone/>
+              <a:defRPr lang="da-DK" sz="2300" b="0" i="0" kern="1200">
+                <a:solidFill>
+                  <a:schemeClr val="tx1"/>
+                </a:solidFill>
+                <a:latin typeface="Arial"/>
+                <a:ea typeface="Segoe UI" panose="020B0502040204020203" pitchFamily="34" charset="0"/>
+                <a:cs typeface="Arial"/>
+              </a:defRPr>
+            </a:lvl9pPr>
+          </a:lstStyle>
+          <a:p>
+            <a:endParaRPr lang="da-DK" dirty="0"/>
+          </a:p>
+        </p:txBody>
+      </p:sp>
+      <p:pic>
+        <p:nvPicPr>
+          <p:cNvPr id="1028" name="Picture 4" descr="https://scontent-arn2-1.xx.fbcdn.net/v/t1.15752-9/72390896_431101910871949_4285249782168944640_n.jpg?_nc_cat=105&amp;_nc_oc=AQk_-pvvz20L_oWzc94kk2T6rnPmGPabDL0-grNR2DzTbJ5Ckt3eDZ8jf76HLaOOIOU&amp;_nc_ht=scontent-arn2-1.xx&amp;oh=e087845499a036c5332b8cab8241fa61&amp;oe=5DF32336"/>
+          <p:cNvPicPr>
+            <a:picLocks noChangeAspect="1" noChangeArrowheads="1"/>
+          </p:cNvPicPr>
+          <p:nvPr/>
+        </p:nvPicPr>
+        <p:blipFill rotWithShape="1">
+          <a:blip r:embed="rId2">
+            <a:extLst>
+              <a:ext uri="{28A0092B-C50C-407E-A947-70E740481C1C}">
+                <a14:useLocalDpi xmlns:a14="http://schemas.microsoft.com/office/drawing/2010/main" val="0"/>
+              </a:ext>
+            </a:extLst>
+          </a:blip>
+          <a:srcRect l="3843" t="33634" r="5134" b="6240"/>
+          <a:stretch/>
+        </p:blipFill>
+        <p:spPr bwMode="auto">
+          <a:xfrm>
+            <a:off x="15842428" y="805809"/>
+            <a:ext cx="4724400" cy="3120753"/>
+          </a:xfrm>
+          <a:prstGeom prst="rect">
+            <a:avLst/>
+          </a:prstGeom>
+          <a:noFill/>
+          <a:extLst>
+            <a:ext uri="{909E8E84-426E-40DD-AFC4-6F175D3DCCD1}">
+              <a14:hiddenFill xmlns:a14="http://schemas.microsoft.com/office/drawing/2010/main">
+                <a:solidFill>
+                  <a:srgbClr val="FFFFFF"/>
+                </a:solidFill>
+              </a14:hiddenFill>
+            </a:ext>
+          </a:extLst>
+        </p:spPr>
+      </p:pic>
+      <p:sp>
+        <p:nvSpPr>
+          <p:cNvPr id="41" name="Pladsholder til indhold 17">
+            <a:extLst>
+              <a:ext uri="{FF2B5EF4-FFF2-40B4-BE49-F238E27FC236}">
+                <a16:creationId xmlns:a16="http://schemas.microsoft.com/office/drawing/2014/main" id="{AAF47011-23B6-4F36-B93C-F878464C7491}"/>
+              </a:ext>
+            </a:extLst>
+          </p:cNvPr>
+          <p:cNvSpPr txBox="1">
+            <a:spLocks/>
+          </p:cNvSpPr>
+          <p:nvPr/>
+        </p:nvSpPr>
+        <p:spPr>
+          <a:xfrm>
+            <a:off x="14999946" y="4363353"/>
+            <a:ext cx="12486746" cy="6538269"/>
+          </a:xfrm>
+          <a:prstGeom prst="rect">
+            <a:avLst/>
+          </a:prstGeom>
+        </p:spPr>
+        <p:txBody>
+          <a:bodyPr vert="horz" lIns="0" tIns="174010" rIns="87005" bIns="43503" numCol="2" spcCol="360000" rtlCol="0">
+            <a:noAutofit/>
+          </a:bodyPr>
+          <a:lstStyle>
+            <a:lvl1pPr marL="0" marR="0" indent="0" algn="l" defTabSz="4176248" rtl="0" eaLnBrk="1" fontAlgn="auto" latinLnBrk="0" hangingPunct="1">
+              <a:lnSpc>
+                <a:spcPct val="100000"/>
+              </a:lnSpc>
+              <a:spcBef>
+                <a:spcPts val="600"/>
+              </a:spcBef>
+              <a:spcAft>
+                <a:spcPts val="0"/>
+              </a:spcAft>
+              <a:buClr>
+                <a:schemeClr val="accent2"/>
+              </a:buClr>
+              <a:buSzTx/>
+              <a:buFont typeface="Arial" panose="020B0604020202020204" pitchFamily="34" charset="0"/>
+              <a:buNone/>
+              <a:tabLst/>
+              <a:defRPr lang="da-DK" sz="2700" b="0" i="0" kern="1200" baseline="0">
+                <a:solidFill>
+                  <a:schemeClr val="tx1"/>
+                </a:solidFill>
+                <a:latin typeface="Arial"/>
+                <a:ea typeface="Segoe UI" panose="020B0502040204020203" pitchFamily="34" charset="0"/>
+                <a:cs typeface="Arial"/>
+              </a:defRPr>
+            </a:lvl1pPr>
+            <a:lvl2pPr marL="609036" indent="0" algn="l" defTabSz="4176248" rtl="0" eaLnBrk="1" latinLnBrk="0" hangingPunct="1">
+              <a:lnSpc>
+                <a:spcPct val="100000"/>
+              </a:lnSpc>
+              <a:spcBef>
+                <a:spcPts val="1142"/>
+              </a:spcBef>
+              <a:buClr>
+                <a:schemeClr val="accent2"/>
+              </a:buClr>
+              <a:buFont typeface="Arial" panose="020B0604020202020204" pitchFamily="34" charset="0"/>
+              <a:buNone/>
+              <a:defRPr lang="da-DK" sz="2300" b="0" i="0" kern="1200">
+                <a:solidFill>
+                  <a:schemeClr val="tx1"/>
+                </a:solidFill>
+                <a:latin typeface="Arial"/>
+                <a:ea typeface="Segoe UI" panose="020B0502040204020203" pitchFamily="34" charset="0"/>
+                <a:cs typeface="Arial"/>
+              </a:defRPr>
+            </a:lvl2pPr>
+            <a:lvl3pPr marL="609036" indent="0" algn="l" defTabSz="4176248" rtl="0" eaLnBrk="1" latinLnBrk="0" hangingPunct="1">
+              <a:lnSpc>
+                <a:spcPct val="100000"/>
+              </a:lnSpc>
+              <a:spcBef>
+                <a:spcPts val="1142"/>
+              </a:spcBef>
+              <a:buClr>
+                <a:schemeClr val="accent2"/>
+              </a:buClr>
+              <a:buFont typeface="Arial" panose="020B0604020202020204" pitchFamily="34" charset="0"/>
+              <a:buNone/>
+              <a:defRPr lang="da-DK" sz="2300" b="0" i="0" kern="1200">
+                <a:solidFill>
+                  <a:schemeClr val="tx1"/>
+                </a:solidFill>
+                <a:latin typeface="Arial"/>
+                <a:ea typeface="Segoe UI" panose="020B0502040204020203" pitchFamily="34" charset="0"/>
+                <a:cs typeface="Arial"/>
+              </a:defRPr>
+            </a:lvl3pPr>
+            <a:lvl4pPr marL="609036" indent="0" algn="l" defTabSz="4176248" rtl="0" eaLnBrk="1" latinLnBrk="0" hangingPunct="1">
+              <a:lnSpc>
+                <a:spcPct val="100000"/>
+              </a:lnSpc>
+              <a:spcBef>
+                <a:spcPts val="1142"/>
+              </a:spcBef>
+              <a:buClr>
+                <a:schemeClr val="accent2"/>
+              </a:buClr>
+              <a:buFont typeface="Arial" panose="020B0604020202020204" pitchFamily="34" charset="0"/>
+              <a:buNone/>
+              <a:defRPr lang="da-DK" sz="2300" b="0" i="0" kern="1200">
+                <a:solidFill>
+                  <a:schemeClr val="tx1"/>
+                </a:solidFill>
+                <a:latin typeface="Arial"/>
+                <a:ea typeface="Segoe UI" panose="020B0502040204020203" pitchFamily="34" charset="0"/>
+                <a:cs typeface="Arial"/>
+              </a:defRPr>
+            </a:lvl4pPr>
+            <a:lvl5pPr marL="609036" indent="0" algn="l" defTabSz="4176248" rtl="0" eaLnBrk="1" latinLnBrk="0" hangingPunct="1">
+              <a:lnSpc>
+                <a:spcPct val="100000"/>
+              </a:lnSpc>
+              <a:spcBef>
+                <a:spcPts val="1142"/>
+              </a:spcBef>
+              <a:buClr>
+                <a:schemeClr val="accent2"/>
+              </a:buClr>
+              <a:buFont typeface="Arial" panose="020B0604020202020204" pitchFamily="34" charset="0"/>
+              <a:buNone/>
+              <a:defRPr lang="da-DK" sz="2300" b="0" i="0" kern="1200">
+                <a:solidFill>
+                  <a:schemeClr val="tx1"/>
+                </a:solidFill>
+                <a:latin typeface="Arial"/>
+                <a:ea typeface="Segoe UI" panose="020B0502040204020203" pitchFamily="34" charset="0"/>
+                <a:cs typeface="Arial"/>
+              </a:defRPr>
+            </a:lvl5pPr>
+            <a:lvl6pPr marL="609036" indent="0" algn="l" defTabSz="4176248" rtl="0" eaLnBrk="1" latinLnBrk="0" hangingPunct="1">
+              <a:lnSpc>
+                <a:spcPct val="100000"/>
+              </a:lnSpc>
+              <a:spcBef>
+                <a:spcPts val="1142"/>
+              </a:spcBef>
+              <a:buClr>
+                <a:schemeClr val="accent2"/>
+              </a:buClr>
+              <a:buFont typeface="Arial" panose="020B0604020202020204" pitchFamily="34" charset="0"/>
+              <a:buNone/>
+              <a:defRPr lang="da-DK" sz="2300" b="0" i="0" kern="1200">
+                <a:solidFill>
+                  <a:schemeClr val="tx1"/>
+                </a:solidFill>
+                <a:latin typeface="Arial"/>
+                <a:ea typeface="Segoe UI" panose="020B0502040204020203" pitchFamily="34" charset="0"/>
+                <a:cs typeface="Arial"/>
+              </a:defRPr>
+            </a:lvl6pPr>
+            <a:lvl7pPr marL="609036" indent="0" algn="l" defTabSz="4176248" rtl="0" eaLnBrk="1" latinLnBrk="0" hangingPunct="1">
+              <a:lnSpc>
+                <a:spcPct val="100000"/>
+              </a:lnSpc>
+              <a:spcBef>
+                <a:spcPts val="1142"/>
+              </a:spcBef>
+              <a:buClr>
+                <a:schemeClr val="accent2"/>
+              </a:buClr>
+              <a:buFont typeface="Arial" panose="020B0604020202020204" pitchFamily="34" charset="0"/>
+              <a:buNone/>
+              <a:defRPr lang="da-DK" sz="2300" b="0" i="0" kern="1200">
+                <a:solidFill>
+                  <a:schemeClr val="tx1"/>
+                </a:solidFill>
+                <a:latin typeface="Arial"/>
+                <a:ea typeface="Segoe UI" panose="020B0502040204020203" pitchFamily="34" charset="0"/>
+                <a:cs typeface="Arial"/>
+              </a:defRPr>
+            </a:lvl7pPr>
+            <a:lvl8pPr marL="609036" indent="0" algn="l" defTabSz="4176248" rtl="0" eaLnBrk="1" latinLnBrk="0" hangingPunct="1">
+              <a:lnSpc>
+                <a:spcPct val="100000"/>
+              </a:lnSpc>
+              <a:spcBef>
+                <a:spcPts val="1142"/>
+              </a:spcBef>
+              <a:buClr>
+                <a:schemeClr val="accent2"/>
+              </a:buClr>
+              <a:buFont typeface="Arial" panose="020B0604020202020204" pitchFamily="34" charset="0"/>
+              <a:buNone/>
+              <a:defRPr lang="da-DK" sz="2300" b="0" i="0" kern="1200">
+                <a:solidFill>
+                  <a:schemeClr val="tx1"/>
+                </a:solidFill>
+                <a:latin typeface="Arial"/>
+                <a:ea typeface="Segoe UI" panose="020B0502040204020203" pitchFamily="34" charset="0"/>
+                <a:cs typeface="Arial"/>
+              </a:defRPr>
+            </a:lvl8pPr>
+            <a:lvl9pPr marL="609036" indent="0" algn="l" defTabSz="4176248" rtl="0" eaLnBrk="1" latinLnBrk="0" hangingPunct="1">
+              <a:lnSpc>
+                <a:spcPct val="100000"/>
+              </a:lnSpc>
+              <a:spcBef>
+                <a:spcPts val="1142"/>
+              </a:spcBef>
+              <a:buClr>
+                <a:schemeClr val="accent2"/>
+              </a:buClr>
+              <a:buFont typeface="Arial" panose="020B0604020202020204" pitchFamily="34" charset="0"/>
+              <a:buNone/>
+              <a:defRPr lang="da-DK" sz="2300" b="0" i="0" kern="1200">
+                <a:solidFill>
+                  <a:schemeClr val="tx1"/>
+                </a:solidFill>
+                <a:latin typeface="Arial"/>
+                <a:ea typeface="Segoe UI" panose="020B0502040204020203" pitchFamily="34" charset="0"/>
+                <a:cs typeface="Arial"/>
+              </a:defRPr>
+            </a:lvl9pPr>
+          </a:lstStyle>
+          <a:p>
+            <a:endParaRPr lang="da-DK" sz="2400" dirty="0"/>
+          </a:p>
+        </p:txBody>
+      </p:sp>
+      <p:pic>
+        <p:nvPicPr>
+          <p:cNvPr id="35" name="Picture 4" descr="https://scontent-arn2-1.xx.fbcdn.net/v/t1.15752-9/72390896_431101910871949_4285249782168944640_n.jpg?_nc_cat=105&amp;_nc_oc=AQk_-pvvz20L_oWzc94kk2T6rnPmGPabDL0-grNR2DzTbJ5Ckt3eDZ8jf76HLaOOIOU&amp;_nc_ht=scontent-arn2-1.xx&amp;oh=e087845499a036c5332b8cab8241fa61&amp;oe=5DF32336">
+            <a:extLst>
+              <a:ext uri="{FF2B5EF4-FFF2-40B4-BE49-F238E27FC236}">
+                <a16:creationId xmlns:a16="http://schemas.microsoft.com/office/drawing/2014/main" id="{7CB1BEB6-7D41-440A-B269-43C5F746A634}"/>
+              </a:ext>
+            </a:extLst>
+          </p:cNvPr>
+          <p:cNvPicPr>
+            <a:picLocks noChangeAspect="1" noChangeArrowheads="1"/>
+          </p:cNvPicPr>
+          <p:nvPr/>
+        </p:nvPicPr>
+        <p:blipFill rotWithShape="1">
+          <a:blip r:embed="rId2">
+            <a:extLst>
+              <a:ext uri="{28A0092B-C50C-407E-A947-70E740481C1C}">
+                <a14:useLocalDpi xmlns:a14="http://schemas.microsoft.com/office/drawing/2010/main" val="0"/>
+              </a:ext>
+            </a:extLst>
+          </a:blip>
+          <a:srcRect l="3843" t="5475" r="5134" b="63865"/>
+          <a:stretch/>
+        </p:blipFill>
+        <p:spPr bwMode="auto">
+          <a:xfrm>
+            <a:off x="20566828" y="1764323"/>
+            <a:ext cx="4724400" cy="1591366"/>
+          </a:xfrm>
+          <a:prstGeom prst="rect">
+            <a:avLst/>
+          </a:prstGeom>
+          <a:noFill/>
+          <a:extLst>
+            <a:ext uri="{909E8E84-426E-40DD-AFC4-6F175D3DCCD1}">
+              <a14:hiddenFill xmlns:a14="http://schemas.microsoft.com/office/drawing/2010/main">
+                <a:solidFill>
+                  <a:srgbClr val="FFFFFF"/>
+                </a:solidFill>
+              </a14:hiddenFill>
+            </a:ext>
+          </a:extLst>
+        </p:spPr>
+      </p:pic>
+      <p:sp>
+        <p:nvSpPr>
+          <p:cNvPr id="3" name="Tekstfelt 2">
+            <a:extLst>
+              <a:ext uri="{FF2B5EF4-FFF2-40B4-BE49-F238E27FC236}">
+                <a16:creationId xmlns:a16="http://schemas.microsoft.com/office/drawing/2014/main" id="{40F3FF29-4D23-4AAF-A6B0-1B6072595132}"/>
+              </a:ext>
+            </a:extLst>
+          </p:cNvPr>
+          <p:cNvSpPr txBox="1"/>
+          <p:nvPr/>
+        </p:nvSpPr>
+        <p:spPr>
+          <a:xfrm>
+            <a:off x="11315268" y="11244232"/>
+            <a:ext cx="20181164" cy="7786747"/>
+          </a:xfrm>
+          <a:prstGeom prst="rect">
+            <a:avLst/>
+          </a:prstGeom>
+          <a:noFill/>
+        </p:spPr>
+        <p:txBody>
+          <a:bodyPr wrap="square" rtlCol="0">
+            <a:spAutoFit/>
+          </a:bodyPr>
+          <a:lstStyle/>
+          <a:p>
+            <a:r>
+              <a:rPr lang="da-DK" sz="25000" b="1" dirty="0"/>
+              <a:t>		Spil Demonstration</a:t>
+            </a:r>
+          </a:p>
+        </p:txBody>
+      </p:sp>
+    </p:spTree>
+    <p:extLst>
+      <p:ext uri="{BB962C8B-B14F-4D97-AF65-F5344CB8AC3E}">
+        <p14:creationId xmlns:p14="http://schemas.microsoft.com/office/powerpoint/2010/main" val="2927459263"/>
+      </p:ext>
+    </p:extLst>
+  </p:cSld>
+  <p:clrMapOvr>
+    <a:masterClrMapping/>
+  </p:clrMapOvr>
+</p:sld>
+</file>
+
+<file path=ppt/slides/slide4.xml><?xml version="1.0" encoding="utf-8"?>
+<p:sld xmlns:a="http://schemas.openxmlformats.org/drawingml/2006/main" xmlns:r="http://schemas.openxmlformats.org/officeDocument/2006/relationships" xmlns:p="http://schemas.openxmlformats.org/presentationml/2006/main">
+  <p:cSld>
+    <p:spTree>
+      <p:nvGrpSpPr>
+        <p:cNvPr id="1" name=""/>
+        <p:cNvGrpSpPr/>
+        <p:nvPr/>
+      </p:nvGrpSpPr>
+      <p:grpSpPr>
+        <a:xfrm>
+          <a:off x="0" y="0"/>
+          <a:ext cx="0" cy="0"/>
+          <a:chOff x="0" y="0"/>
+          <a:chExt cx="0" cy="0"/>
+        </a:xfrm>
+      </p:grpSpPr>
+      <p:sp>
+        <p:nvSpPr>
+          <p:cNvPr id="2" name="Pladsholder til tekst 1"/>
+          <p:cNvSpPr>
+            <a:spLocks noGrp="1"/>
+          </p:cNvSpPr>
+          <p:nvPr>
+            <p:ph type="body" sz="quarter" idx="36"/>
+          </p:nvPr>
+        </p:nvSpPr>
+        <p:spPr/>
+        <p:txBody>
+          <a:bodyPr/>
+          <a:lstStyle/>
+          <a:p>
+            <a:r>
+              <a:rPr lang="da-DK" dirty="0"/>
+              <a:t>Semesterprojekt, 1. Semester: Projektgrundlag</a:t>
+            </a:r>
+          </a:p>
+          <a:p>
+            <a:r>
+              <a:rPr lang="da-DK" dirty="0"/>
+              <a:t>Gruppe 7; Christopher, Markus, Nichlas, Anders, Sarah og Teis</a:t>
+            </a:r>
+          </a:p>
+        </p:txBody>
+      </p:sp>
+      <p:sp>
+        <p:nvSpPr>
+          <p:cNvPr id="19" name="Pladsholder til tekst 18"/>
+          <p:cNvSpPr>
+            <a:spLocks noGrp="1"/>
+          </p:cNvSpPr>
+          <p:nvPr>
+            <p:ph type="body" sz="quarter" idx="56"/>
+          </p:nvPr>
+        </p:nvSpPr>
+        <p:spPr/>
+        <p:txBody>
+          <a:bodyPr/>
+          <a:lstStyle/>
+          <a:p>
+            <a:r>
+              <a:rPr lang="da-DK" dirty="0"/>
+              <a:t>Software Engineering/Technology, Det tekniske fakultet, Syddansk Universitet</a:t>
+            </a:r>
+          </a:p>
+        </p:txBody>
+      </p:sp>
+      <p:sp>
+        <p:nvSpPr>
+          <p:cNvPr id="20" name="Pladsholder til tekst 19"/>
+          <p:cNvSpPr>
+            <a:spLocks noGrp="1"/>
+          </p:cNvSpPr>
+          <p:nvPr>
+            <p:ph type="body" sz="quarter" idx="57"/>
+          </p:nvPr>
+        </p:nvSpPr>
+        <p:spPr/>
+        <p:txBody>
+          <a:bodyPr/>
+          <a:lstStyle/>
+          <a:p>
+            <a:r>
+              <a:rPr lang="da-DK" dirty="0"/>
+              <a:t>SDU.DK</a:t>
+            </a:r>
+          </a:p>
+        </p:txBody>
+      </p:sp>
+      <p:sp>
+        <p:nvSpPr>
+          <p:cNvPr id="24" name="Titel 23"/>
+          <p:cNvSpPr>
+            <a:spLocks noGrp="1"/>
+          </p:cNvSpPr>
+          <p:nvPr>
+            <p:ph type="title"/>
+          </p:nvPr>
+        </p:nvSpPr>
+        <p:spPr>
+          <a:xfrm>
+            <a:off x="1160218" y="1551540"/>
+            <a:ext cx="30324954" cy="2445308"/>
+          </a:xfrm>
+        </p:spPr>
+        <p:txBody>
+          <a:bodyPr>
+            <a:normAutofit fontScale="90000"/>
+          </a:bodyPr>
+          <a:lstStyle/>
+          <a:p>
+            <a:r>
+              <a:rPr lang="da-DK" dirty="0" err="1"/>
+              <a:t>Kill</a:t>
+            </a:r>
+            <a:r>
+              <a:rPr lang="da-DK" dirty="0"/>
+              <a:t> The </a:t>
+            </a:r>
+            <a:r>
+              <a:rPr lang="da-DK" dirty="0" err="1"/>
+              <a:t>Killers</a:t>
+            </a:r>
+            <a:r>
+              <a:rPr lang="da-DK" dirty="0"/>
+              <a:t> </a:t>
+            </a:r>
+            <a:br>
+              <a:rPr lang="da-DK" dirty="0"/>
+            </a:br>
+            <a:r>
+              <a:rPr lang="da-DK" b="0" dirty="0"/>
+              <a:t>🦟 💉 🍆 🧤</a:t>
+            </a:r>
+            <a:br>
+              <a:rPr lang="da-DK" dirty="0"/>
+            </a:br>
+            <a:endParaRPr lang="da-DK" dirty="0"/>
+          </a:p>
+        </p:txBody>
+      </p:sp>
+      <p:sp>
+        <p:nvSpPr>
+          <p:cNvPr id="31" name="Pladsholder til indhold 16">
+            <a:extLst>
+              <a:ext uri="{FF2B5EF4-FFF2-40B4-BE49-F238E27FC236}">
+                <a16:creationId xmlns:a16="http://schemas.microsoft.com/office/drawing/2014/main" id="{1607F8FD-3912-4D44-856E-3884BE6A0398}"/>
+              </a:ext>
+            </a:extLst>
+          </p:cNvPr>
+          <p:cNvSpPr txBox="1">
+            <a:spLocks/>
+          </p:cNvSpPr>
+          <p:nvPr/>
+        </p:nvSpPr>
+        <p:spPr>
+          <a:xfrm>
+            <a:off x="14323455" y="25282528"/>
+            <a:ext cx="12486746" cy="4286052"/>
+          </a:xfrm>
+          <a:prstGeom prst="rect">
+            <a:avLst/>
+          </a:prstGeom>
+        </p:spPr>
+        <p:txBody>
+          <a:bodyPr vert="horz" lIns="0" tIns="174010" rIns="87005" bIns="43503" numCol="2" spcCol="360000" rtlCol="0">
+            <a:noAutofit/>
+          </a:bodyPr>
+          <a:lstStyle>
+            <a:lvl1pPr marL="0" marR="0" indent="0" algn="l" defTabSz="4176248" rtl="0" eaLnBrk="1" fontAlgn="auto" latinLnBrk="0" hangingPunct="1">
+              <a:lnSpc>
+                <a:spcPct val="100000"/>
+              </a:lnSpc>
+              <a:spcBef>
+                <a:spcPts val="600"/>
+              </a:spcBef>
+              <a:spcAft>
+                <a:spcPts val="0"/>
+              </a:spcAft>
+              <a:buClr>
+                <a:schemeClr val="accent2"/>
+              </a:buClr>
+              <a:buSzTx/>
+              <a:buFont typeface="Arial" panose="020B0604020202020204" pitchFamily="34" charset="0"/>
+              <a:buNone/>
+              <a:tabLst/>
+              <a:defRPr lang="da-DK" sz="2700" b="0" i="0" kern="1200" baseline="0">
+                <a:solidFill>
+                  <a:schemeClr val="tx1"/>
+                </a:solidFill>
+                <a:latin typeface="Arial"/>
+                <a:ea typeface="Segoe UI" panose="020B0502040204020203" pitchFamily="34" charset="0"/>
+                <a:cs typeface="Arial"/>
+              </a:defRPr>
+            </a:lvl1pPr>
+            <a:lvl2pPr marL="609036" indent="0" algn="l" defTabSz="4176248" rtl="0" eaLnBrk="1" latinLnBrk="0" hangingPunct="1">
+              <a:lnSpc>
+                <a:spcPct val="100000"/>
+              </a:lnSpc>
+              <a:spcBef>
+                <a:spcPts val="1142"/>
+              </a:spcBef>
+              <a:buClr>
+                <a:schemeClr val="accent2"/>
+              </a:buClr>
+              <a:buFont typeface="Arial" panose="020B0604020202020204" pitchFamily="34" charset="0"/>
+              <a:buNone/>
+              <a:defRPr lang="da-DK" sz="2300" b="0" i="0" kern="1200">
+                <a:solidFill>
+                  <a:schemeClr val="tx1"/>
+                </a:solidFill>
+                <a:latin typeface="Arial"/>
+                <a:ea typeface="Segoe UI" panose="020B0502040204020203" pitchFamily="34" charset="0"/>
+                <a:cs typeface="Arial"/>
+              </a:defRPr>
+            </a:lvl2pPr>
+            <a:lvl3pPr marL="609036" indent="0" algn="l" defTabSz="4176248" rtl="0" eaLnBrk="1" latinLnBrk="0" hangingPunct="1">
+              <a:lnSpc>
+                <a:spcPct val="100000"/>
+              </a:lnSpc>
+              <a:spcBef>
+                <a:spcPts val="1142"/>
+              </a:spcBef>
+              <a:buClr>
+                <a:schemeClr val="accent2"/>
+              </a:buClr>
+              <a:buFont typeface="Arial" panose="020B0604020202020204" pitchFamily="34" charset="0"/>
+              <a:buNone/>
+              <a:defRPr lang="da-DK" sz="2300" b="0" i="0" kern="1200">
+                <a:solidFill>
+                  <a:schemeClr val="tx1"/>
+                </a:solidFill>
+                <a:latin typeface="Arial"/>
+                <a:ea typeface="Segoe UI" panose="020B0502040204020203" pitchFamily="34" charset="0"/>
+                <a:cs typeface="Arial"/>
+              </a:defRPr>
+            </a:lvl3pPr>
+            <a:lvl4pPr marL="609036" indent="0" algn="l" defTabSz="4176248" rtl="0" eaLnBrk="1" latinLnBrk="0" hangingPunct="1">
+              <a:lnSpc>
+                <a:spcPct val="100000"/>
+              </a:lnSpc>
+              <a:spcBef>
+                <a:spcPts val="1142"/>
+              </a:spcBef>
+              <a:buClr>
+                <a:schemeClr val="accent2"/>
+              </a:buClr>
+              <a:buFont typeface="Arial" panose="020B0604020202020204" pitchFamily="34" charset="0"/>
+              <a:buNone/>
+              <a:defRPr lang="da-DK" sz="2300" b="0" i="0" kern="1200">
+                <a:solidFill>
+                  <a:schemeClr val="tx1"/>
+                </a:solidFill>
+                <a:latin typeface="Arial"/>
+                <a:ea typeface="Segoe UI" panose="020B0502040204020203" pitchFamily="34" charset="0"/>
+                <a:cs typeface="Arial"/>
+              </a:defRPr>
+            </a:lvl4pPr>
+            <a:lvl5pPr marL="609036" indent="0" algn="l" defTabSz="4176248" rtl="0" eaLnBrk="1" latinLnBrk="0" hangingPunct="1">
+              <a:lnSpc>
+                <a:spcPct val="100000"/>
+              </a:lnSpc>
+              <a:spcBef>
+                <a:spcPts val="1142"/>
+              </a:spcBef>
+              <a:buClr>
+                <a:schemeClr val="accent2"/>
+              </a:buClr>
+              <a:buFont typeface="Arial" panose="020B0604020202020204" pitchFamily="34" charset="0"/>
+              <a:buNone/>
+              <a:defRPr lang="da-DK" sz="2300" b="0" i="0" kern="1200">
+                <a:solidFill>
+                  <a:schemeClr val="tx1"/>
+                </a:solidFill>
+                <a:latin typeface="Arial"/>
+                <a:ea typeface="Segoe UI" panose="020B0502040204020203" pitchFamily="34" charset="0"/>
+                <a:cs typeface="Arial"/>
+              </a:defRPr>
+            </a:lvl5pPr>
+            <a:lvl6pPr marL="609036" indent="0" algn="l" defTabSz="4176248" rtl="0" eaLnBrk="1" latinLnBrk="0" hangingPunct="1">
+              <a:lnSpc>
+                <a:spcPct val="100000"/>
+              </a:lnSpc>
+              <a:spcBef>
+                <a:spcPts val="1142"/>
+              </a:spcBef>
+              <a:buClr>
+                <a:schemeClr val="accent2"/>
+              </a:buClr>
+              <a:buFont typeface="Arial" panose="020B0604020202020204" pitchFamily="34" charset="0"/>
+              <a:buNone/>
+              <a:defRPr lang="da-DK" sz="2300" b="0" i="0" kern="1200">
+                <a:solidFill>
+                  <a:schemeClr val="tx1"/>
+                </a:solidFill>
+                <a:latin typeface="Arial"/>
+                <a:ea typeface="Segoe UI" panose="020B0502040204020203" pitchFamily="34" charset="0"/>
+                <a:cs typeface="Arial"/>
+              </a:defRPr>
+            </a:lvl6pPr>
+            <a:lvl7pPr marL="609036" indent="0" algn="l" defTabSz="4176248" rtl="0" eaLnBrk="1" latinLnBrk="0" hangingPunct="1">
+              <a:lnSpc>
+                <a:spcPct val="100000"/>
+              </a:lnSpc>
+              <a:spcBef>
+                <a:spcPts val="1142"/>
+              </a:spcBef>
+              <a:buClr>
+                <a:schemeClr val="accent2"/>
+              </a:buClr>
+              <a:buFont typeface="Arial" panose="020B0604020202020204" pitchFamily="34" charset="0"/>
+              <a:buNone/>
+              <a:defRPr lang="da-DK" sz="2300" b="0" i="0" kern="1200">
+                <a:solidFill>
+                  <a:schemeClr val="tx1"/>
+                </a:solidFill>
+                <a:latin typeface="Arial"/>
+                <a:ea typeface="Segoe UI" panose="020B0502040204020203" pitchFamily="34" charset="0"/>
+                <a:cs typeface="Arial"/>
+              </a:defRPr>
+            </a:lvl7pPr>
+            <a:lvl8pPr marL="609036" indent="0" algn="l" defTabSz="4176248" rtl="0" eaLnBrk="1" latinLnBrk="0" hangingPunct="1">
+              <a:lnSpc>
+                <a:spcPct val="100000"/>
+              </a:lnSpc>
+              <a:spcBef>
+                <a:spcPts val="1142"/>
+              </a:spcBef>
+              <a:buClr>
+                <a:schemeClr val="accent2"/>
+              </a:buClr>
+              <a:buFont typeface="Arial" panose="020B0604020202020204" pitchFamily="34" charset="0"/>
+              <a:buNone/>
+              <a:defRPr lang="da-DK" sz="2300" b="0" i="0" kern="1200">
+                <a:solidFill>
+                  <a:schemeClr val="tx1"/>
+                </a:solidFill>
+                <a:latin typeface="Arial"/>
+                <a:ea typeface="Segoe UI" panose="020B0502040204020203" pitchFamily="34" charset="0"/>
+                <a:cs typeface="Arial"/>
+              </a:defRPr>
+            </a:lvl8pPr>
+            <a:lvl9pPr marL="609036" indent="0" algn="l" defTabSz="4176248" rtl="0" eaLnBrk="1" latinLnBrk="0" hangingPunct="1">
+              <a:lnSpc>
+                <a:spcPct val="100000"/>
+              </a:lnSpc>
+              <a:spcBef>
+                <a:spcPts val="1142"/>
+              </a:spcBef>
+              <a:buClr>
+                <a:schemeClr val="accent2"/>
+              </a:buClr>
+              <a:buFont typeface="Arial" panose="020B0604020202020204" pitchFamily="34" charset="0"/>
+              <a:buNone/>
+              <a:defRPr lang="da-DK" sz="2300" b="0" i="0" kern="1200">
+                <a:solidFill>
+                  <a:schemeClr val="tx1"/>
+                </a:solidFill>
+                <a:latin typeface="Arial"/>
+                <a:ea typeface="Segoe UI" panose="020B0502040204020203" pitchFamily="34" charset="0"/>
+                <a:cs typeface="Arial"/>
+              </a:defRPr>
+            </a:lvl9pPr>
+          </a:lstStyle>
+          <a:p>
+            <a:endParaRPr lang="da-DK" dirty="0"/>
+          </a:p>
+        </p:txBody>
+      </p:sp>
+      <p:pic>
+        <p:nvPicPr>
+          <p:cNvPr id="1028" name="Picture 4" descr="https://scontent-arn2-1.xx.fbcdn.net/v/t1.15752-9/72390896_431101910871949_4285249782168944640_n.jpg?_nc_cat=105&amp;_nc_oc=AQk_-pvvz20L_oWzc94kk2T6rnPmGPabDL0-grNR2DzTbJ5Ckt3eDZ8jf76HLaOOIOU&amp;_nc_ht=scontent-arn2-1.xx&amp;oh=e087845499a036c5332b8cab8241fa61&amp;oe=5DF32336"/>
+          <p:cNvPicPr>
+            <a:picLocks noChangeAspect="1" noChangeArrowheads="1"/>
+          </p:cNvPicPr>
+          <p:nvPr/>
+        </p:nvPicPr>
+        <p:blipFill rotWithShape="1">
+          <a:blip r:embed="rId2">
+            <a:extLst>
+              <a:ext uri="{28A0092B-C50C-407E-A947-70E740481C1C}">
+                <a14:useLocalDpi xmlns:a14="http://schemas.microsoft.com/office/drawing/2010/main" val="0"/>
+              </a:ext>
+            </a:extLst>
+          </a:blip>
+          <a:srcRect l="3843" t="33634" r="5134" b="6240"/>
+          <a:stretch/>
+        </p:blipFill>
+        <p:spPr bwMode="auto">
+          <a:xfrm>
+            <a:off x="15842428" y="805809"/>
+            <a:ext cx="4724400" cy="3120753"/>
+          </a:xfrm>
+          <a:prstGeom prst="rect">
+            <a:avLst/>
+          </a:prstGeom>
+          <a:noFill/>
+          <a:extLst>
+            <a:ext uri="{909E8E84-426E-40DD-AFC4-6F175D3DCCD1}">
+              <a14:hiddenFill xmlns:a14="http://schemas.microsoft.com/office/drawing/2010/main">
+                <a:solidFill>
+                  <a:srgbClr val="FFFFFF"/>
+                </a:solidFill>
+              </a14:hiddenFill>
+            </a:ext>
+          </a:extLst>
+        </p:spPr>
+      </p:pic>
+      <p:sp>
+        <p:nvSpPr>
+          <p:cNvPr id="41" name="Pladsholder til indhold 17">
+            <a:extLst>
+              <a:ext uri="{FF2B5EF4-FFF2-40B4-BE49-F238E27FC236}">
+                <a16:creationId xmlns:a16="http://schemas.microsoft.com/office/drawing/2014/main" id="{AAF47011-23B6-4F36-B93C-F878464C7491}"/>
+              </a:ext>
+            </a:extLst>
+          </p:cNvPr>
+          <p:cNvSpPr txBox="1">
+            <a:spLocks/>
+          </p:cNvSpPr>
+          <p:nvPr/>
+        </p:nvSpPr>
+        <p:spPr>
+          <a:xfrm>
+            <a:off x="14999946" y="4363353"/>
+            <a:ext cx="12486746" cy="6538269"/>
+          </a:xfrm>
+          <a:prstGeom prst="rect">
+            <a:avLst/>
+          </a:prstGeom>
+        </p:spPr>
+        <p:txBody>
+          <a:bodyPr vert="horz" lIns="0" tIns="174010" rIns="87005" bIns="43503" numCol="2" spcCol="360000" rtlCol="0">
+            <a:noAutofit/>
+          </a:bodyPr>
+          <a:lstStyle>
+            <a:lvl1pPr marL="0" marR="0" indent="0" algn="l" defTabSz="4176248" rtl="0" eaLnBrk="1" fontAlgn="auto" latinLnBrk="0" hangingPunct="1">
+              <a:lnSpc>
+                <a:spcPct val="100000"/>
+              </a:lnSpc>
+              <a:spcBef>
+                <a:spcPts val="600"/>
+              </a:spcBef>
+              <a:spcAft>
+                <a:spcPts val="0"/>
+              </a:spcAft>
+              <a:buClr>
+                <a:schemeClr val="accent2"/>
+              </a:buClr>
+              <a:buSzTx/>
+              <a:buFont typeface="Arial" panose="020B0604020202020204" pitchFamily="34" charset="0"/>
+              <a:buNone/>
+              <a:tabLst/>
+              <a:defRPr lang="da-DK" sz="2700" b="0" i="0" kern="1200" baseline="0">
+                <a:solidFill>
+                  <a:schemeClr val="tx1"/>
+                </a:solidFill>
+                <a:latin typeface="Arial"/>
+                <a:ea typeface="Segoe UI" panose="020B0502040204020203" pitchFamily="34" charset="0"/>
+                <a:cs typeface="Arial"/>
+              </a:defRPr>
+            </a:lvl1pPr>
+            <a:lvl2pPr marL="609036" indent="0" algn="l" defTabSz="4176248" rtl="0" eaLnBrk="1" latinLnBrk="0" hangingPunct="1">
+              <a:lnSpc>
+                <a:spcPct val="100000"/>
+              </a:lnSpc>
+              <a:spcBef>
+                <a:spcPts val="1142"/>
+              </a:spcBef>
+              <a:buClr>
+                <a:schemeClr val="accent2"/>
+              </a:buClr>
+              <a:buFont typeface="Arial" panose="020B0604020202020204" pitchFamily="34" charset="0"/>
+              <a:buNone/>
+              <a:defRPr lang="da-DK" sz="2300" b="0" i="0" kern="1200">
+                <a:solidFill>
+                  <a:schemeClr val="tx1"/>
+                </a:solidFill>
+                <a:latin typeface="Arial"/>
+                <a:ea typeface="Segoe UI" panose="020B0502040204020203" pitchFamily="34" charset="0"/>
+                <a:cs typeface="Arial"/>
+              </a:defRPr>
+            </a:lvl2pPr>
+            <a:lvl3pPr marL="609036" indent="0" algn="l" defTabSz="4176248" rtl="0" eaLnBrk="1" latinLnBrk="0" hangingPunct="1">
+              <a:lnSpc>
+                <a:spcPct val="100000"/>
+              </a:lnSpc>
+              <a:spcBef>
+                <a:spcPts val="1142"/>
+              </a:spcBef>
+              <a:buClr>
+                <a:schemeClr val="accent2"/>
+              </a:buClr>
+              <a:buFont typeface="Arial" panose="020B0604020202020204" pitchFamily="34" charset="0"/>
+              <a:buNone/>
+              <a:defRPr lang="da-DK" sz="2300" b="0" i="0" kern="1200">
+                <a:solidFill>
+                  <a:schemeClr val="tx1"/>
+                </a:solidFill>
+                <a:latin typeface="Arial"/>
+                <a:ea typeface="Segoe UI" panose="020B0502040204020203" pitchFamily="34" charset="0"/>
+                <a:cs typeface="Arial"/>
+              </a:defRPr>
+            </a:lvl3pPr>
+            <a:lvl4pPr marL="609036" indent="0" algn="l" defTabSz="4176248" rtl="0" eaLnBrk="1" latinLnBrk="0" hangingPunct="1">
+              <a:lnSpc>
+                <a:spcPct val="100000"/>
+              </a:lnSpc>
+              <a:spcBef>
+                <a:spcPts val="1142"/>
+              </a:spcBef>
+              <a:buClr>
+                <a:schemeClr val="accent2"/>
+              </a:buClr>
+              <a:buFont typeface="Arial" panose="020B0604020202020204" pitchFamily="34" charset="0"/>
+              <a:buNone/>
+              <a:defRPr lang="da-DK" sz="2300" b="0" i="0" kern="1200">
+                <a:solidFill>
+                  <a:schemeClr val="tx1"/>
+                </a:solidFill>
+                <a:latin typeface="Arial"/>
+                <a:ea typeface="Segoe UI" panose="020B0502040204020203" pitchFamily="34" charset="0"/>
+                <a:cs typeface="Arial"/>
+              </a:defRPr>
+            </a:lvl4pPr>
+            <a:lvl5pPr marL="609036" indent="0" algn="l" defTabSz="4176248" rtl="0" eaLnBrk="1" latinLnBrk="0" hangingPunct="1">
+              <a:lnSpc>
+                <a:spcPct val="100000"/>
+              </a:lnSpc>
+              <a:spcBef>
+                <a:spcPts val="1142"/>
+              </a:spcBef>
+              <a:buClr>
+                <a:schemeClr val="accent2"/>
+              </a:buClr>
+              <a:buFont typeface="Arial" panose="020B0604020202020204" pitchFamily="34" charset="0"/>
+              <a:buNone/>
+              <a:defRPr lang="da-DK" sz="2300" b="0" i="0" kern="1200">
+                <a:solidFill>
+                  <a:schemeClr val="tx1"/>
+                </a:solidFill>
+                <a:latin typeface="Arial"/>
+                <a:ea typeface="Segoe UI" panose="020B0502040204020203" pitchFamily="34" charset="0"/>
+                <a:cs typeface="Arial"/>
+              </a:defRPr>
+            </a:lvl5pPr>
+            <a:lvl6pPr marL="609036" indent="0" algn="l" defTabSz="4176248" rtl="0" eaLnBrk="1" latinLnBrk="0" hangingPunct="1">
+              <a:lnSpc>
+                <a:spcPct val="100000"/>
+              </a:lnSpc>
+              <a:spcBef>
+                <a:spcPts val="1142"/>
+              </a:spcBef>
+              <a:buClr>
+                <a:schemeClr val="accent2"/>
+              </a:buClr>
+              <a:buFont typeface="Arial" panose="020B0604020202020204" pitchFamily="34" charset="0"/>
+              <a:buNone/>
+              <a:defRPr lang="da-DK" sz="2300" b="0" i="0" kern="1200">
+                <a:solidFill>
+                  <a:schemeClr val="tx1"/>
+                </a:solidFill>
+                <a:latin typeface="Arial"/>
+                <a:ea typeface="Segoe UI" panose="020B0502040204020203" pitchFamily="34" charset="0"/>
+                <a:cs typeface="Arial"/>
+              </a:defRPr>
+            </a:lvl6pPr>
+            <a:lvl7pPr marL="609036" indent="0" algn="l" defTabSz="4176248" rtl="0" eaLnBrk="1" latinLnBrk="0" hangingPunct="1">
+              <a:lnSpc>
+                <a:spcPct val="100000"/>
+              </a:lnSpc>
+              <a:spcBef>
+                <a:spcPts val="1142"/>
+              </a:spcBef>
+              <a:buClr>
+                <a:schemeClr val="accent2"/>
+              </a:buClr>
+              <a:buFont typeface="Arial" panose="020B0604020202020204" pitchFamily="34" charset="0"/>
+              <a:buNone/>
+              <a:defRPr lang="da-DK" sz="2300" b="0" i="0" kern="1200">
+                <a:solidFill>
+                  <a:schemeClr val="tx1"/>
+                </a:solidFill>
+                <a:latin typeface="Arial"/>
+                <a:ea typeface="Segoe UI" panose="020B0502040204020203" pitchFamily="34" charset="0"/>
+                <a:cs typeface="Arial"/>
+              </a:defRPr>
+            </a:lvl7pPr>
+            <a:lvl8pPr marL="609036" indent="0" algn="l" defTabSz="4176248" rtl="0" eaLnBrk="1" latinLnBrk="0" hangingPunct="1">
+              <a:lnSpc>
+                <a:spcPct val="100000"/>
+              </a:lnSpc>
+              <a:spcBef>
+                <a:spcPts val="1142"/>
+              </a:spcBef>
+              <a:buClr>
+                <a:schemeClr val="accent2"/>
+              </a:buClr>
+              <a:buFont typeface="Arial" panose="020B0604020202020204" pitchFamily="34" charset="0"/>
+              <a:buNone/>
+              <a:defRPr lang="da-DK" sz="2300" b="0" i="0" kern="1200">
+                <a:solidFill>
+                  <a:schemeClr val="tx1"/>
+                </a:solidFill>
+                <a:latin typeface="Arial"/>
+                <a:ea typeface="Segoe UI" panose="020B0502040204020203" pitchFamily="34" charset="0"/>
+                <a:cs typeface="Arial"/>
+              </a:defRPr>
+            </a:lvl8pPr>
+            <a:lvl9pPr marL="609036" indent="0" algn="l" defTabSz="4176248" rtl="0" eaLnBrk="1" latinLnBrk="0" hangingPunct="1">
+              <a:lnSpc>
+                <a:spcPct val="100000"/>
+              </a:lnSpc>
+              <a:spcBef>
+                <a:spcPts val="1142"/>
+              </a:spcBef>
+              <a:buClr>
+                <a:schemeClr val="accent2"/>
+              </a:buClr>
+              <a:buFont typeface="Arial" panose="020B0604020202020204" pitchFamily="34" charset="0"/>
+              <a:buNone/>
+              <a:defRPr lang="da-DK" sz="2300" b="0" i="0" kern="1200">
+                <a:solidFill>
+                  <a:schemeClr val="tx1"/>
+                </a:solidFill>
+                <a:latin typeface="Arial"/>
+                <a:ea typeface="Segoe UI" panose="020B0502040204020203" pitchFamily="34" charset="0"/>
+                <a:cs typeface="Arial"/>
+              </a:defRPr>
+            </a:lvl9pPr>
+          </a:lstStyle>
+          <a:p>
+            <a:endParaRPr lang="da-DK" sz="2400" dirty="0"/>
+          </a:p>
+        </p:txBody>
+      </p:sp>
+      <p:pic>
+        <p:nvPicPr>
+          <p:cNvPr id="35" name="Picture 4" descr="https://scontent-arn2-1.xx.fbcdn.net/v/t1.15752-9/72390896_431101910871949_4285249782168944640_n.jpg?_nc_cat=105&amp;_nc_oc=AQk_-pvvz20L_oWzc94kk2T6rnPmGPabDL0-grNR2DzTbJ5Ckt3eDZ8jf76HLaOOIOU&amp;_nc_ht=scontent-arn2-1.xx&amp;oh=e087845499a036c5332b8cab8241fa61&amp;oe=5DF32336">
+            <a:extLst>
+              <a:ext uri="{FF2B5EF4-FFF2-40B4-BE49-F238E27FC236}">
+                <a16:creationId xmlns:a16="http://schemas.microsoft.com/office/drawing/2014/main" id="{7CB1BEB6-7D41-440A-B269-43C5F746A634}"/>
+              </a:ext>
+            </a:extLst>
+          </p:cNvPr>
+          <p:cNvPicPr>
+            <a:picLocks noChangeAspect="1" noChangeArrowheads="1"/>
+          </p:cNvPicPr>
+          <p:nvPr/>
+        </p:nvPicPr>
+        <p:blipFill rotWithShape="1">
+          <a:blip r:embed="rId2">
+            <a:extLst>
+              <a:ext uri="{28A0092B-C50C-407E-A947-70E740481C1C}">
+                <a14:useLocalDpi xmlns:a14="http://schemas.microsoft.com/office/drawing/2010/main" val="0"/>
+              </a:ext>
+            </a:extLst>
+          </a:blip>
+          <a:srcRect l="3843" t="5475" r="5134" b="63865"/>
+          <a:stretch/>
+        </p:blipFill>
+        <p:spPr bwMode="auto">
+          <a:xfrm>
+            <a:off x="20566828" y="1764323"/>
+            <a:ext cx="4724400" cy="1591366"/>
+          </a:xfrm>
+          <a:prstGeom prst="rect">
+            <a:avLst/>
+          </a:prstGeom>
+          <a:noFill/>
+          <a:extLst>
+            <a:ext uri="{909E8E84-426E-40DD-AFC4-6F175D3DCCD1}">
+              <a14:hiddenFill xmlns:a14="http://schemas.microsoft.com/office/drawing/2010/main">
+                <a:solidFill>
+                  <a:srgbClr val="FFFFFF"/>
+                </a:solidFill>
+              </a14:hiddenFill>
+            </a:ext>
+          </a:extLst>
+        </p:spPr>
+      </p:pic>
+      <p:pic>
+        <p:nvPicPr>
+          <p:cNvPr id="59" name="Billede 58" descr="Et billede, der indeholder ur, computer&#10;&#10;Automatisk genereret beskrivelse">
+            <a:extLst>
+              <a:ext uri="{FF2B5EF4-FFF2-40B4-BE49-F238E27FC236}">
+                <a16:creationId xmlns:a16="http://schemas.microsoft.com/office/drawing/2014/main" id="{706BC0B8-6D93-498F-BA3C-A8F09F58617E}"/>
+              </a:ext>
+            </a:extLst>
+          </p:cNvPr>
+          <p:cNvPicPr>
+            <a:picLocks noChangeAspect="1"/>
+          </p:cNvPicPr>
+          <p:nvPr/>
+        </p:nvPicPr>
+        <p:blipFill>
+          <a:blip r:embed="rId3">
+            <a:extLst>
+              <a:ext uri="{28A0092B-C50C-407E-A947-70E740481C1C}">
+                <a14:useLocalDpi xmlns:a14="http://schemas.microsoft.com/office/drawing/2010/main" val="0"/>
+              </a:ext>
+            </a:extLst>
+          </a:blip>
+          <a:stretch>
+            <a:fillRect/>
+          </a:stretch>
+        </p:blipFill>
+        <p:spPr>
+          <a:xfrm>
+            <a:off x="3936254" y="4672293"/>
+            <a:ext cx="33261147" cy="24761077"/>
+          </a:xfrm>
+          <a:prstGeom prst="rect">
+            <a:avLst/>
+          </a:prstGeom>
+        </p:spPr>
+      </p:pic>
+    </p:spTree>
+    <p:extLst>
+      <p:ext uri="{BB962C8B-B14F-4D97-AF65-F5344CB8AC3E}">
+        <p14:creationId xmlns:p14="http://schemas.microsoft.com/office/powerpoint/2010/main" val="1738105663"/>
       </p:ext>
     </p:extLst>
   </p:cSld>
@@ -19391,6 +22234,21 @@
 </file>
 
 <file path=customXml/item1.xml><?xml version="1.0" encoding="utf-8"?>
+<p:properties xmlns:p="http://schemas.microsoft.com/office/2006/metadata/properties" xmlns:xsi="http://www.w3.org/2001/XMLSchema-instance" xmlns:pc="http://schemas.microsoft.com/office/infopath/2007/PartnerControls">
+  <documentManagement/>
+</p:properties>
+</file>
+
+<file path=customXml/item2.xml><?xml version="1.0" encoding="utf-8"?>
+<?mso-contentType ?>
+<FormTemplates xmlns="http://schemas.microsoft.com/sharepoint/v3/contenttype/forms">
+  <Display>DocumentLibraryForm</Display>
+  <Edit>DocumentLibraryForm</Edit>
+  <New>DocumentLibraryForm</New>
+</FormTemplates>
+</file>
+
+<file path=customXml/item3.xml><?xml version="1.0" encoding="utf-8"?>
 <ct:contentTypeSchema xmlns:ct="http://schemas.microsoft.com/office/2006/metadata/contentType" xmlns:ma="http://schemas.microsoft.com/office/2006/metadata/properties/metaAttributes" ct:_="" ma:_="" ma:contentTypeName="Dokument" ma:contentTypeID="0x010100705BEAF5D872DA499823F797437E7341" ma:contentTypeVersion="11" ma:contentTypeDescription="Opret et nyt dokument." ma:contentTypeScope="" ma:versionID="5b73fa5b6c98d35d5010583208db5e3d">
   <xsd:schema xmlns:xsd="http://www.w3.org/2001/XMLSchema" xmlns:xs="http://www.w3.org/2001/XMLSchema" xmlns:p="http://schemas.microsoft.com/office/2006/metadata/properties" xmlns:ns3="c6bc709f-863b-49b4-8d11-9df04d7d8c8d" xmlns:ns4="c6cdbaf4-18b0-44f6-b873-cf97097531c9" targetNamespace="http://schemas.microsoft.com/office/2006/metadata/properties" ma:root="true" ma:fieldsID="0f876c6c951b769f902df5666974d9fc" ns3:_="" ns4:_="">
     <xsd:import namespace="c6bc709f-863b-49b4-8d11-9df04d7d8c8d"/>
@@ -19599,22 +22457,24 @@
 </ct:contentTypeSchema>
 </file>
 
-<file path=customXml/item2.xml><?xml version="1.0" encoding="utf-8"?>
-<?mso-contentType ?>
-<FormTemplates xmlns="http://schemas.microsoft.com/sharepoint/v3/contenttype/forms">
-  <Display>DocumentLibraryForm</Display>
-  <Edit>DocumentLibraryForm</Edit>
-  <New>DocumentLibraryForm</New>
-</FormTemplates>
+<file path=customXml/itemProps1.xml><?xml version="1.0" encoding="utf-8"?>
+<ds:datastoreItem xmlns:ds="http://schemas.openxmlformats.org/officeDocument/2006/customXml" ds:itemID="{1E4AACF7-51B1-41A0-AAF9-D883E2E86D45}">
+  <ds:schemaRefs>
+    <ds:schemaRef ds:uri="http://schemas.microsoft.com/office/2006/metadata/properties"/>
+    <ds:schemaRef ds:uri="http://schemas.microsoft.com/office/infopath/2007/PartnerControls"/>
+  </ds:schemaRefs>
+</ds:datastoreItem>
 </file>
 
-<file path=customXml/item3.xml><?xml version="1.0" encoding="utf-8"?>
-<p:properties xmlns:p="http://schemas.microsoft.com/office/2006/metadata/properties" xmlns:xsi="http://www.w3.org/2001/XMLSchema-instance" xmlns:pc="http://schemas.microsoft.com/office/infopath/2007/PartnerControls">
-  <documentManagement/>
-</p:properties>
+<file path=customXml/itemProps2.xml><?xml version="1.0" encoding="utf-8"?>
+<ds:datastoreItem xmlns:ds="http://schemas.openxmlformats.org/officeDocument/2006/customXml" ds:itemID="{CDCE3ED8-2D07-4BA2-9005-4F3ED3D7E6E9}">
+  <ds:schemaRefs>
+    <ds:schemaRef ds:uri="http://schemas.microsoft.com/sharepoint/v3/contenttype/forms"/>
+  </ds:schemaRefs>
+</ds:datastoreItem>
 </file>
 
-<file path=customXml/itemProps1.xml><?xml version="1.0" encoding="utf-8"?>
+<file path=customXml/itemProps3.xml><?xml version="1.0" encoding="utf-8"?>
 <ds:datastoreItem xmlns:ds="http://schemas.openxmlformats.org/officeDocument/2006/customXml" ds:itemID="{561C6F91-99F1-44F1-B641-38E1B491A886}">
   <ds:schemaRefs>
     <ds:schemaRef ds:uri="http://schemas.microsoft.com/office/2006/metadata/contentType"/>
@@ -19631,21 +22491,4 @@
     <ds:schemaRef ds:uri="http://schemas.microsoft.com/internal/obd"/>
   </ds:schemaRefs>
 </ds:datastoreItem>
-</file>
-
-<file path=customXml/itemProps2.xml><?xml version="1.0" encoding="utf-8"?>
-<ds:datastoreItem xmlns:ds="http://schemas.openxmlformats.org/officeDocument/2006/customXml" ds:itemID="{CDCE3ED8-2D07-4BA2-9005-4F3ED3D7E6E9}">
-  <ds:schemaRefs>
-    <ds:schemaRef ds:uri="http://schemas.microsoft.com/sharepoint/v3/contenttype/forms"/>
-  </ds:schemaRefs>
-</ds:datastoreItem>
-</file>
-
-<file path=customXml/itemProps3.xml><?xml version="1.0" encoding="utf-8"?>
-<ds:datastoreItem xmlns:ds="http://schemas.openxmlformats.org/officeDocument/2006/customXml" ds:itemID="{1E4AACF7-51B1-41A0-AAF9-D883E2E86D45}">
-  <ds:schemaRefs>
-    <ds:schemaRef ds:uri="http://schemas.microsoft.com/office/2006/metadata/properties"/>
-    <ds:schemaRef ds:uri="http://schemas.microsoft.com/office/infopath/2007/PartnerControls"/>
-  </ds:schemaRefs>
-</ds:datastoreItem>
 </file>
</xml_diff>

<commit_message>
pptx right before seminar
</commit_message>
<xml_diff>
--- a/Files/poster/Poster - Projektgrundlag.pptx
+++ b/Files/poster/Poster - Projektgrundlag.pptx
@@ -162,7 +162,7 @@
 <file path=ppt/revisionInfo.xml><?xml version="1.0" encoding="utf-8"?>
 <p1510:revInfo xmlns:a="http://schemas.openxmlformats.org/drawingml/2006/main" xmlns:r="http://schemas.openxmlformats.org/officeDocument/2006/relationships" xmlns:p1510="http://schemas.microsoft.com/office/powerpoint/2015/10/main">
   <p1510:revLst>
-    <p1510:client id="{E165F5EC-B84B-4672-9FC0-8C64705214A4}" v="17" dt="2019-11-12T12:33:30.013"/>
+    <p1510:client id="{E165F5EC-B84B-4672-9FC0-8C64705214A4}" v="25" dt="2019-11-12T12:43:12.373"/>
   </p1510:revLst>
 </p1510:revInfo>
 </file>
@@ -172,7 +172,7 @@
   <pc:docChgLst>
     <pc:chgData name="Anders Wylardt Nielsen" userId="e0ee3fc7cf27fac6" providerId="LiveId" clId="{E165F5EC-B84B-4672-9FC0-8C64705214A4}"/>
     <pc:docChg chg="undo custSel addSld delSld modSld sldOrd">
-      <pc:chgData name="Anders Wylardt Nielsen" userId="e0ee3fc7cf27fac6" providerId="LiveId" clId="{E165F5EC-B84B-4672-9FC0-8C64705214A4}" dt="2019-11-12T12:36:43.642" v="172" actId="20577"/>
+      <pc:chgData name="Anders Wylardt Nielsen" userId="e0ee3fc7cf27fac6" providerId="LiveId" clId="{E165F5EC-B84B-4672-9FC0-8C64705214A4}" dt="2019-11-12T12:43:59.332" v="187" actId="47"/>
       <pc:docMkLst>
         <pc:docMk/>
       </pc:docMkLst>
@@ -825,6 +825,36 @@
             <ac:picMk id="58" creationId="{EAB34BC8-3C5D-4CAD-8574-792900AA53C8}"/>
           </ac:picMkLst>
         </pc:picChg>
+      </pc:sldChg>
+      <pc:sldChg chg="add del ord">
+        <pc:chgData name="Anders Wylardt Nielsen" userId="e0ee3fc7cf27fac6" providerId="LiveId" clId="{E165F5EC-B84B-4672-9FC0-8C64705214A4}" dt="2019-11-12T12:41:17.108" v="175" actId="47"/>
+        <pc:sldMkLst>
+          <pc:docMk/>
+          <pc:sldMk cId="1914189399" sldId="264"/>
+        </pc:sldMkLst>
+      </pc:sldChg>
+      <pc:sldChg chg="addSp delSp modSp add del">
+        <pc:chgData name="Anders Wylardt Nielsen" userId="e0ee3fc7cf27fac6" providerId="LiveId" clId="{E165F5EC-B84B-4672-9FC0-8C64705214A4}" dt="2019-11-12T12:43:59.332" v="187" actId="47"/>
+        <pc:sldMkLst>
+          <pc:docMk/>
+          <pc:sldMk cId="2373879386" sldId="264"/>
+        </pc:sldMkLst>
+        <pc:spChg chg="del mod">
+          <ac:chgData name="Anders Wylardt Nielsen" userId="e0ee3fc7cf27fac6" providerId="LiveId" clId="{E165F5EC-B84B-4672-9FC0-8C64705214A4}" dt="2019-11-12T12:41:27.982" v="179" actId="478"/>
+          <ac:spMkLst>
+            <pc:docMk/>
+            <pc:sldMk cId="2373879386" sldId="264"/>
+            <ac:spMk id="3" creationId="{40F3FF29-4D23-4AAF-A6B0-1B6072595132}"/>
+          </ac:spMkLst>
+        </pc:spChg>
+        <pc:graphicFrameChg chg="add del mod">
+          <ac:chgData name="Anders Wylardt Nielsen" userId="e0ee3fc7cf27fac6" providerId="LiveId" clId="{E165F5EC-B84B-4672-9FC0-8C64705214A4}" dt="2019-11-12T12:43:48.771" v="186" actId="478"/>
+          <ac:graphicFrameMkLst>
+            <pc:docMk/>
+            <pc:sldMk cId="2373879386" sldId="264"/>
+            <ac:graphicFrameMk id="4" creationId="{DD342826-2E46-486A-B56F-2D29A3EF72ED}"/>
+          </ac:graphicFrameMkLst>
+        </pc:graphicFrameChg>
       </pc:sldChg>
     </pc:docChg>
   </pc:docChgLst>
@@ -22234,21 +22264,6 @@
 </file>
 
 <file path=customXml/item1.xml><?xml version="1.0" encoding="utf-8"?>
-<p:properties xmlns:p="http://schemas.microsoft.com/office/2006/metadata/properties" xmlns:xsi="http://www.w3.org/2001/XMLSchema-instance" xmlns:pc="http://schemas.microsoft.com/office/infopath/2007/PartnerControls">
-  <documentManagement/>
-</p:properties>
-</file>
-
-<file path=customXml/item2.xml><?xml version="1.0" encoding="utf-8"?>
-<?mso-contentType ?>
-<FormTemplates xmlns="http://schemas.microsoft.com/sharepoint/v3/contenttype/forms">
-  <Display>DocumentLibraryForm</Display>
-  <Edit>DocumentLibraryForm</Edit>
-  <New>DocumentLibraryForm</New>
-</FormTemplates>
-</file>
-
-<file path=customXml/item3.xml><?xml version="1.0" encoding="utf-8"?>
 <ct:contentTypeSchema xmlns:ct="http://schemas.microsoft.com/office/2006/metadata/contentType" xmlns:ma="http://schemas.microsoft.com/office/2006/metadata/properties/metaAttributes" ct:_="" ma:_="" ma:contentTypeName="Dokument" ma:contentTypeID="0x010100705BEAF5D872DA499823F797437E7341" ma:contentTypeVersion="11" ma:contentTypeDescription="Opret et nyt dokument." ma:contentTypeScope="" ma:versionID="5b73fa5b6c98d35d5010583208db5e3d">
   <xsd:schema xmlns:xsd="http://www.w3.org/2001/XMLSchema" xmlns:xs="http://www.w3.org/2001/XMLSchema" xmlns:p="http://schemas.microsoft.com/office/2006/metadata/properties" xmlns:ns3="c6bc709f-863b-49b4-8d11-9df04d7d8c8d" xmlns:ns4="c6cdbaf4-18b0-44f6-b873-cf97097531c9" targetNamespace="http://schemas.microsoft.com/office/2006/metadata/properties" ma:root="true" ma:fieldsID="0f876c6c951b769f902df5666974d9fc" ns3:_="" ns4:_="">
     <xsd:import namespace="c6bc709f-863b-49b4-8d11-9df04d7d8c8d"/>
@@ -22457,24 +22472,22 @@
 </ct:contentTypeSchema>
 </file>
 
-<file path=customXml/itemProps1.xml><?xml version="1.0" encoding="utf-8"?>
-<ds:datastoreItem xmlns:ds="http://schemas.openxmlformats.org/officeDocument/2006/customXml" ds:itemID="{1E4AACF7-51B1-41A0-AAF9-D883E2E86D45}">
-  <ds:schemaRefs>
-    <ds:schemaRef ds:uri="http://schemas.microsoft.com/office/2006/metadata/properties"/>
-    <ds:schemaRef ds:uri="http://schemas.microsoft.com/office/infopath/2007/PartnerControls"/>
-  </ds:schemaRefs>
-</ds:datastoreItem>
+<file path=customXml/item2.xml><?xml version="1.0" encoding="utf-8"?>
+<?mso-contentType ?>
+<FormTemplates xmlns="http://schemas.microsoft.com/sharepoint/v3/contenttype/forms">
+  <Display>DocumentLibraryForm</Display>
+  <Edit>DocumentLibraryForm</Edit>
+  <New>DocumentLibraryForm</New>
+</FormTemplates>
 </file>
 
-<file path=customXml/itemProps2.xml><?xml version="1.0" encoding="utf-8"?>
-<ds:datastoreItem xmlns:ds="http://schemas.openxmlformats.org/officeDocument/2006/customXml" ds:itemID="{CDCE3ED8-2D07-4BA2-9005-4F3ED3D7E6E9}">
-  <ds:schemaRefs>
-    <ds:schemaRef ds:uri="http://schemas.microsoft.com/sharepoint/v3/contenttype/forms"/>
-  </ds:schemaRefs>
-</ds:datastoreItem>
+<file path=customXml/item3.xml><?xml version="1.0" encoding="utf-8"?>
+<p:properties xmlns:p="http://schemas.microsoft.com/office/2006/metadata/properties" xmlns:xsi="http://www.w3.org/2001/XMLSchema-instance" xmlns:pc="http://schemas.microsoft.com/office/infopath/2007/PartnerControls">
+  <documentManagement/>
+</p:properties>
 </file>
 
-<file path=customXml/itemProps3.xml><?xml version="1.0" encoding="utf-8"?>
+<file path=customXml/itemProps1.xml><?xml version="1.0" encoding="utf-8"?>
 <ds:datastoreItem xmlns:ds="http://schemas.openxmlformats.org/officeDocument/2006/customXml" ds:itemID="{561C6F91-99F1-44F1-B641-38E1B491A886}">
   <ds:schemaRefs>
     <ds:schemaRef ds:uri="http://schemas.microsoft.com/office/2006/metadata/contentType"/>
@@ -22491,4 +22504,21 @@
     <ds:schemaRef ds:uri="http://schemas.microsoft.com/internal/obd"/>
   </ds:schemaRefs>
 </ds:datastoreItem>
+</file>
+
+<file path=customXml/itemProps2.xml><?xml version="1.0" encoding="utf-8"?>
+<ds:datastoreItem xmlns:ds="http://schemas.openxmlformats.org/officeDocument/2006/customXml" ds:itemID="{CDCE3ED8-2D07-4BA2-9005-4F3ED3D7E6E9}">
+  <ds:schemaRefs>
+    <ds:schemaRef ds:uri="http://schemas.microsoft.com/sharepoint/v3/contenttype/forms"/>
+  </ds:schemaRefs>
+</ds:datastoreItem>
+</file>
+
+<file path=customXml/itemProps3.xml><?xml version="1.0" encoding="utf-8"?>
+<ds:datastoreItem xmlns:ds="http://schemas.openxmlformats.org/officeDocument/2006/customXml" ds:itemID="{1E4AACF7-51B1-41A0-AAF9-D883E2E86D45}">
+  <ds:schemaRefs>
+    <ds:schemaRef ds:uri="http://schemas.microsoft.com/office/2006/metadata/properties"/>
+    <ds:schemaRef ds:uri="http://schemas.microsoft.com/office/infopath/2007/PartnerControls"/>
+  </ds:schemaRefs>
+</ds:datastoreItem>
 </file>
</xml_diff>

<commit_message>
Updated poster pptx and Spilbeskrivelse
Added slides to pptx
</commit_message>
<xml_diff>
--- a/Files/poster/Poster - Projektgrundlag.pptx
+++ b/Files/poster/Poster - Projektgrundlag.pptx
@@ -8,16 +8,17 @@
     <p:sldMasterId id="2147483690" r:id="rId7"/>
   </p:sldMasterIdLst>
   <p:notesMasterIdLst>
-    <p:notesMasterId r:id="rId12"/>
+    <p:notesMasterId r:id="rId13"/>
   </p:notesMasterIdLst>
   <p:handoutMasterIdLst>
-    <p:handoutMasterId r:id="rId13"/>
+    <p:handoutMasterId r:id="rId14"/>
   </p:handoutMasterIdLst>
   <p:sldIdLst>
     <p:sldId id="259" r:id="rId8"/>
     <p:sldId id="261" r:id="rId9"/>
     <p:sldId id="263" r:id="rId10"/>
     <p:sldId id="262" r:id="rId11"/>
+    <p:sldId id="264" r:id="rId12"/>
   </p:sldIdLst>
   <p:sldSz cx="42811700" cy="30275213"/>
   <p:notesSz cx="6858000" cy="9144000"/>
@@ -162,7 +163,7 @@
 <file path=ppt/revisionInfo.xml><?xml version="1.0" encoding="utf-8"?>
 <p1510:revInfo xmlns:a="http://schemas.openxmlformats.org/drawingml/2006/main" xmlns:r="http://schemas.openxmlformats.org/officeDocument/2006/relationships" xmlns:p1510="http://schemas.microsoft.com/office/powerpoint/2015/10/main">
   <p1510:revLst>
-    <p1510:client id="{E165F5EC-B84B-4672-9FC0-8C64705214A4}" v="25" dt="2019-11-12T12:43:12.373"/>
+    <p1510:client id="{E165F5EC-B84B-4672-9FC0-8C64705214A4}" v="31" dt="2019-11-12T13:15:36.364"/>
   </p1510:revLst>
 </p1510:revInfo>
 </file>
@@ -172,16 +173,32 @@
   <pc:docChgLst>
     <pc:chgData name="Anders Wylardt Nielsen" userId="e0ee3fc7cf27fac6" providerId="LiveId" clId="{E165F5EC-B84B-4672-9FC0-8C64705214A4}"/>
     <pc:docChg chg="undo custSel addSld delSld modSld sldOrd">
-      <pc:chgData name="Anders Wylardt Nielsen" userId="e0ee3fc7cf27fac6" providerId="LiveId" clId="{E165F5EC-B84B-4672-9FC0-8C64705214A4}" dt="2019-11-12T12:43:59.332" v="187" actId="47"/>
+      <pc:chgData name="Anders Wylardt Nielsen" userId="e0ee3fc7cf27fac6" providerId="LiveId" clId="{E165F5EC-B84B-4672-9FC0-8C64705214A4}" dt="2019-11-12T13:16:45.886" v="207" actId="313"/>
       <pc:docMkLst>
         <pc:docMk/>
       </pc:docMkLst>
-      <pc:sldChg chg="ord">
-        <pc:chgData name="Anders Wylardt Nielsen" userId="e0ee3fc7cf27fac6" providerId="LiveId" clId="{E165F5EC-B84B-4672-9FC0-8C64705214A4}" dt="2019-11-12T12:12:29.429" v="0"/>
+      <pc:sldChg chg="modSp ord">
+        <pc:chgData name="Anders Wylardt Nielsen" userId="e0ee3fc7cf27fac6" providerId="LiveId" clId="{E165F5EC-B84B-4672-9FC0-8C64705214A4}" dt="2019-11-12T13:16:45.886" v="207" actId="313"/>
         <pc:sldMkLst>
           <pc:docMk/>
           <pc:sldMk cId="1759635540" sldId="259"/>
         </pc:sldMkLst>
+        <pc:spChg chg="mod">
+          <ac:chgData name="Anders Wylardt Nielsen" userId="e0ee3fc7cf27fac6" providerId="LiveId" clId="{E165F5EC-B84B-4672-9FC0-8C64705214A4}" dt="2019-11-12T13:16:45.886" v="207" actId="313"/>
+          <ac:spMkLst>
+            <pc:docMk/>
+            <pc:sldMk cId="1759635540" sldId="259"/>
+            <ac:spMk id="30" creationId="{E2B7DE94-FABB-454B-887C-DE796276B67C}"/>
+          </ac:spMkLst>
+        </pc:spChg>
+        <pc:spChg chg="mod">
+          <ac:chgData name="Anders Wylardt Nielsen" userId="e0ee3fc7cf27fac6" providerId="LiveId" clId="{E165F5EC-B84B-4672-9FC0-8C64705214A4}" dt="2019-11-12T13:16:36.161" v="206" actId="20577"/>
+          <ac:spMkLst>
+            <pc:docMk/>
+            <pc:sldMk cId="1759635540" sldId="259"/>
+            <ac:spMk id="32" creationId="{CD6FFC6C-AF2A-4DE1-9C0E-BE7B79DC5C93}"/>
+          </ac:spMkLst>
+        </pc:spChg>
       </pc:sldChg>
       <pc:sldChg chg="add del ord">
         <pc:chgData name="Anders Wylardt Nielsen" userId="e0ee3fc7cf27fac6" providerId="LiveId" clId="{E165F5EC-B84B-4672-9FC0-8C64705214A4}" dt="2019-11-12T12:24:18.498" v="48" actId="47"/>
@@ -826,6 +843,29 @@
           </ac:picMkLst>
         </pc:picChg>
       </pc:sldChg>
+      <pc:sldChg chg="addSp delSp modSp add ord">
+        <pc:chgData name="Anders Wylardt Nielsen" userId="e0ee3fc7cf27fac6" providerId="LiveId" clId="{E165F5EC-B84B-4672-9FC0-8C64705214A4}" dt="2019-11-12T13:15:36.364" v="204"/>
+        <pc:sldMkLst>
+          <pc:docMk/>
+          <pc:sldMk cId="645828306" sldId="264"/>
+        </pc:sldMkLst>
+        <pc:spChg chg="del">
+          <ac:chgData name="Anders Wylardt Nielsen" userId="e0ee3fc7cf27fac6" providerId="LiveId" clId="{E165F5EC-B84B-4672-9FC0-8C64705214A4}" dt="2019-11-12T13:14:38.084" v="193" actId="478"/>
+          <ac:spMkLst>
+            <pc:docMk/>
+            <pc:sldMk cId="645828306" sldId="264"/>
+            <ac:spMk id="3" creationId="{40F3FF29-4D23-4AAF-A6B0-1B6072595132}"/>
+          </ac:spMkLst>
+        </pc:spChg>
+        <pc:picChg chg="add mod">
+          <ac:chgData name="Anders Wylardt Nielsen" userId="e0ee3fc7cf27fac6" providerId="LiveId" clId="{E165F5EC-B84B-4672-9FC0-8C64705214A4}" dt="2019-11-12T13:15:25.848" v="203" actId="1076"/>
+          <ac:picMkLst>
+            <pc:docMk/>
+            <pc:sldMk cId="645828306" sldId="264"/>
+            <ac:picMk id="5" creationId="{9DC738FA-73B8-4655-B992-2E635F9F3691}"/>
+          </ac:picMkLst>
+        </pc:picChg>
+      </pc:sldChg>
       <pc:sldChg chg="add del ord">
         <pc:chgData name="Anders Wylardt Nielsen" userId="e0ee3fc7cf27fac6" providerId="LiveId" clId="{E165F5EC-B84B-4672-9FC0-8C64705214A4}" dt="2019-11-12T12:41:17.108" v="175" actId="47"/>
         <pc:sldMkLst>
@@ -855,6 +895,13 @@
             <ac:graphicFrameMk id="4" creationId="{DD342826-2E46-486A-B56F-2D29A3EF72ED}"/>
           </ac:graphicFrameMkLst>
         </pc:graphicFrameChg>
+      </pc:sldChg>
+      <pc:sldChg chg="add del ord">
+        <pc:chgData name="Anders Wylardt Nielsen" userId="e0ee3fc7cf27fac6" providerId="LiveId" clId="{E165F5EC-B84B-4672-9FC0-8C64705214A4}" dt="2019-11-12T13:14:26.763" v="190" actId="47"/>
+        <pc:sldMkLst>
+          <pc:docMk/>
+          <pc:sldMk cId="2717284295" sldId="264"/>
+        </pc:sldMkLst>
       </pc:sldChg>
     </pc:docChg>
   </pc:docChgLst>
@@ -17064,10 +17111,9 @@
           </a:lstStyle>
           <a:p>
             <a:r>
-              <a:rPr lang="da-DK" dirty="0" err="1"/>
-              <a:t>AFgrænsning</a:t>
-            </a:r>
-            <a:endParaRPr lang="da-DK" dirty="0"/>
+              <a:rPr lang="da-DK" dirty="0"/>
+              <a:t>Afgrænsning</a:t>
+            </a:r>
           </a:p>
         </p:txBody>
       </p:sp>
@@ -17571,23 +17617,7 @@
             </a:pPr>
             <a:r>
               <a:rPr lang="da-DK" sz="2400" dirty="0"/>
-              <a:t>Hvad bliver der </a:t>
-            </a:r>
-            <a:r>
-              <a:rPr lang="da-DK" sz="2400" dirty="0" err="1"/>
-              <a:t>idag</a:t>
-            </a:r>
-            <a:r>
-              <a:rPr lang="da-DK" sz="2400" dirty="0"/>
-              <a:t> gjort for at </a:t>
-            </a:r>
-            <a:r>
-              <a:rPr lang="da-DK" sz="2400" dirty="0" err="1"/>
-              <a:t>forebyggge</a:t>
-            </a:r>
-            <a:r>
-              <a:rPr lang="da-DK" sz="2400" dirty="0"/>
-              <a:t> imod og helbrede de omtalte sygdomme?</a:t>
+              <a:t>Hvad bliver der i dag gjort for at forebygge imod og helbrede de omtalte sygdomme?</a:t>
             </a:r>
           </a:p>
           <a:p>
@@ -20404,6 +20434,736 @@
     <p:extLst>
       <p:ext uri="{BB962C8B-B14F-4D97-AF65-F5344CB8AC3E}">
         <p14:creationId xmlns:p14="http://schemas.microsoft.com/office/powerpoint/2010/main" val="1738105663"/>
+      </p:ext>
+    </p:extLst>
+  </p:cSld>
+  <p:clrMapOvr>
+    <a:masterClrMapping/>
+  </p:clrMapOvr>
+</p:sld>
+</file>
+
+<file path=ppt/slides/slide5.xml><?xml version="1.0" encoding="utf-8"?>
+<p:sld xmlns:a="http://schemas.openxmlformats.org/drawingml/2006/main" xmlns:r="http://schemas.openxmlformats.org/officeDocument/2006/relationships" xmlns:p="http://schemas.openxmlformats.org/presentationml/2006/main">
+  <p:cSld>
+    <p:spTree>
+      <p:nvGrpSpPr>
+        <p:cNvPr id="1" name=""/>
+        <p:cNvGrpSpPr/>
+        <p:nvPr/>
+      </p:nvGrpSpPr>
+      <p:grpSpPr>
+        <a:xfrm>
+          <a:off x="0" y="0"/>
+          <a:ext cx="0" cy="0"/>
+          <a:chOff x="0" y="0"/>
+          <a:chExt cx="0" cy="0"/>
+        </a:xfrm>
+      </p:grpSpPr>
+      <p:sp>
+        <p:nvSpPr>
+          <p:cNvPr id="2" name="Pladsholder til tekst 1"/>
+          <p:cNvSpPr>
+            <a:spLocks noGrp="1"/>
+          </p:cNvSpPr>
+          <p:nvPr>
+            <p:ph type="body" sz="quarter" idx="36"/>
+          </p:nvPr>
+        </p:nvSpPr>
+        <p:spPr/>
+        <p:txBody>
+          <a:bodyPr/>
+          <a:lstStyle/>
+          <a:p>
+            <a:r>
+              <a:rPr lang="da-DK" dirty="0"/>
+              <a:t>Semesterprojekt, 1. Semester: Projektgrundlag</a:t>
+            </a:r>
+          </a:p>
+          <a:p>
+            <a:r>
+              <a:rPr lang="da-DK" dirty="0"/>
+              <a:t>Gruppe 7; Christopher, Markus, Nichlas, Anders, Sarah og Teis</a:t>
+            </a:r>
+          </a:p>
+        </p:txBody>
+      </p:sp>
+      <p:sp>
+        <p:nvSpPr>
+          <p:cNvPr id="19" name="Pladsholder til tekst 18"/>
+          <p:cNvSpPr>
+            <a:spLocks noGrp="1"/>
+          </p:cNvSpPr>
+          <p:nvPr>
+            <p:ph type="body" sz="quarter" idx="56"/>
+          </p:nvPr>
+        </p:nvSpPr>
+        <p:spPr/>
+        <p:txBody>
+          <a:bodyPr/>
+          <a:lstStyle/>
+          <a:p>
+            <a:r>
+              <a:rPr lang="da-DK" dirty="0"/>
+              <a:t>Software Engineering/Technology, Det tekniske fakultet, Syddansk Universitet</a:t>
+            </a:r>
+          </a:p>
+        </p:txBody>
+      </p:sp>
+      <p:sp>
+        <p:nvSpPr>
+          <p:cNvPr id="20" name="Pladsholder til tekst 19"/>
+          <p:cNvSpPr>
+            <a:spLocks noGrp="1"/>
+          </p:cNvSpPr>
+          <p:nvPr>
+            <p:ph type="body" sz="quarter" idx="57"/>
+          </p:nvPr>
+        </p:nvSpPr>
+        <p:spPr/>
+        <p:txBody>
+          <a:bodyPr/>
+          <a:lstStyle/>
+          <a:p>
+            <a:r>
+              <a:rPr lang="da-DK" dirty="0"/>
+              <a:t>SDU.DK</a:t>
+            </a:r>
+          </a:p>
+        </p:txBody>
+      </p:sp>
+      <p:sp>
+        <p:nvSpPr>
+          <p:cNvPr id="24" name="Titel 23"/>
+          <p:cNvSpPr>
+            <a:spLocks noGrp="1"/>
+          </p:cNvSpPr>
+          <p:nvPr>
+            <p:ph type="title"/>
+          </p:nvPr>
+        </p:nvSpPr>
+        <p:spPr>
+          <a:xfrm>
+            <a:off x="1160218" y="1551540"/>
+            <a:ext cx="30324954" cy="2445308"/>
+          </a:xfrm>
+        </p:spPr>
+        <p:txBody>
+          <a:bodyPr>
+            <a:normAutofit fontScale="90000"/>
+          </a:bodyPr>
+          <a:lstStyle/>
+          <a:p>
+            <a:r>
+              <a:rPr lang="da-DK" dirty="0" err="1"/>
+              <a:t>Kill</a:t>
+            </a:r>
+            <a:r>
+              <a:rPr lang="da-DK" dirty="0"/>
+              <a:t> The </a:t>
+            </a:r>
+            <a:r>
+              <a:rPr lang="da-DK" dirty="0" err="1"/>
+              <a:t>Killers</a:t>
+            </a:r>
+            <a:r>
+              <a:rPr lang="da-DK" dirty="0"/>
+              <a:t> </a:t>
+            </a:r>
+            <a:br>
+              <a:rPr lang="da-DK" dirty="0"/>
+            </a:br>
+            <a:r>
+              <a:rPr lang="da-DK" b="0" dirty="0"/>
+              <a:t>🦟 💉 🍆 🧤</a:t>
+            </a:r>
+            <a:br>
+              <a:rPr lang="da-DK" dirty="0"/>
+            </a:br>
+            <a:endParaRPr lang="da-DK" dirty="0"/>
+          </a:p>
+        </p:txBody>
+      </p:sp>
+      <p:sp>
+        <p:nvSpPr>
+          <p:cNvPr id="31" name="Pladsholder til indhold 16">
+            <a:extLst>
+              <a:ext uri="{FF2B5EF4-FFF2-40B4-BE49-F238E27FC236}">
+                <a16:creationId xmlns:a16="http://schemas.microsoft.com/office/drawing/2014/main" id="{1607F8FD-3912-4D44-856E-3884BE6A0398}"/>
+              </a:ext>
+            </a:extLst>
+          </p:cNvPr>
+          <p:cNvSpPr txBox="1">
+            <a:spLocks/>
+          </p:cNvSpPr>
+          <p:nvPr/>
+        </p:nvSpPr>
+        <p:spPr>
+          <a:xfrm>
+            <a:off x="14323455" y="25282528"/>
+            <a:ext cx="12486746" cy="4286052"/>
+          </a:xfrm>
+          <a:prstGeom prst="rect">
+            <a:avLst/>
+          </a:prstGeom>
+        </p:spPr>
+        <p:txBody>
+          <a:bodyPr vert="horz" lIns="0" tIns="174010" rIns="87005" bIns="43503" numCol="2" spcCol="360000" rtlCol="0">
+            <a:noAutofit/>
+          </a:bodyPr>
+          <a:lstStyle>
+            <a:lvl1pPr marL="0" marR="0" indent="0" algn="l" defTabSz="4176248" rtl="0" eaLnBrk="1" fontAlgn="auto" latinLnBrk="0" hangingPunct="1">
+              <a:lnSpc>
+                <a:spcPct val="100000"/>
+              </a:lnSpc>
+              <a:spcBef>
+                <a:spcPts val="600"/>
+              </a:spcBef>
+              <a:spcAft>
+                <a:spcPts val="0"/>
+              </a:spcAft>
+              <a:buClr>
+                <a:schemeClr val="accent2"/>
+              </a:buClr>
+              <a:buSzTx/>
+              <a:buFont typeface="Arial" panose="020B0604020202020204" pitchFamily="34" charset="0"/>
+              <a:buNone/>
+              <a:tabLst/>
+              <a:defRPr lang="da-DK" sz="2700" b="0" i="0" kern="1200" baseline="0">
+                <a:solidFill>
+                  <a:schemeClr val="tx1"/>
+                </a:solidFill>
+                <a:latin typeface="Arial"/>
+                <a:ea typeface="Segoe UI" panose="020B0502040204020203" pitchFamily="34" charset="0"/>
+                <a:cs typeface="Arial"/>
+              </a:defRPr>
+            </a:lvl1pPr>
+            <a:lvl2pPr marL="609036" indent="0" algn="l" defTabSz="4176248" rtl="0" eaLnBrk="1" latinLnBrk="0" hangingPunct="1">
+              <a:lnSpc>
+                <a:spcPct val="100000"/>
+              </a:lnSpc>
+              <a:spcBef>
+                <a:spcPts val="1142"/>
+              </a:spcBef>
+              <a:buClr>
+                <a:schemeClr val="accent2"/>
+              </a:buClr>
+              <a:buFont typeface="Arial" panose="020B0604020202020204" pitchFamily="34" charset="0"/>
+              <a:buNone/>
+              <a:defRPr lang="da-DK" sz="2300" b="0" i="0" kern="1200">
+                <a:solidFill>
+                  <a:schemeClr val="tx1"/>
+                </a:solidFill>
+                <a:latin typeface="Arial"/>
+                <a:ea typeface="Segoe UI" panose="020B0502040204020203" pitchFamily="34" charset="0"/>
+                <a:cs typeface="Arial"/>
+              </a:defRPr>
+            </a:lvl2pPr>
+            <a:lvl3pPr marL="609036" indent="0" algn="l" defTabSz="4176248" rtl="0" eaLnBrk="1" latinLnBrk="0" hangingPunct="1">
+              <a:lnSpc>
+                <a:spcPct val="100000"/>
+              </a:lnSpc>
+              <a:spcBef>
+                <a:spcPts val="1142"/>
+              </a:spcBef>
+              <a:buClr>
+                <a:schemeClr val="accent2"/>
+              </a:buClr>
+              <a:buFont typeface="Arial" panose="020B0604020202020204" pitchFamily="34" charset="0"/>
+              <a:buNone/>
+              <a:defRPr lang="da-DK" sz="2300" b="0" i="0" kern="1200">
+                <a:solidFill>
+                  <a:schemeClr val="tx1"/>
+                </a:solidFill>
+                <a:latin typeface="Arial"/>
+                <a:ea typeface="Segoe UI" panose="020B0502040204020203" pitchFamily="34" charset="0"/>
+                <a:cs typeface="Arial"/>
+              </a:defRPr>
+            </a:lvl3pPr>
+            <a:lvl4pPr marL="609036" indent="0" algn="l" defTabSz="4176248" rtl="0" eaLnBrk="1" latinLnBrk="0" hangingPunct="1">
+              <a:lnSpc>
+                <a:spcPct val="100000"/>
+              </a:lnSpc>
+              <a:spcBef>
+                <a:spcPts val="1142"/>
+              </a:spcBef>
+              <a:buClr>
+                <a:schemeClr val="accent2"/>
+              </a:buClr>
+              <a:buFont typeface="Arial" panose="020B0604020202020204" pitchFamily="34" charset="0"/>
+              <a:buNone/>
+              <a:defRPr lang="da-DK" sz="2300" b="0" i="0" kern="1200">
+                <a:solidFill>
+                  <a:schemeClr val="tx1"/>
+                </a:solidFill>
+                <a:latin typeface="Arial"/>
+                <a:ea typeface="Segoe UI" panose="020B0502040204020203" pitchFamily="34" charset="0"/>
+                <a:cs typeface="Arial"/>
+              </a:defRPr>
+            </a:lvl4pPr>
+            <a:lvl5pPr marL="609036" indent="0" algn="l" defTabSz="4176248" rtl="0" eaLnBrk="1" latinLnBrk="0" hangingPunct="1">
+              <a:lnSpc>
+                <a:spcPct val="100000"/>
+              </a:lnSpc>
+              <a:spcBef>
+                <a:spcPts val="1142"/>
+              </a:spcBef>
+              <a:buClr>
+                <a:schemeClr val="accent2"/>
+              </a:buClr>
+              <a:buFont typeface="Arial" panose="020B0604020202020204" pitchFamily="34" charset="0"/>
+              <a:buNone/>
+              <a:defRPr lang="da-DK" sz="2300" b="0" i="0" kern="1200">
+                <a:solidFill>
+                  <a:schemeClr val="tx1"/>
+                </a:solidFill>
+                <a:latin typeface="Arial"/>
+                <a:ea typeface="Segoe UI" panose="020B0502040204020203" pitchFamily="34" charset="0"/>
+                <a:cs typeface="Arial"/>
+              </a:defRPr>
+            </a:lvl5pPr>
+            <a:lvl6pPr marL="609036" indent="0" algn="l" defTabSz="4176248" rtl="0" eaLnBrk="1" latinLnBrk="0" hangingPunct="1">
+              <a:lnSpc>
+                <a:spcPct val="100000"/>
+              </a:lnSpc>
+              <a:spcBef>
+                <a:spcPts val="1142"/>
+              </a:spcBef>
+              <a:buClr>
+                <a:schemeClr val="accent2"/>
+              </a:buClr>
+              <a:buFont typeface="Arial" panose="020B0604020202020204" pitchFamily="34" charset="0"/>
+              <a:buNone/>
+              <a:defRPr lang="da-DK" sz="2300" b="0" i="0" kern="1200">
+                <a:solidFill>
+                  <a:schemeClr val="tx1"/>
+                </a:solidFill>
+                <a:latin typeface="Arial"/>
+                <a:ea typeface="Segoe UI" panose="020B0502040204020203" pitchFamily="34" charset="0"/>
+                <a:cs typeface="Arial"/>
+              </a:defRPr>
+            </a:lvl6pPr>
+            <a:lvl7pPr marL="609036" indent="0" algn="l" defTabSz="4176248" rtl="0" eaLnBrk="1" latinLnBrk="0" hangingPunct="1">
+              <a:lnSpc>
+                <a:spcPct val="100000"/>
+              </a:lnSpc>
+              <a:spcBef>
+                <a:spcPts val="1142"/>
+              </a:spcBef>
+              <a:buClr>
+                <a:schemeClr val="accent2"/>
+              </a:buClr>
+              <a:buFont typeface="Arial" panose="020B0604020202020204" pitchFamily="34" charset="0"/>
+              <a:buNone/>
+              <a:defRPr lang="da-DK" sz="2300" b="0" i="0" kern="1200">
+                <a:solidFill>
+                  <a:schemeClr val="tx1"/>
+                </a:solidFill>
+                <a:latin typeface="Arial"/>
+                <a:ea typeface="Segoe UI" panose="020B0502040204020203" pitchFamily="34" charset="0"/>
+                <a:cs typeface="Arial"/>
+              </a:defRPr>
+            </a:lvl7pPr>
+            <a:lvl8pPr marL="609036" indent="0" algn="l" defTabSz="4176248" rtl="0" eaLnBrk="1" latinLnBrk="0" hangingPunct="1">
+              <a:lnSpc>
+                <a:spcPct val="100000"/>
+              </a:lnSpc>
+              <a:spcBef>
+                <a:spcPts val="1142"/>
+              </a:spcBef>
+              <a:buClr>
+                <a:schemeClr val="accent2"/>
+              </a:buClr>
+              <a:buFont typeface="Arial" panose="020B0604020202020204" pitchFamily="34" charset="0"/>
+              <a:buNone/>
+              <a:defRPr lang="da-DK" sz="2300" b="0" i="0" kern="1200">
+                <a:solidFill>
+                  <a:schemeClr val="tx1"/>
+                </a:solidFill>
+                <a:latin typeface="Arial"/>
+                <a:ea typeface="Segoe UI" panose="020B0502040204020203" pitchFamily="34" charset="0"/>
+                <a:cs typeface="Arial"/>
+              </a:defRPr>
+            </a:lvl8pPr>
+            <a:lvl9pPr marL="609036" indent="0" algn="l" defTabSz="4176248" rtl="0" eaLnBrk="1" latinLnBrk="0" hangingPunct="1">
+              <a:lnSpc>
+                <a:spcPct val="100000"/>
+              </a:lnSpc>
+              <a:spcBef>
+                <a:spcPts val="1142"/>
+              </a:spcBef>
+              <a:buClr>
+                <a:schemeClr val="accent2"/>
+              </a:buClr>
+              <a:buFont typeface="Arial" panose="020B0604020202020204" pitchFamily="34" charset="0"/>
+              <a:buNone/>
+              <a:defRPr lang="da-DK" sz="2300" b="0" i="0" kern="1200">
+                <a:solidFill>
+                  <a:schemeClr val="tx1"/>
+                </a:solidFill>
+                <a:latin typeface="Arial"/>
+                <a:ea typeface="Segoe UI" panose="020B0502040204020203" pitchFamily="34" charset="0"/>
+                <a:cs typeface="Arial"/>
+              </a:defRPr>
+            </a:lvl9pPr>
+          </a:lstStyle>
+          <a:p>
+            <a:endParaRPr lang="da-DK" dirty="0"/>
+          </a:p>
+        </p:txBody>
+      </p:sp>
+      <p:pic>
+        <p:nvPicPr>
+          <p:cNvPr id="1028" name="Picture 4" descr="https://scontent-arn2-1.xx.fbcdn.net/v/t1.15752-9/72390896_431101910871949_4285249782168944640_n.jpg?_nc_cat=105&amp;_nc_oc=AQk_-pvvz20L_oWzc94kk2T6rnPmGPabDL0-grNR2DzTbJ5Ckt3eDZ8jf76HLaOOIOU&amp;_nc_ht=scontent-arn2-1.xx&amp;oh=e087845499a036c5332b8cab8241fa61&amp;oe=5DF32336"/>
+          <p:cNvPicPr>
+            <a:picLocks noChangeAspect="1" noChangeArrowheads="1"/>
+          </p:cNvPicPr>
+          <p:nvPr/>
+        </p:nvPicPr>
+        <p:blipFill rotWithShape="1">
+          <a:blip r:embed="rId2">
+            <a:extLst>
+              <a:ext uri="{28A0092B-C50C-407E-A947-70E740481C1C}">
+                <a14:useLocalDpi xmlns:a14="http://schemas.microsoft.com/office/drawing/2010/main" val="0"/>
+              </a:ext>
+            </a:extLst>
+          </a:blip>
+          <a:srcRect l="3843" t="33634" r="5134" b="6240"/>
+          <a:stretch/>
+        </p:blipFill>
+        <p:spPr bwMode="auto">
+          <a:xfrm>
+            <a:off x="15842428" y="805809"/>
+            <a:ext cx="4724400" cy="3120753"/>
+          </a:xfrm>
+          <a:prstGeom prst="rect">
+            <a:avLst/>
+          </a:prstGeom>
+          <a:noFill/>
+          <a:extLst>
+            <a:ext uri="{909E8E84-426E-40DD-AFC4-6F175D3DCCD1}">
+              <a14:hiddenFill xmlns:a14="http://schemas.microsoft.com/office/drawing/2010/main">
+                <a:solidFill>
+                  <a:srgbClr val="FFFFFF"/>
+                </a:solidFill>
+              </a14:hiddenFill>
+            </a:ext>
+          </a:extLst>
+        </p:spPr>
+      </p:pic>
+      <p:sp>
+        <p:nvSpPr>
+          <p:cNvPr id="41" name="Pladsholder til indhold 17">
+            <a:extLst>
+              <a:ext uri="{FF2B5EF4-FFF2-40B4-BE49-F238E27FC236}">
+                <a16:creationId xmlns:a16="http://schemas.microsoft.com/office/drawing/2014/main" id="{AAF47011-23B6-4F36-B93C-F878464C7491}"/>
+              </a:ext>
+            </a:extLst>
+          </p:cNvPr>
+          <p:cNvSpPr txBox="1">
+            <a:spLocks/>
+          </p:cNvSpPr>
+          <p:nvPr/>
+        </p:nvSpPr>
+        <p:spPr>
+          <a:xfrm>
+            <a:off x="14999946" y="4363353"/>
+            <a:ext cx="12486746" cy="6538269"/>
+          </a:xfrm>
+          <a:prstGeom prst="rect">
+            <a:avLst/>
+          </a:prstGeom>
+        </p:spPr>
+        <p:txBody>
+          <a:bodyPr vert="horz" lIns="0" tIns="174010" rIns="87005" bIns="43503" numCol="2" spcCol="360000" rtlCol="0">
+            <a:noAutofit/>
+          </a:bodyPr>
+          <a:lstStyle>
+            <a:lvl1pPr marL="0" marR="0" indent="0" algn="l" defTabSz="4176248" rtl="0" eaLnBrk="1" fontAlgn="auto" latinLnBrk="0" hangingPunct="1">
+              <a:lnSpc>
+                <a:spcPct val="100000"/>
+              </a:lnSpc>
+              <a:spcBef>
+                <a:spcPts val="600"/>
+              </a:spcBef>
+              <a:spcAft>
+                <a:spcPts val="0"/>
+              </a:spcAft>
+              <a:buClr>
+                <a:schemeClr val="accent2"/>
+              </a:buClr>
+              <a:buSzTx/>
+              <a:buFont typeface="Arial" panose="020B0604020202020204" pitchFamily="34" charset="0"/>
+              <a:buNone/>
+              <a:tabLst/>
+              <a:defRPr lang="da-DK" sz="2700" b="0" i="0" kern="1200" baseline="0">
+                <a:solidFill>
+                  <a:schemeClr val="tx1"/>
+                </a:solidFill>
+                <a:latin typeface="Arial"/>
+                <a:ea typeface="Segoe UI" panose="020B0502040204020203" pitchFamily="34" charset="0"/>
+                <a:cs typeface="Arial"/>
+              </a:defRPr>
+            </a:lvl1pPr>
+            <a:lvl2pPr marL="609036" indent="0" algn="l" defTabSz="4176248" rtl="0" eaLnBrk="1" latinLnBrk="0" hangingPunct="1">
+              <a:lnSpc>
+                <a:spcPct val="100000"/>
+              </a:lnSpc>
+              <a:spcBef>
+                <a:spcPts val="1142"/>
+              </a:spcBef>
+              <a:buClr>
+                <a:schemeClr val="accent2"/>
+              </a:buClr>
+              <a:buFont typeface="Arial" panose="020B0604020202020204" pitchFamily="34" charset="0"/>
+              <a:buNone/>
+              <a:defRPr lang="da-DK" sz="2300" b="0" i="0" kern="1200">
+                <a:solidFill>
+                  <a:schemeClr val="tx1"/>
+                </a:solidFill>
+                <a:latin typeface="Arial"/>
+                <a:ea typeface="Segoe UI" panose="020B0502040204020203" pitchFamily="34" charset="0"/>
+                <a:cs typeface="Arial"/>
+              </a:defRPr>
+            </a:lvl2pPr>
+            <a:lvl3pPr marL="609036" indent="0" algn="l" defTabSz="4176248" rtl="0" eaLnBrk="1" latinLnBrk="0" hangingPunct="1">
+              <a:lnSpc>
+                <a:spcPct val="100000"/>
+              </a:lnSpc>
+              <a:spcBef>
+                <a:spcPts val="1142"/>
+              </a:spcBef>
+              <a:buClr>
+                <a:schemeClr val="accent2"/>
+              </a:buClr>
+              <a:buFont typeface="Arial" panose="020B0604020202020204" pitchFamily="34" charset="0"/>
+              <a:buNone/>
+              <a:defRPr lang="da-DK" sz="2300" b="0" i="0" kern="1200">
+                <a:solidFill>
+                  <a:schemeClr val="tx1"/>
+                </a:solidFill>
+                <a:latin typeface="Arial"/>
+                <a:ea typeface="Segoe UI" panose="020B0502040204020203" pitchFamily="34" charset="0"/>
+                <a:cs typeface="Arial"/>
+              </a:defRPr>
+            </a:lvl3pPr>
+            <a:lvl4pPr marL="609036" indent="0" algn="l" defTabSz="4176248" rtl="0" eaLnBrk="1" latinLnBrk="0" hangingPunct="1">
+              <a:lnSpc>
+                <a:spcPct val="100000"/>
+              </a:lnSpc>
+              <a:spcBef>
+                <a:spcPts val="1142"/>
+              </a:spcBef>
+              <a:buClr>
+                <a:schemeClr val="accent2"/>
+              </a:buClr>
+              <a:buFont typeface="Arial" panose="020B0604020202020204" pitchFamily="34" charset="0"/>
+              <a:buNone/>
+              <a:defRPr lang="da-DK" sz="2300" b="0" i="0" kern="1200">
+                <a:solidFill>
+                  <a:schemeClr val="tx1"/>
+                </a:solidFill>
+                <a:latin typeface="Arial"/>
+                <a:ea typeface="Segoe UI" panose="020B0502040204020203" pitchFamily="34" charset="0"/>
+                <a:cs typeface="Arial"/>
+              </a:defRPr>
+            </a:lvl4pPr>
+            <a:lvl5pPr marL="609036" indent="0" algn="l" defTabSz="4176248" rtl="0" eaLnBrk="1" latinLnBrk="0" hangingPunct="1">
+              <a:lnSpc>
+                <a:spcPct val="100000"/>
+              </a:lnSpc>
+              <a:spcBef>
+                <a:spcPts val="1142"/>
+              </a:spcBef>
+              <a:buClr>
+                <a:schemeClr val="accent2"/>
+              </a:buClr>
+              <a:buFont typeface="Arial" panose="020B0604020202020204" pitchFamily="34" charset="0"/>
+              <a:buNone/>
+              <a:defRPr lang="da-DK" sz="2300" b="0" i="0" kern="1200">
+                <a:solidFill>
+                  <a:schemeClr val="tx1"/>
+                </a:solidFill>
+                <a:latin typeface="Arial"/>
+                <a:ea typeface="Segoe UI" panose="020B0502040204020203" pitchFamily="34" charset="0"/>
+                <a:cs typeface="Arial"/>
+              </a:defRPr>
+            </a:lvl5pPr>
+            <a:lvl6pPr marL="609036" indent="0" algn="l" defTabSz="4176248" rtl="0" eaLnBrk="1" latinLnBrk="0" hangingPunct="1">
+              <a:lnSpc>
+                <a:spcPct val="100000"/>
+              </a:lnSpc>
+              <a:spcBef>
+                <a:spcPts val="1142"/>
+              </a:spcBef>
+              <a:buClr>
+                <a:schemeClr val="accent2"/>
+              </a:buClr>
+              <a:buFont typeface="Arial" panose="020B0604020202020204" pitchFamily="34" charset="0"/>
+              <a:buNone/>
+              <a:defRPr lang="da-DK" sz="2300" b="0" i="0" kern="1200">
+                <a:solidFill>
+                  <a:schemeClr val="tx1"/>
+                </a:solidFill>
+                <a:latin typeface="Arial"/>
+                <a:ea typeface="Segoe UI" panose="020B0502040204020203" pitchFamily="34" charset="0"/>
+                <a:cs typeface="Arial"/>
+              </a:defRPr>
+            </a:lvl6pPr>
+            <a:lvl7pPr marL="609036" indent="0" algn="l" defTabSz="4176248" rtl="0" eaLnBrk="1" latinLnBrk="0" hangingPunct="1">
+              <a:lnSpc>
+                <a:spcPct val="100000"/>
+              </a:lnSpc>
+              <a:spcBef>
+                <a:spcPts val="1142"/>
+              </a:spcBef>
+              <a:buClr>
+                <a:schemeClr val="accent2"/>
+              </a:buClr>
+              <a:buFont typeface="Arial" panose="020B0604020202020204" pitchFamily="34" charset="0"/>
+              <a:buNone/>
+              <a:defRPr lang="da-DK" sz="2300" b="0" i="0" kern="1200">
+                <a:solidFill>
+                  <a:schemeClr val="tx1"/>
+                </a:solidFill>
+                <a:latin typeface="Arial"/>
+                <a:ea typeface="Segoe UI" panose="020B0502040204020203" pitchFamily="34" charset="0"/>
+                <a:cs typeface="Arial"/>
+              </a:defRPr>
+            </a:lvl7pPr>
+            <a:lvl8pPr marL="609036" indent="0" algn="l" defTabSz="4176248" rtl="0" eaLnBrk="1" latinLnBrk="0" hangingPunct="1">
+              <a:lnSpc>
+                <a:spcPct val="100000"/>
+              </a:lnSpc>
+              <a:spcBef>
+                <a:spcPts val="1142"/>
+              </a:spcBef>
+              <a:buClr>
+                <a:schemeClr val="accent2"/>
+              </a:buClr>
+              <a:buFont typeface="Arial" panose="020B0604020202020204" pitchFamily="34" charset="0"/>
+              <a:buNone/>
+              <a:defRPr lang="da-DK" sz="2300" b="0" i="0" kern="1200">
+                <a:solidFill>
+                  <a:schemeClr val="tx1"/>
+                </a:solidFill>
+                <a:latin typeface="Arial"/>
+                <a:ea typeface="Segoe UI" panose="020B0502040204020203" pitchFamily="34" charset="0"/>
+                <a:cs typeface="Arial"/>
+              </a:defRPr>
+            </a:lvl8pPr>
+            <a:lvl9pPr marL="609036" indent="0" algn="l" defTabSz="4176248" rtl="0" eaLnBrk="1" latinLnBrk="0" hangingPunct="1">
+              <a:lnSpc>
+                <a:spcPct val="100000"/>
+              </a:lnSpc>
+              <a:spcBef>
+                <a:spcPts val="1142"/>
+              </a:spcBef>
+              <a:buClr>
+                <a:schemeClr val="accent2"/>
+              </a:buClr>
+              <a:buFont typeface="Arial" panose="020B0604020202020204" pitchFamily="34" charset="0"/>
+              <a:buNone/>
+              <a:defRPr lang="da-DK" sz="2300" b="0" i="0" kern="1200">
+                <a:solidFill>
+                  <a:schemeClr val="tx1"/>
+                </a:solidFill>
+                <a:latin typeface="Arial"/>
+                <a:ea typeface="Segoe UI" panose="020B0502040204020203" pitchFamily="34" charset="0"/>
+                <a:cs typeface="Arial"/>
+              </a:defRPr>
+            </a:lvl9pPr>
+          </a:lstStyle>
+          <a:p>
+            <a:endParaRPr lang="da-DK" sz="2400" dirty="0"/>
+          </a:p>
+        </p:txBody>
+      </p:sp>
+      <p:pic>
+        <p:nvPicPr>
+          <p:cNvPr id="35" name="Picture 4" descr="https://scontent-arn2-1.xx.fbcdn.net/v/t1.15752-9/72390896_431101910871949_4285249782168944640_n.jpg?_nc_cat=105&amp;_nc_oc=AQk_-pvvz20L_oWzc94kk2T6rnPmGPabDL0-grNR2DzTbJ5Ckt3eDZ8jf76HLaOOIOU&amp;_nc_ht=scontent-arn2-1.xx&amp;oh=e087845499a036c5332b8cab8241fa61&amp;oe=5DF32336">
+            <a:extLst>
+              <a:ext uri="{FF2B5EF4-FFF2-40B4-BE49-F238E27FC236}">
+                <a16:creationId xmlns:a16="http://schemas.microsoft.com/office/drawing/2014/main" id="{7CB1BEB6-7D41-440A-B269-43C5F746A634}"/>
+              </a:ext>
+            </a:extLst>
+          </p:cNvPr>
+          <p:cNvPicPr>
+            <a:picLocks noChangeAspect="1" noChangeArrowheads="1"/>
+          </p:cNvPicPr>
+          <p:nvPr/>
+        </p:nvPicPr>
+        <p:blipFill rotWithShape="1">
+          <a:blip r:embed="rId2">
+            <a:extLst>
+              <a:ext uri="{28A0092B-C50C-407E-A947-70E740481C1C}">
+                <a14:useLocalDpi xmlns:a14="http://schemas.microsoft.com/office/drawing/2010/main" val="0"/>
+              </a:ext>
+            </a:extLst>
+          </a:blip>
+          <a:srcRect l="3843" t="5475" r="5134" b="63865"/>
+          <a:stretch/>
+        </p:blipFill>
+        <p:spPr bwMode="auto">
+          <a:xfrm>
+            <a:off x="20566828" y="1764323"/>
+            <a:ext cx="4724400" cy="1591366"/>
+          </a:xfrm>
+          <a:prstGeom prst="rect">
+            <a:avLst/>
+          </a:prstGeom>
+          <a:noFill/>
+          <a:extLst>
+            <a:ext uri="{909E8E84-426E-40DD-AFC4-6F175D3DCCD1}">
+              <a14:hiddenFill xmlns:a14="http://schemas.microsoft.com/office/drawing/2010/main">
+                <a:solidFill>
+                  <a:srgbClr val="FFFFFF"/>
+                </a:solidFill>
+              </a14:hiddenFill>
+            </a:ext>
+          </a:extLst>
+        </p:spPr>
+      </p:pic>
+      <p:pic>
+        <p:nvPicPr>
+          <p:cNvPr id="5" name="Billede 4" descr="Et billede, der indeholder tekst&#10;&#10;Automatisk genereret beskrivelse">
+            <a:extLst>
+              <a:ext uri="{FF2B5EF4-FFF2-40B4-BE49-F238E27FC236}">
+                <a16:creationId xmlns:a16="http://schemas.microsoft.com/office/drawing/2014/main" id="{9DC738FA-73B8-4655-B992-2E635F9F3691}"/>
+              </a:ext>
+            </a:extLst>
+          </p:cNvPr>
+          <p:cNvPicPr>
+            <a:picLocks noChangeAspect="1"/>
+          </p:cNvPicPr>
+          <p:nvPr/>
+        </p:nvPicPr>
+        <p:blipFill>
+          <a:blip r:embed="rId3">
+            <a:extLst>
+              <a:ext uri="{28A0092B-C50C-407E-A947-70E740481C1C}">
+                <a14:useLocalDpi xmlns:a14="http://schemas.microsoft.com/office/drawing/2010/main" val="0"/>
+              </a:ext>
+            </a:extLst>
+          </a:blip>
+          <a:stretch>
+            <a:fillRect/>
+          </a:stretch>
+        </p:blipFill>
+        <p:spPr>
+          <a:xfrm>
+            <a:off x="2020369" y="4665522"/>
+            <a:ext cx="37092918" cy="24803882"/>
+          </a:xfrm>
+          <a:prstGeom prst="rect">
+            <a:avLst/>
+          </a:prstGeom>
+        </p:spPr>
+      </p:pic>
+    </p:spTree>
+    <p:extLst>
+      <p:ext uri="{BB962C8B-B14F-4D97-AF65-F5344CB8AC3E}">
+        <p14:creationId xmlns:p14="http://schemas.microsoft.com/office/powerpoint/2010/main" val="645828306"/>
       </p:ext>
     </p:extLst>
   </p:cSld>
@@ -22264,6 +23024,21 @@
 </file>
 
 <file path=customXml/item1.xml><?xml version="1.0" encoding="utf-8"?>
+<p:properties xmlns:p="http://schemas.microsoft.com/office/2006/metadata/properties" xmlns:xsi="http://www.w3.org/2001/XMLSchema-instance" xmlns:pc="http://schemas.microsoft.com/office/infopath/2007/PartnerControls">
+  <documentManagement/>
+</p:properties>
+</file>
+
+<file path=customXml/item2.xml><?xml version="1.0" encoding="utf-8"?>
+<?mso-contentType ?>
+<FormTemplates xmlns="http://schemas.microsoft.com/sharepoint/v3/contenttype/forms">
+  <Display>DocumentLibraryForm</Display>
+  <Edit>DocumentLibraryForm</Edit>
+  <New>DocumentLibraryForm</New>
+</FormTemplates>
+</file>
+
+<file path=customXml/item3.xml><?xml version="1.0" encoding="utf-8"?>
 <ct:contentTypeSchema xmlns:ct="http://schemas.microsoft.com/office/2006/metadata/contentType" xmlns:ma="http://schemas.microsoft.com/office/2006/metadata/properties/metaAttributes" ct:_="" ma:_="" ma:contentTypeName="Dokument" ma:contentTypeID="0x010100705BEAF5D872DA499823F797437E7341" ma:contentTypeVersion="11" ma:contentTypeDescription="Opret et nyt dokument." ma:contentTypeScope="" ma:versionID="5b73fa5b6c98d35d5010583208db5e3d">
   <xsd:schema xmlns:xsd="http://www.w3.org/2001/XMLSchema" xmlns:xs="http://www.w3.org/2001/XMLSchema" xmlns:p="http://schemas.microsoft.com/office/2006/metadata/properties" xmlns:ns3="c6bc709f-863b-49b4-8d11-9df04d7d8c8d" xmlns:ns4="c6cdbaf4-18b0-44f6-b873-cf97097531c9" targetNamespace="http://schemas.microsoft.com/office/2006/metadata/properties" ma:root="true" ma:fieldsID="0f876c6c951b769f902df5666974d9fc" ns3:_="" ns4:_="">
     <xsd:import namespace="c6bc709f-863b-49b4-8d11-9df04d7d8c8d"/>
@@ -22472,22 +23247,24 @@
 </ct:contentTypeSchema>
 </file>
 
-<file path=customXml/item2.xml><?xml version="1.0" encoding="utf-8"?>
-<?mso-contentType ?>
-<FormTemplates xmlns="http://schemas.microsoft.com/sharepoint/v3/contenttype/forms">
-  <Display>DocumentLibraryForm</Display>
-  <Edit>DocumentLibraryForm</Edit>
-  <New>DocumentLibraryForm</New>
-</FormTemplates>
+<file path=customXml/itemProps1.xml><?xml version="1.0" encoding="utf-8"?>
+<ds:datastoreItem xmlns:ds="http://schemas.openxmlformats.org/officeDocument/2006/customXml" ds:itemID="{1E4AACF7-51B1-41A0-AAF9-D883E2E86D45}">
+  <ds:schemaRefs>
+    <ds:schemaRef ds:uri="http://schemas.microsoft.com/office/2006/metadata/properties"/>
+    <ds:schemaRef ds:uri="http://schemas.microsoft.com/office/infopath/2007/PartnerControls"/>
+  </ds:schemaRefs>
+</ds:datastoreItem>
 </file>
 
-<file path=customXml/item3.xml><?xml version="1.0" encoding="utf-8"?>
-<p:properties xmlns:p="http://schemas.microsoft.com/office/2006/metadata/properties" xmlns:xsi="http://www.w3.org/2001/XMLSchema-instance" xmlns:pc="http://schemas.microsoft.com/office/infopath/2007/PartnerControls">
-  <documentManagement/>
-</p:properties>
+<file path=customXml/itemProps2.xml><?xml version="1.0" encoding="utf-8"?>
+<ds:datastoreItem xmlns:ds="http://schemas.openxmlformats.org/officeDocument/2006/customXml" ds:itemID="{CDCE3ED8-2D07-4BA2-9005-4F3ED3D7E6E9}">
+  <ds:schemaRefs>
+    <ds:schemaRef ds:uri="http://schemas.microsoft.com/sharepoint/v3/contenttype/forms"/>
+  </ds:schemaRefs>
+</ds:datastoreItem>
 </file>
 
-<file path=customXml/itemProps1.xml><?xml version="1.0" encoding="utf-8"?>
+<file path=customXml/itemProps3.xml><?xml version="1.0" encoding="utf-8"?>
 <ds:datastoreItem xmlns:ds="http://schemas.openxmlformats.org/officeDocument/2006/customXml" ds:itemID="{561C6F91-99F1-44F1-B641-38E1B491A886}">
   <ds:schemaRefs>
     <ds:schemaRef ds:uri="http://schemas.microsoft.com/office/2006/metadata/contentType"/>
@@ -22504,21 +23281,4 @@
     <ds:schemaRef ds:uri="http://schemas.microsoft.com/internal/obd"/>
   </ds:schemaRefs>
 </ds:datastoreItem>
-</file>
-
-<file path=customXml/itemProps2.xml><?xml version="1.0" encoding="utf-8"?>
-<ds:datastoreItem xmlns:ds="http://schemas.openxmlformats.org/officeDocument/2006/customXml" ds:itemID="{CDCE3ED8-2D07-4BA2-9005-4F3ED3D7E6E9}">
-  <ds:schemaRefs>
-    <ds:schemaRef ds:uri="http://schemas.microsoft.com/sharepoint/v3/contenttype/forms"/>
-  </ds:schemaRefs>
-</ds:datastoreItem>
-</file>
-
-<file path=customXml/itemProps3.xml><?xml version="1.0" encoding="utf-8"?>
-<ds:datastoreItem xmlns:ds="http://schemas.openxmlformats.org/officeDocument/2006/customXml" ds:itemID="{1E4AACF7-51B1-41A0-AAF9-D883E2E86D45}">
-  <ds:schemaRefs>
-    <ds:schemaRef ds:uri="http://schemas.microsoft.com/office/2006/metadata/properties"/>
-    <ds:schemaRef ds:uri="http://schemas.microsoft.com/office/infopath/2007/PartnerControls"/>
-  </ds:schemaRefs>
-</ds:datastoreItem>
 </file>
</xml_diff>